<commit_message>
update analysis now finished
</commit_message>
<xml_diff>
--- a/Poster.pptx
+++ b/Poster.pptx
@@ -243,7 +243,7 @@
           <a:p>
             <a:fld id="{C96AF28D-0B51-447A-B4E3-DE3013D3E903}" type="datetimeFigureOut">
               <a:rPr lang="en-US" smtClean="0"/>
-              <a:t>3/11/2022</a:t>
+              <a:t>3/12/2022</a:t>
             </a:fld>
             <a:endParaRPr lang="en-US"/>
           </a:p>
@@ -413,7 +413,7 @@
           <a:p>
             <a:fld id="{C96AF28D-0B51-447A-B4E3-DE3013D3E903}" type="datetimeFigureOut">
               <a:rPr lang="en-US" smtClean="0"/>
-              <a:t>3/11/2022</a:t>
+              <a:t>3/12/2022</a:t>
             </a:fld>
             <a:endParaRPr lang="en-US"/>
           </a:p>
@@ -593,7 +593,7 @@
           <a:p>
             <a:fld id="{C96AF28D-0B51-447A-B4E3-DE3013D3E903}" type="datetimeFigureOut">
               <a:rPr lang="en-US" smtClean="0"/>
-              <a:t>3/11/2022</a:t>
+              <a:t>3/12/2022</a:t>
             </a:fld>
             <a:endParaRPr lang="en-US"/>
           </a:p>
@@ -763,7 +763,7 @@
           <a:p>
             <a:fld id="{C96AF28D-0B51-447A-B4E3-DE3013D3E903}" type="datetimeFigureOut">
               <a:rPr lang="en-US" smtClean="0"/>
-              <a:t>3/11/2022</a:t>
+              <a:t>3/12/2022</a:t>
             </a:fld>
             <a:endParaRPr lang="en-US"/>
           </a:p>
@@ -1007,7 +1007,7 @@
           <a:p>
             <a:fld id="{C96AF28D-0B51-447A-B4E3-DE3013D3E903}" type="datetimeFigureOut">
               <a:rPr lang="en-US" smtClean="0"/>
-              <a:t>3/11/2022</a:t>
+              <a:t>3/12/2022</a:t>
             </a:fld>
             <a:endParaRPr lang="en-US"/>
           </a:p>
@@ -1239,7 +1239,7 @@
           <a:p>
             <a:fld id="{C96AF28D-0B51-447A-B4E3-DE3013D3E903}" type="datetimeFigureOut">
               <a:rPr lang="en-US" smtClean="0"/>
-              <a:t>3/11/2022</a:t>
+              <a:t>3/12/2022</a:t>
             </a:fld>
             <a:endParaRPr lang="en-US"/>
           </a:p>
@@ -1606,7 +1606,7 @@
           <a:p>
             <a:fld id="{C96AF28D-0B51-447A-B4E3-DE3013D3E903}" type="datetimeFigureOut">
               <a:rPr lang="en-US" smtClean="0"/>
-              <a:t>3/11/2022</a:t>
+              <a:t>3/12/2022</a:t>
             </a:fld>
             <a:endParaRPr lang="en-US"/>
           </a:p>
@@ -1724,7 +1724,7 @@
           <a:p>
             <a:fld id="{C96AF28D-0B51-447A-B4E3-DE3013D3E903}" type="datetimeFigureOut">
               <a:rPr lang="en-US" smtClean="0"/>
-              <a:t>3/11/2022</a:t>
+              <a:t>3/12/2022</a:t>
             </a:fld>
             <a:endParaRPr lang="en-US"/>
           </a:p>
@@ -1819,7 +1819,7 @@
           <a:p>
             <a:fld id="{C96AF28D-0B51-447A-B4E3-DE3013D3E903}" type="datetimeFigureOut">
               <a:rPr lang="en-US" smtClean="0"/>
-              <a:t>3/11/2022</a:t>
+              <a:t>3/12/2022</a:t>
             </a:fld>
             <a:endParaRPr lang="en-US"/>
           </a:p>
@@ -2096,7 +2096,7 @@
           <a:p>
             <a:fld id="{C96AF28D-0B51-447A-B4E3-DE3013D3E903}" type="datetimeFigureOut">
               <a:rPr lang="en-US" smtClean="0"/>
-              <a:t>3/11/2022</a:t>
+              <a:t>3/12/2022</a:t>
             </a:fld>
             <a:endParaRPr lang="en-US"/>
           </a:p>
@@ -2353,7 +2353,7 @@
           <a:p>
             <a:fld id="{C96AF28D-0B51-447A-B4E3-DE3013D3E903}" type="datetimeFigureOut">
               <a:rPr lang="en-US" smtClean="0"/>
-              <a:t>3/11/2022</a:t>
+              <a:t>3/12/2022</a:t>
             </a:fld>
             <a:endParaRPr lang="en-US"/>
           </a:p>
@@ -2566,7 +2566,7 @@
           <a:p>
             <a:fld id="{C96AF28D-0B51-447A-B4E3-DE3013D3E903}" type="datetimeFigureOut">
               <a:rPr lang="en-US" smtClean="0"/>
-              <a:t>3/11/2022</a:t>
+              <a:t>3/12/2022</a:t>
             </a:fld>
             <a:endParaRPr lang="en-US"/>
           </a:p>
@@ -3994,7 +3994,7 @@
         </p:nvSpPr>
         <p:spPr>
           <a:xfrm>
-            <a:off x="9601200" y="13036550"/>
+            <a:off x="9604983" y="10619324"/>
             <a:ext cx="13716000" cy="838200"/>
           </a:xfrm>
           <a:prstGeom prst="rect">
@@ -4358,13 +4358,13 @@
           <p:nvPr>
             <p:extLst>
               <p:ext uri="{D42A27DB-BD31-4B8C-83A1-F6EECF244321}">
-                <p14:modId xmlns:p14="http://schemas.microsoft.com/office/powerpoint/2010/main" val="2952851001"/>
+                <p14:modId xmlns:p14="http://schemas.microsoft.com/office/powerpoint/2010/main" val="4173626005"/>
               </p:ext>
             </p:extLst>
           </p:nvPr>
         </p:nvGraphicFramePr>
         <p:xfrm>
-          <a:off x="16468725" y="14049055"/>
+          <a:off x="16472508" y="11631829"/>
           <a:ext cx="6871275" cy="1280160"/>
         </p:xfrm>
         <a:graphic>
@@ -8779,7 +8779,7 @@
         </p:nvSpPr>
         <p:spPr>
           <a:xfrm>
-            <a:off x="9601200" y="13949716"/>
+            <a:off x="9604983" y="11532490"/>
             <a:ext cx="6563620" cy="1446550"/>
           </a:xfrm>
           <a:prstGeom prst="rect">
@@ -8847,14 +8847,14 @@
           <p:nvPr>
             <p:extLst>
               <p:ext uri="{D42A27DB-BD31-4B8C-83A1-F6EECF244321}">
-                <p14:modId xmlns:p14="http://schemas.microsoft.com/office/powerpoint/2010/main" val="1609129441"/>
+                <p14:modId xmlns:p14="http://schemas.microsoft.com/office/powerpoint/2010/main" val="1093574051"/>
               </p:ext>
             </p:extLst>
           </p:nvPr>
         </p:nvGraphicFramePr>
         <p:xfrm>
-          <a:off x="9644546" y="16907559"/>
-          <a:ext cx="13716000" cy="1706880"/>
+          <a:off x="9769315" y="14544763"/>
+          <a:ext cx="13595013" cy="1706880"/>
         </p:xfrm>
         <a:graphic>
           <a:graphicData uri="http://schemas.openxmlformats.org/drawingml/2006/table">
@@ -8863,63 +8863,63 @@
                 <a:tableStyleId>{2D5ABB26-0587-4C30-8999-92F81FD0307C}</a:tableStyleId>
               </a:tblPr>
               <a:tblGrid>
-                <a:gridCol w="1524000">
+                <a:gridCol w="1510557">
                   <a:extLst>
                     <a:ext uri="{9D8B030D-6E8A-4147-A177-3AD203B41FA5}">
                       <a16:colId xmlns:a16="http://schemas.microsoft.com/office/drawing/2014/main" val="784418777"/>
                     </a:ext>
                   </a:extLst>
                 </a:gridCol>
-                <a:gridCol w="1524000">
+                <a:gridCol w="1510557">
                   <a:extLst>
                     <a:ext uri="{9D8B030D-6E8A-4147-A177-3AD203B41FA5}">
                       <a16:colId xmlns:a16="http://schemas.microsoft.com/office/drawing/2014/main" val="2707981503"/>
                     </a:ext>
                   </a:extLst>
                 </a:gridCol>
-                <a:gridCol w="1524000">
+                <a:gridCol w="1510557">
                   <a:extLst>
                     <a:ext uri="{9D8B030D-6E8A-4147-A177-3AD203B41FA5}">
                       <a16:colId xmlns:a16="http://schemas.microsoft.com/office/drawing/2014/main" val="1802827141"/>
                     </a:ext>
                   </a:extLst>
                 </a:gridCol>
-                <a:gridCol w="1524000">
+                <a:gridCol w="1510557">
                   <a:extLst>
                     <a:ext uri="{9D8B030D-6E8A-4147-A177-3AD203B41FA5}">
                       <a16:colId xmlns:a16="http://schemas.microsoft.com/office/drawing/2014/main" val="974558136"/>
                     </a:ext>
                   </a:extLst>
                 </a:gridCol>
-                <a:gridCol w="1524000">
+                <a:gridCol w="1510557">
                   <a:extLst>
                     <a:ext uri="{9D8B030D-6E8A-4147-A177-3AD203B41FA5}">
                       <a16:colId xmlns:a16="http://schemas.microsoft.com/office/drawing/2014/main" val="713298794"/>
                     </a:ext>
                   </a:extLst>
                 </a:gridCol>
-                <a:gridCol w="1524000">
+                <a:gridCol w="1510557">
                   <a:extLst>
                     <a:ext uri="{9D8B030D-6E8A-4147-A177-3AD203B41FA5}">
                       <a16:colId xmlns:a16="http://schemas.microsoft.com/office/drawing/2014/main" val="935372238"/>
                     </a:ext>
                   </a:extLst>
                 </a:gridCol>
-                <a:gridCol w="1524000">
+                <a:gridCol w="1510557">
                   <a:extLst>
                     <a:ext uri="{9D8B030D-6E8A-4147-A177-3AD203B41FA5}">
                       <a16:colId xmlns:a16="http://schemas.microsoft.com/office/drawing/2014/main" val="747898254"/>
                     </a:ext>
                   </a:extLst>
                 </a:gridCol>
-                <a:gridCol w="1524000">
+                <a:gridCol w="1510557">
                   <a:extLst>
                     <a:ext uri="{9D8B030D-6E8A-4147-A177-3AD203B41FA5}">
                       <a16:colId xmlns:a16="http://schemas.microsoft.com/office/drawing/2014/main" val="1452036346"/>
                     </a:ext>
                   </a:extLst>
                 </a:gridCol>
-                <a:gridCol w="1524000">
+                <a:gridCol w="1510557">
                   <a:extLst>
                     <a:ext uri="{9D8B030D-6E8A-4147-A177-3AD203B41FA5}">
                       <a16:colId xmlns:a16="http://schemas.microsoft.com/office/drawing/2014/main" val="3375359242"/>
@@ -11202,7 +11202,7 @@
         </p:nvSpPr>
         <p:spPr>
           <a:xfrm>
-            <a:off x="9635060" y="15435911"/>
+            <a:off x="9638843" y="13018685"/>
             <a:ext cx="13695454" cy="1446550"/>
           </a:xfrm>
           <a:prstGeom prst="rect">
@@ -11245,6 +11245,324 @@
                 <a:latin typeface="Georgia" panose="02040502050405020303" pitchFamily="18" charset="0"/>
               </a:rPr>
               <a:t>	(e.g. Questions that include for example “whatever” are not included in the “What” category)</a:t>
+            </a:r>
+          </a:p>
+        </p:txBody>
+      </p:sp>
+      <p:sp>
+        <p:nvSpPr>
+          <p:cNvPr id="4" name="Rectangle: Rounded Corners 3">
+            <a:extLst>
+              <a:ext uri="{FF2B5EF4-FFF2-40B4-BE49-F238E27FC236}">
+                <a16:creationId xmlns:a16="http://schemas.microsoft.com/office/drawing/2014/main" id="{C21F844F-5DE8-4637-BA5A-F3BFCE9624D8}"/>
+              </a:ext>
+            </a:extLst>
+          </p:cNvPr>
+          <p:cNvSpPr/>
+          <p:nvPr/>
+        </p:nvSpPr>
+        <p:spPr>
+          <a:xfrm>
+            <a:off x="12764852" y="14405641"/>
+            <a:ext cx="1328057" cy="1941793"/>
+          </a:xfrm>
+          <a:prstGeom prst="roundRect">
+            <a:avLst/>
+          </a:prstGeom>
+          <a:noFill/>
+          <a:ln w="28575"/>
+        </p:spPr>
+        <p:style>
+          <a:lnRef idx="2">
+            <a:schemeClr val="accent1">
+              <a:shade val="50000"/>
+            </a:schemeClr>
+          </a:lnRef>
+          <a:fillRef idx="1">
+            <a:schemeClr val="accent1"/>
+          </a:fillRef>
+          <a:effectRef idx="0">
+            <a:schemeClr val="accent1"/>
+          </a:effectRef>
+          <a:fontRef idx="minor">
+            <a:schemeClr val="lt1"/>
+          </a:fontRef>
+        </p:style>
+        <p:txBody>
+          <a:bodyPr rtlCol="0" anchor="ctr"/>
+          <a:lstStyle/>
+          <a:p>
+            <a:pPr algn="ctr"/>
+            <a:endParaRPr lang="en-US"/>
+          </a:p>
+        </p:txBody>
+      </p:sp>
+      <p:sp>
+        <p:nvSpPr>
+          <p:cNvPr id="88" name="Rectangle: Rounded Corners 87">
+            <a:extLst>
+              <a:ext uri="{FF2B5EF4-FFF2-40B4-BE49-F238E27FC236}">
+                <a16:creationId xmlns:a16="http://schemas.microsoft.com/office/drawing/2014/main" id="{F31BF99E-4455-47A2-A128-74AD79BEE147}"/>
+              </a:ext>
+            </a:extLst>
+          </p:cNvPr>
+          <p:cNvSpPr/>
+          <p:nvPr/>
+        </p:nvSpPr>
+        <p:spPr>
+          <a:xfrm>
+            <a:off x="18801251" y="14427306"/>
+            <a:ext cx="1328057" cy="1941793"/>
+          </a:xfrm>
+          <a:prstGeom prst="roundRect">
+            <a:avLst/>
+          </a:prstGeom>
+          <a:noFill/>
+          <a:ln w="28575">
+            <a:solidFill>
+              <a:srgbClr val="8C1515"/>
+            </a:solidFill>
+          </a:ln>
+        </p:spPr>
+        <p:style>
+          <a:lnRef idx="2">
+            <a:schemeClr val="accent1">
+              <a:shade val="50000"/>
+            </a:schemeClr>
+          </a:lnRef>
+          <a:fillRef idx="1">
+            <a:schemeClr val="accent1"/>
+          </a:fillRef>
+          <a:effectRef idx="0">
+            <a:schemeClr val="accent1"/>
+          </a:effectRef>
+          <a:fontRef idx="minor">
+            <a:schemeClr val="lt1"/>
+          </a:fontRef>
+        </p:style>
+        <p:txBody>
+          <a:bodyPr rtlCol="0" anchor="ctr"/>
+          <a:lstStyle/>
+          <a:p>
+            <a:pPr algn="ctr"/>
+            <a:endParaRPr lang="en-US"/>
+          </a:p>
+        </p:txBody>
+      </p:sp>
+      <p:sp>
+        <p:nvSpPr>
+          <p:cNvPr id="90" name="TextBox 89">
+            <a:extLst>
+              <a:ext uri="{FF2B5EF4-FFF2-40B4-BE49-F238E27FC236}">
+                <a16:creationId xmlns:a16="http://schemas.microsoft.com/office/drawing/2014/main" id="{0179111E-D779-4EFF-9309-EEB8974210C5}"/>
+              </a:ext>
+            </a:extLst>
+          </p:cNvPr>
+          <p:cNvSpPr txBox="1"/>
+          <p:nvPr/>
+        </p:nvSpPr>
+        <p:spPr>
+          <a:xfrm>
+            <a:off x="9606894" y="16403838"/>
+            <a:ext cx="13695454" cy="4832092"/>
+          </a:xfrm>
+          <a:prstGeom prst="rect">
+            <a:avLst/>
+          </a:prstGeom>
+          <a:noFill/>
+        </p:spPr>
+        <p:txBody>
+          <a:bodyPr wrap="square" rtlCol="0">
+            <a:spAutoFit/>
+          </a:bodyPr>
+          <a:lstStyle/>
+          <a:p>
+            <a:r>
+              <a:rPr lang="en-US" sz="2200" b="1">
+                <a:latin typeface="Georgia" panose="02040502050405020303" pitchFamily="18" charset="0"/>
+              </a:rPr>
+              <a:t>Error Type Examples</a:t>
+            </a:r>
+            <a:endParaRPr lang="en-US" sz="2200" b="1" dirty="0">
+              <a:latin typeface="Georgia" panose="02040502050405020303" pitchFamily="18" charset="0"/>
+            </a:endParaRPr>
+          </a:p>
+          <a:p>
+            <a:pPr marL="914400" lvl="1" indent="-457200">
+              <a:buAutoNum type="arabicPeriod"/>
+            </a:pPr>
+            <a:r>
+              <a:rPr lang="en-US" sz="2200" dirty="0">
+                <a:latin typeface="Georgia" panose="02040502050405020303" pitchFamily="18" charset="0"/>
+              </a:rPr>
+              <a:t>Difficult reading comprehension questions (esp. in “Why” category)</a:t>
+            </a:r>
+          </a:p>
+          <a:p>
+            <a:pPr lvl="1"/>
+            <a:r>
+              <a:rPr lang="en-US" sz="2200" dirty="0">
+                <a:latin typeface="Georgia" panose="02040502050405020303" pitchFamily="18" charset="0"/>
+              </a:rPr>
+              <a:t>	</a:t>
+            </a:r>
+            <a:r>
+              <a:rPr lang="en-US" sz="2200" b="1" dirty="0">
+                <a:latin typeface="Georgia" panose="02040502050405020303" pitchFamily="18" charset="0"/>
+              </a:rPr>
+              <a:t>Q:</a:t>
+            </a:r>
+            <a:r>
+              <a:rPr lang="en-US" sz="2200" dirty="0">
+                <a:latin typeface="Georgia" panose="02040502050405020303" pitchFamily="18" charset="0"/>
+              </a:rPr>
+              <a:t> Why was there a depreciation of the industrialized nations dollars?</a:t>
+            </a:r>
+          </a:p>
+          <a:p>
+            <a:pPr lvl="2"/>
+            <a:r>
+              <a:rPr lang="en-US" sz="2200" b="1" dirty="0">
+                <a:latin typeface="Georgia" panose="02040502050405020303" pitchFamily="18" charset="0"/>
+              </a:rPr>
+              <a:t>C: </a:t>
+            </a:r>
+            <a:r>
+              <a:rPr lang="en-US" sz="2200" dirty="0">
+                <a:latin typeface="Georgia" panose="02040502050405020303" pitchFamily="18" charset="0"/>
+              </a:rPr>
+              <a:t>… Anticipating that currency values would fluctuate unpredictably for a time, the industrialized nations increased their reserves (by expanding their money supplies) in amounts far greater than before. The result was a depreciation of the dollar and other industrialized nations' currencies…</a:t>
+            </a:r>
+          </a:p>
+          <a:p>
+            <a:pPr lvl="1"/>
+            <a:r>
+              <a:rPr lang="en-US" sz="2200" dirty="0">
+                <a:latin typeface="Georgia" panose="02040502050405020303" pitchFamily="18" charset="0"/>
+              </a:rPr>
+              <a:t>	</a:t>
+            </a:r>
+            <a:r>
+              <a:rPr lang="en-US" sz="2200" b="1" dirty="0">
+                <a:latin typeface="Georgia" panose="02040502050405020303" pitchFamily="18" charset="0"/>
+              </a:rPr>
+              <a:t>A: </a:t>
+            </a:r>
+            <a:r>
+              <a:rPr lang="en-US" sz="2200" dirty="0">
+                <a:latin typeface="Georgia" panose="02040502050405020303" pitchFamily="18" charset="0"/>
+              </a:rPr>
+              <a:t>industrialized nations increased their reserves</a:t>
+            </a:r>
+          </a:p>
+          <a:p>
+            <a:pPr lvl="1"/>
+            <a:r>
+              <a:rPr lang="en-US" sz="2200" dirty="0">
+                <a:latin typeface="Georgia" panose="02040502050405020303" pitchFamily="18" charset="0"/>
+              </a:rPr>
+              <a:t>	</a:t>
+            </a:r>
+            <a:r>
+              <a:rPr lang="en-US" sz="2200" b="1" dirty="0">
+                <a:latin typeface="Georgia" panose="02040502050405020303" pitchFamily="18" charset="0"/>
+              </a:rPr>
+              <a:t>P: </a:t>
+            </a:r>
+            <a:r>
+              <a:rPr lang="en-US" sz="2200" dirty="0">
+                <a:latin typeface="Georgia" panose="02040502050405020303" pitchFamily="18" charset="0"/>
+              </a:rPr>
+              <a:t>N/A</a:t>
+            </a:r>
+          </a:p>
+          <a:p>
+            <a:pPr marL="914400" lvl="1" indent="-457200">
+              <a:buAutoNum type="arabicPeriod" startAt="2"/>
+            </a:pPr>
+            <a:r>
+              <a:rPr lang="en-US" sz="2200" dirty="0" err="1">
+                <a:latin typeface="Georgia" panose="02040502050405020303" pitchFamily="18" charset="0"/>
+              </a:rPr>
+              <a:t>Confouding</a:t>
+            </a:r>
+            <a:r>
+              <a:rPr lang="en-US" sz="2200" dirty="0">
+                <a:latin typeface="Georgia" panose="02040502050405020303" pitchFamily="18" charset="0"/>
+              </a:rPr>
+              <a:t> &amp; Proximity of Q&amp;A</a:t>
+            </a:r>
+          </a:p>
+          <a:p>
+            <a:pPr lvl="2"/>
+            <a:r>
+              <a:rPr lang="en-US" sz="2200" b="1" dirty="0">
+                <a:latin typeface="Georgia" panose="02040502050405020303" pitchFamily="18" charset="0"/>
+              </a:rPr>
+              <a:t>Q:</a:t>
+            </a:r>
+            <a:r>
+              <a:rPr lang="en-US" sz="2200" dirty="0">
+                <a:latin typeface="Georgia" panose="02040502050405020303" pitchFamily="18" charset="0"/>
+              </a:rPr>
+              <a:t> What treaty took the place of constitutional treaty? </a:t>
+            </a:r>
+          </a:p>
+          <a:p>
+            <a:pPr lvl="2"/>
+            <a:r>
+              <a:rPr lang="en-US" sz="2200" b="1" dirty="0">
+                <a:latin typeface="Georgia" panose="02040502050405020303" pitchFamily="18" charset="0"/>
+              </a:rPr>
+              <a:t>C:</a:t>
+            </a:r>
+            <a:r>
+              <a:rPr lang="en-US" sz="2200" dirty="0">
+                <a:latin typeface="Georgia" panose="02040502050405020303" pitchFamily="18" charset="0"/>
+              </a:rPr>
+              <a:t> Following the Nice Treaty, there was an attempt to reform the constitutional law of the European Union and make it more transparent; … (40 </a:t>
+            </a:r>
+            <a:r>
+              <a:rPr lang="en-US" altLang="zh-CN" sz="2200" dirty="0">
+                <a:latin typeface="Georgia" panose="02040502050405020303" pitchFamily="18" charset="0"/>
+              </a:rPr>
+              <a:t>words)…</a:t>
+            </a:r>
+            <a:r>
+              <a:rPr lang="en-US" sz="2200" dirty="0">
+                <a:latin typeface="Georgia" panose="02040502050405020303" pitchFamily="18" charset="0"/>
+              </a:rPr>
+              <a:t> Instead, the Lisbon Treaty was enacted…</a:t>
+            </a:r>
+          </a:p>
+          <a:p>
+            <a:pPr lvl="2"/>
+            <a:r>
+              <a:rPr lang="en-US" sz="2200" b="1" dirty="0">
+                <a:latin typeface="Georgia" panose="02040502050405020303" pitchFamily="18" charset="0"/>
+              </a:rPr>
+              <a:t>A: </a:t>
+            </a:r>
+            <a:r>
+              <a:rPr lang="en-US" sz="2200" dirty="0">
+                <a:latin typeface="Georgia" panose="02040502050405020303" pitchFamily="18" charset="0"/>
+              </a:rPr>
+              <a:t>the Lisbon Treaty</a:t>
+            </a:r>
+          </a:p>
+          <a:p>
+            <a:pPr lvl="2"/>
+            <a:r>
+              <a:rPr lang="en-US" sz="2200" b="1" dirty="0">
+                <a:latin typeface="Georgia" panose="02040502050405020303" pitchFamily="18" charset="0"/>
+              </a:rPr>
+              <a:t>P: </a:t>
+            </a:r>
+            <a:r>
+              <a:rPr lang="en-US" sz="2200" dirty="0">
+                <a:latin typeface="Georgia" panose="02040502050405020303" pitchFamily="18" charset="0"/>
+              </a:rPr>
+              <a:t>Nice Treaty</a:t>
             </a:r>
           </a:p>
         </p:txBody>

</xml_diff>

<commit_message>
update some Hyper and Results
</commit_message>
<xml_diff>
--- a/Poster.pptx
+++ b/Poster.pptx
@@ -3382,7 +3382,7 @@
         </p:nvSpPr>
         <p:spPr>
           <a:xfrm>
-            <a:off x="24011467" y="16354150"/>
+            <a:off x="24011467" y="18211410"/>
             <a:ext cx="8487834" cy="838200"/>
           </a:xfrm>
           <a:prstGeom prst="rect">
@@ -3435,8 +3435,8 @@
         </p:nvSpPr>
         <p:spPr>
           <a:xfrm>
-            <a:off x="24011467" y="17329937"/>
-            <a:ext cx="8487830" cy="4478149"/>
+            <a:off x="24011467" y="19187197"/>
+            <a:ext cx="8487830" cy="2723823"/>
           </a:xfrm>
           <a:prstGeom prst="rect">
             <a:avLst/>
@@ -3458,7 +3458,7 @@
                 <a:effectLst/>
                 <a:latin typeface="Georgia" panose="02040502050405020303" pitchFamily="18" charset="0"/>
               </a:rPr>
-              <a:t>[1Cs 224n default final project: Building a </a:t>
+              <a:t>[1] </a:t>
             </a:r>
             <a:r>
               <a:rPr lang="en-US" sz="1900" b="0" i="0" dirty="0" err="1">
@@ -3468,7 +3468,7 @@
                 <a:effectLst/>
                 <a:latin typeface="Georgia" panose="02040502050405020303" pitchFamily="18" charset="0"/>
               </a:rPr>
-              <a:t>qa</a:t>
+              <a:t>Minjoon</a:t>
             </a:r>
             <a:r>
               <a:rPr lang="en-US" sz="1900" b="0" i="0" dirty="0">
@@ -3478,7 +3478,7 @@
                 <a:effectLst/>
                 <a:latin typeface="Georgia" panose="02040502050405020303" pitchFamily="18" charset="0"/>
               </a:rPr>
-              <a:t> system (</a:t>
+              <a:t> </a:t>
             </a:r>
             <a:r>
               <a:rPr lang="en-US" sz="1900" b="0" i="0" dirty="0" err="1">
@@ -3488,7 +3488,7 @@
                 <a:effectLst/>
                 <a:latin typeface="Georgia" panose="02040502050405020303" pitchFamily="18" charset="0"/>
               </a:rPr>
-              <a:t>iid</a:t>
+              <a:t>Seo</a:t>
             </a:r>
             <a:r>
               <a:rPr lang="en-US" sz="1900" b="0" i="0" dirty="0">
@@ -3498,7 +3498,87 @@
                 <a:effectLst/>
                 <a:latin typeface="Georgia" panose="02040502050405020303" pitchFamily="18" charset="0"/>
               </a:rPr>
-              <a:t> squad track). http://web.stanford.edu/class/cs224n/project/default-final-project-handout-squad-track.pdf.</a:t>
+              <a:t>, Aniruddha </a:t>
+            </a:r>
+            <a:r>
+              <a:rPr lang="en-US" sz="1900" b="0" i="0" dirty="0" err="1">
+                <a:solidFill>
+                  <a:srgbClr val="5D6879"/>
+                </a:solidFill>
+                <a:effectLst/>
+                <a:latin typeface="Georgia" panose="02040502050405020303" pitchFamily="18" charset="0"/>
+              </a:rPr>
+              <a:t>Kembhavi</a:t>
+            </a:r>
+            <a:r>
+              <a:rPr lang="en-US" sz="1900" b="0" i="0" dirty="0">
+                <a:solidFill>
+                  <a:srgbClr val="5D6879"/>
+                </a:solidFill>
+                <a:effectLst/>
+                <a:latin typeface="Georgia" panose="02040502050405020303" pitchFamily="18" charset="0"/>
+              </a:rPr>
+              <a:t>, Ali Farhadi, and </a:t>
+            </a:r>
+            <a:r>
+              <a:rPr lang="en-US" sz="1900" b="0" i="0" dirty="0" err="1">
+                <a:solidFill>
+                  <a:srgbClr val="5D6879"/>
+                </a:solidFill>
+                <a:effectLst/>
+                <a:latin typeface="Georgia" panose="02040502050405020303" pitchFamily="18" charset="0"/>
+              </a:rPr>
+              <a:t>Hannaneh</a:t>
+            </a:r>
+            <a:r>
+              <a:rPr lang="en-US" sz="1900" b="0" i="0" dirty="0">
+                <a:solidFill>
+                  <a:srgbClr val="5D6879"/>
+                </a:solidFill>
+                <a:effectLst/>
+                <a:latin typeface="Georgia" panose="02040502050405020303" pitchFamily="18" charset="0"/>
+              </a:rPr>
+              <a:t> </a:t>
+            </a:r>
+            <a:r>
+              <a:rPr lang="en-US" sz="1900" b="0" i="0" dirty="0" err="1">
+                <a:solidFill>
+                  <a:srgbClr val="5D6879"/>
+                </a:solidFill>
+                <a:effectLst/>
+                <a:latin typeface="Georgia" panose="02040502050405020303" pitchFamily="18" charset="0"/>
+              </a:rPr>
+              <a:t>Hajishirzi</a:t>
+            </a:r>
+            <a:r>
+              <a:rPr lang="en-US" sz="1900" b="0" i="0" dirty="0">
+                <a:solidFill>
+                  <a:srgbClr val="5D6879"/>
+                </a:solidFill>
+                <a:effectLst/>
+                <a:latin typeface="Georgia" panose="02040502050405020303" pitchFamily="18" charset="0"/>
+              </a:rPr>
+              <a:t>. Bidirectional attention flow for machine comprehension. In </a:t>
+            </a:r>
+            <a:r>
+              <a:rPr lang="en-US" sz="1900" b="0" i="1" dirty="0">
+                <a:solidFill>
+                  <a:srgbClr val="5D6879"/>
+                </a:solidFill>
+                <a:effectLst/>
+                <a:latin typeface="Georgia" panose="02040502050405020303" pitchFamily="18" charset="0"/>
+              </a:rPr>
+              <a:t>Association for Computational Linguistics (ACL),</a:t>
+            </a:r>
+            <a:r>
+              <a:rPr lang="en-US" sz="1900" b="0" i="0" dirty="0">
+                <a:solidFill>
+                  <a:srgbClr val="5D6879"/>
+                </a:solidFill>
+                <a:effectLst/>
+                <a:latin typeface="Georgia" panose="02040502050405020303" pitchFamily="18" charset="0"/>
+              </a:rPr>
+              <a:t> 2017.</a:t>
             </a:r>
             <a:br>
               <a:rPr lang="en-US" sz="1900" b="0" i="0" dirty="0">
@@ -3517,146 +3597,7 @@
                 <a:effectLst/>
                 <a:latin typeface="Georgia" panose="02040502050405020303" pitchFamily="18" charset="0"/>
               </a:rPr>
-              <a:t>[2] </a:t>
-            </a:r>
-            <a:r>
-              <a:rPr lang="en-US" sz="1900" b="0" i="0" dirty="0" err="1">
-                <a:solidFill>
-                  <a:srgbClr val="5D6879"/>
-                </a:solidFill>
-                <a:effectLst/>
-                <a:latin typeface="Georgia" panose="02040502050405020303" pitchFamily="18" charset="0"/>
-              </a:rPr>
-              <a:t>Minjoon</a:t>
-            </a:r>
-            <a:r>
-              <a:rPr lang="en-US" sz="1900" b="0" i="0" dirty="0">
-                <a:solidFill>
-                  <a:srgbClr val="5D6879"/>
-                </a:solidFill>
-                <a:effectLst/>
-                <a:latin typeface="Georgia" panose="02040502050405020303" pitchFamily="18" charset="0"/>
-              </a:rPr>
-              <a:t> </a:t>
-            </a:r>
-            <a:r>
-              <a:rPr lang="en-US" sz="1900" b="0" i="0" dirty="0" err="1">
-                <a:solidFill>
-                  <a:srgbClr val="5D6879"/>
-                </a:solidFill>
-                <a:effectLst/>
-                <a:latin typeface="Georgia" panose="02040502050405020303" pitchFamily="18" charset="0"/>
-              </a:rPr>
-              <a:t>Seo</a:t>
-            </a:r>
-            <a:r>
-              <a:rPr lang="en-US" sz="1900" b="0" i="0" dirty="0">
-                <a:solidFill>
-                  <a:srgbClr val="5D6879"/>
-                </a:solidFill>
-                <a:effectLst/>
-                <a:latin typeface="Georgia" panose="02040502050405020303" pitchFamily="18" charset="0"/>
-              </a:rPr>
-              <a:t>, Aniruddha </a:t>
-            </a:r>
-            <a:r>
-              <a:rPr lang="en-US" sz="1900" b="0" i="0" dirty="0" err="1">
-                <a:solidFill>
-                  <a:srgbClr val="5D6879"/>
-                </a:solidFill>
-                <a:effectLst/>
-                <a:latin typeface="Georgia" panose="02040502050405020303" pitchFamily="18" charset="0"/>
-              </a:rPr>
-              <a:t>Kembhavi</a:t>
-            </a:r>
-            <a:r>
-              <a:rPr lang="en-US" sz="1900" b="0" i="0" dirty="0">
-                <a:solidFill>
-                  <a:srgbClr val="5D6879"/>
-                </a:solidFill>
-                <a:effectLst/>
-                <a:latin typeface="Georgia" panose="02040502050405020303" pitchFamily="18" charset="0"/>
-              </a:rPr>
-              <a:t>, Ali Farhadi, and </a:t>
-            </a:r>
-            <a:r>
-              <a:rPr lang="en-US" sz="1900" b="0" i="0" dirty="0" err="1">
-                <a:solidFill>
-                  <a:srgbClr val="5D6879"/>
-                </a:solidFill>
-                <a:effectLst/>
-                <a:latin typeface="Georgia" panose="02040502050405020303" pitchFamily="18" charset="0"/>
-              </a:rPr>
-              <a:t>Hannaneh</a:t>
-            </a:r>
-            <a:r>
-              <a:rPr lang="en-US" sz="1900" b="0" i="0" dirty="0">
-                <a:solidFill>
-                  <a:srgbClr val="5D6879"/>
-                </a:solidFill>
-                <a:effectLst/>
-                <a:latin typeface="Georgia" panose="02040502050405020303" pitchFamily="18" charset="0"/>
-              </a:rPr>
-              <a:t> </a:t>
-            </a:r>
-            <a:r>
-              <a:rPr lang="en-US" sz="1900" b="0" i="0" dirty="0" err="1">
-                <a:solidFill>
-                  <a:srgbClr val="5D6879"/>
-                </a:solidFill>
-                <a:effectLst/>
-                <a:latin typeface="Georgia" panose="02040502050405020303" pitchFamily="18" charset="0"/>
-              </a:rPr>
-              <a:t>Hajishirzi</a:t>
-            </a:r>
-            <a:r>
-              <a:rPr lang="en-US" sz="1900" b="0" i="0" dirty="0">
-                <a:solidFill>
-                  <a:srgbClr val="5D6879"/>
-                </a:solidFill>
-                <a:effectLst/>
-                <a:latin typeface="Georgia" panose="02040502050405020303" pitchFamily="18" charset="0"/>
-              </a:rPr>
-              <a:t>. Bidirectional attention flow for machine comprehension. In </a:t>
-            </a:r>
-            <a:r>
-              <a:rPr lang="en-US" sz="1900" b="0" i="1" dirty="0">
-                <a:solidFill>
-                  <a:srgbClr val="5D6879"/>
-                </a:solidFill>
-                <a:effectLst/>
-                <a:latin typeface="Georgia" panose="02040502050405020303" pitchFamily="18" charset="0"/>
-              </a:rPr>
-              <a:t>Association for Computational Linguistics (ACL),</a:t>
-            </a:r>
-            <a:r>
-              <a:rPr lang="en-US" sz="1900" b="0" i="0" dirty="0">
-                <a:solidFill>
-                  <a:srgbClr val="5D6879"/>
-                </a:solidFill>
-                <a:effectLst/>
-                <a:latin typeface="Georgia" panose="02040502050405020303" pitchFamily="18" charset="0"/>
-              </a:rPr>
-              <a:t> 2017.</a:t>
-            </a:r>
-            <a:br>
-              <a:rPr lang="en-US" sz="1900" b="0" i="0" dirty="0">
-                <a:solidFill>
-                  <a:srgbClr val="5D6879"/>
-                </a:solidFill>
-                <a:effectLst/>
-                <a:latin typeface="Georgia" panose="02040502050405020303" pitchFamily="18" charset="0"/>
-              </a:rPr>
-            </a:br>
-            <a:r>
-              <a:rPr lang="en-US" sz="1900" b="0" i="0" dirty="0">
-                <a:solidFill>
-                  <a:srgbClr val="5D6879"/>
-                </a:solidFill>
-                <a:effectLst/>
-                <a:latin typeface="Georgia" panose="02040502050405020303" pitchFamily="18" charset="0"/>
-              </a:rPr>
-              <a:t>[3] Adams Wei Yu, David Dohan, Minh-Thang Luong, Rui Zhao, Kai Chen, Mohammad </a:t>
+              <a:t>[2] Adams Wei Yu, David Dohan, Minh-Thang Luong, Rui Zhao, Kai Chen, Mohammad </a:t>
             </a:r>
             <a:r>
               <a:rPr lang="en-US" sz="1900" b="0" i="0" dirty="0" err="1">
@@ -3743,166 +3684,7 @@
                 <a:effectLst/>
                 <a:latin typeface="Georgia" panose="02040502050405020303" pitchFamily="18" charset="0"/>
               </a:rPr>
-              <a:t>[4] Ashish Vaswani, Noam </a:t>
-            </a:r>
-            <a:r>
-              <a:rPr lang="en-US" sz="1900" b="0" i="0" dirty="0" err="1">
-                <a:solidFill>
-                  <a:srgbClr val="5D6879"/>
-                </a:solidFill>
-                <a:effectLst/>
-                <a:latin typeface="Georgia" panose="02040502050405020303" pitchFamily="18" charset="0"/>
-              </a:rPr>
-              <a:t>Shazeer</a:t>
-            </a:r>
-            <a:r>
-              <a:rPr lang="en-US" sz="1900" b="0" i="0" dirty="0">
-                <a:solidFill>
-                  <a:srgbClr val="5D6879"/>
-                </a:solidFill>
-                <a:effectLst/>
-                <a:latin typeface="Georgia" panose="02040502050405020303" pitchFamily="18" charset="0"/>
-              </a:rPr>
-              <a:t>, Niki Parmar, Jakob </a:t>
-            </a:r>
-            <a:r>
-              <a:rPr lang="en-US" sz="1900" b="0" i="0" dirty="0" err="1">
-                <a:solidFill>
-                  <a:srgbClr val="5D6879"/>
-                </a:solidFill>
-                <a:effectLst/>
-                <a:latin typeface="Georgia" panose="02040502050405020303" pitchFamily="18" charset="0"/>
-              </a:rPr>
-              <a:t>Uszkoreit</a:t>
-            </a:r>
-            <a:r>
-              <a:rPr lang="en-US" sz="1900" b="0" i="0" dirty="0">
-                <a:solidFill>
-                  <a:srgbClr val="5D6879"/>
-                </a:solidFill>
-                <a:effectLst/>
-                <a:latin typeface="Georgia" panose="02040502050405020303" pitchFamily="18" charset="0"/>
-              </a:rPr>
-              <a:t>, </a:t>
-            </a:r>
-            <a:r>
-              <a:rPr lang="en-US" sz="1900" b="0" i="0" dirty="0" err="1">
-                <a:solidFill>
-                  <a:srgbClr val="5D6879"/>
-                </a:solidFill>
-                <a:effectLst/>
-                <a:latin typeface="Georgia" panose="02040502050405020303" pitchFamily="18" charset="0"/>
-              </a:rPr>
-              <a:t>Llion</a:t>
-            </a:r>
-            <a:r>
-              <a:rPr lang="en-US" sz="1900" b="0" i="0" dirty="0">
-                <a:solidFill>
-                  <a:srgbClr val="5D6879"/>
-                </a:solidFill>
-                <a:effectLst/>
-                <a:latin typeface="Georgia" panose="02040502050405020303" pitchFamily="18" charset="0"/>
-              </a:rPr>
-              <a:t> Jones, Aidan Gomez, Lukas Kaiser, and </a:t>
-            </a:r>
-            <a:r>
-              <a:rPr lang="en-US" sz="1900" b="0" i="0" dirty="0" err="1">
-                <a:solidFill>
-                  <a:srgbClr val="5D6879"/>
-                </a:solidFill>
-                <a:effectLst/>
-                <a:latin typeface="Georgia" panose="02040502050405020303" pitchFamily="18" charset="0"/>
-              </a:rPr>
-              <a:t>Illia</a:t>
-            </a:r>
-            <a:r>
-              <a:rPr lang="en-US" sz="1900" b="0" i="0" dirty="0">
-                <a:solidFill>
-                  <a:srgbClr val="5D6879"/>
-                </a:solidFill>
-                <a:effectLst/>
-                <a:latin typeface="Georgia" panose="02040502050405020303" pitchFamily="18" charset="0"/>
-              </a:rPr>
-              <a:t> </a:t>
-            </a:r>
-            <a:r>
-              <a:rPr lang="en-US" sz="1900" b="0" i="0" dirty="0" err="1">
-                <a:solidFill>
-                  <a:srgbClr val="5D6879"/>
-                </a:solidFill>
-                <a:effectLst/>
-                <a:latin typeface="Georgia" panose="02040502050405020303" pitchFamily="18" charset="0"/>
-              </a:rPr>
-              <a:t>Polosukhin</a:t>
-            </a:r>
-            <a:r>
-              <a:rPr lang="en-US" sz="1900" b="0" i="0" dirty="0">
-                <a:solidFill>
-                  <a:srgbClr val="5D6879"/>
-                </a:solidFill>
-                <a:effectLst/>
-                <a:latin typeface="Georgia" panose="02040502050405020303" pitchFamily="18" charset="0"/>
-              </a:rPr>
-              <a:t>. "</a:t>
-            </a:r>
-            <a:r>
-              <a:rPr lang="en-US" sz="1900" b="0" i="0" dirty="0" err="1">
-                <a:solidFill>
-                  <a:srgbClr val="5D6879"/>
-                </a:solidFill>
-                <a:effectLst/>
-                <a:latin typeface="Georgia" panose="02040502050405020303" pitchFamily="18" charset="0"/>
-              </a:rPr>
-              <a:t>attnetion</a:t>
-            </a:r>
-            <a:r>
-              <a:rPr lang="en-US" sz="1900" b="0" i="0" dirty="0">
-                <a:solidFill>
-                  <a:srgbClr val="5D6879"/>
-                </a:solidFill>
-                <a:effectLst/>
-                <a:latin typeface="Georgia" panose="02040502050405020303" pitchFamily="18" charset="0"/>
-              </a:rPr>
-              <a:t> is all you need". </a:t>
-            </a:r>
-            <a:r>
-              <a:rPr lang="en-US" sz="1900" b="0" i="1" dirty="0">
-                <a:solidFill>
-                  <a:srgbClr val="5D6879"/>
-                </a:solidFill>
-                <a:effectLst/>
-                <a:latin typeface="Georgia" panose="02040502050405020303" pitchFamily="18" charset="0"/>
-              </a:rPr>
-              <a:t>In Association for Computational Linguistics (ACL), </a:t>
-            </a:r>
-            <a:r>
-              <a:rPr lang="en-US" sz="1900" b="0" dirty="0">
-                <a:solidFill>
-                  <a:srgbClr val="5D6879"/>
-                </a:solidFill>
-                <a:effectLst/>
-                <a:latin typeface="Georgia" panose="02040502050405020303" pitchFamily="18" charset="0"/>
-              </a:rPr>
-              <a:t>2017.</a:t>
-            </a:r>
-            <a:br>
-              <a:rPr lang="en-US" sz="1900" b="0" i="0" dirty="0">
-                <a:solidFill>
-                  <a:srgbClr val="5D6879"/>
-                </a:solidFill>
-                <a:effectLst/>
-                <a:latin typeface="Georgia" panose="02040502050405020303" pitchFamily="18" charset="0"/>
-              </a:rPr>
-            </a:br>
-            <a:r>
-              <a:rPr lang="en-US" sz="1900" b="0" i="0" dirty="0">
-                <a:solidFill>
-                  <a:srgbClr val="5D6879"/>
-                </a:solidFill>
-                <a:effectLst/>
-                <a:latin typeface="Georgia" panose="02040502050405020303" pitchFamily="18" charset="0"/>
-              </a:rPr>
-              <a:t>[5] Wei Wang, Ming Yan, and Chen Wu. Multi-granularity hierarchical attention fusion networks for reading comprehension and question answering. In </a:t>
+              <a:t>[3] Wei Wang, Ming Yan, and Chen Wu. Multi-granularity hierarchical attention fusion networks for reading comprehension and question answering. In </a:t>
             </a:r>
             <a:r>
               <a:rPr lang="en-US" sz="1900" b="0" i="1" dirty="0">
@@ -3994,7 +3776,7 @@
         </p:nvSpPr>
         <p:spPr>
           <a:xfrm>
-            <a:off x="9604983" y="10619324"/>
+            <a:off x="9604983" y="11150259"/>
             <a:ext cx="13716000" cy="838200"/>
           </a:xfrm>
           <a:prstGeom prst="rect">
@@ -4358,13 +4140,13 @@
           <p:nvPr>
             <p:extLst>
               <p:ext uri="{D42A27DB-BD31-4B8C-83A1-F6EECF244321}">
-                <p14:modId xmlns:p14="http://schemas.microsoft.com/office/powerpoint/2010/main" val="4173626005"/>
+                <p14:modId xmlns:p14="http://schemas.microsoft.com/office/powerpoint/2010/main" val="3299354392"/>
               </p:ext>
             </p:extLst>
           </p:nvPr>
         </p:nvGraphicFramePr>
         <p:xfrm>
-          <a:off x="16472508" y="11631829"/>
+          <a:off x="16472508" y="12162764"/>
           <a:ext cx="6871275" cy="1280160"/>
         </p:xfrm>
         <a:graphic>
@@ -4616,7 +4398,7 @@
         </p:nvSpPr>
         <p:spPr>
           <a:xfrm>
-            <a:off x="419099" y="10619324"/>
+            <a:off x="419099" y="10619630"/>
             <a:ext cx="8487833" cy="2800767"/>
           </a:xfrm>
           <a:prstGeom prst="rect">
@@ -4731,22 +4513,13 @@
               </a:spcAft>
             </a:pPr>
             <a:r>
-              <a:rPr lang="en-US" sz="2200" dirty="0" err="1">
-                <a:solidFill>
-                  <a:srgbClr val="000000"/>
-                </a:solidFill>
-                <a:latin typeface="Georgia" panose="02040502050405020303" pitchFamily="18" charset="0"/>
-              </a:rPr>
-              <a:t>Args</a:t>
-            </a:r>
-            <a:r>
               <a:rPr lang="en-US" sz="2200" dirty="0">
                 <a:solidFill>
                   <a:srgbClr val="000000"/>
                 </a:solidFill>
                 <a:latin typeface="Georgia" panose="02040502050405020303" pitchFamily="18" charset="0"/>
               </a:rPr>
-              <a:t>:</a:t>
+              <a:t>Design Specifics:</a:t>
             </a:r>
           </a:p>
           <a:p>
@@ -4765,7 +4538,7 @@
                 </a:solidFill>
                 <a:latin typeface="Georgia" panose="02040502050405020303" pitchFamily="18" charset="0"/>
               </a:rPr>
-              <a:t>	Batch size: 32</a:t>
+              <a:t>	Hidden size: 128</a:t>
             </a:r>
           </a:p>
           <a:p>
@@ -4784,7 +4557,7 @@
                 </a:solidFill>
                 <a:latin typeface="Georgia" panose="02040502050405020303" pitchFamily="18" charset="0"/>
               </a:rPr>
-              <a:t>	Hidden size: 128</a:t>
+              <a:t>	# of Conv in the Contextual Embed Encoder Block: 4</a:t>
             </a:r>
           </a:p>
           <a:p>
@@ -4803,16 +4576,7 @@
                 </a:solidFill>
                 <a:latin typeface="Georgia" panose="02040502050405020303" pitchFamily="18" charset="0"/>
               </a:rPr>
-              <a:t>	</a:t>
-            </a:r>
-            <a:r>
-              <a:rPr lang="en-US" sz="2200" b="1" dirty="0">
-                <a:solidFill>
-                  <a:srgbClr val="000000"/>
-                </a:solidFill>
-                <a:latin typeface="Georgia" panose="02040502050405020303" pitchFamily="18" charset="0"/>
-              </a:rPr>
-              <a:t>Dropout prob: 0.1</a:t>
+              <a:t>	# of Conv in a Stacked Encoder Block: 2</a:t>
             </a:r>
           </a:p>
           <a:p>
@@ -4825,20 +4589,14 @@
               </a:spcAft>
             </a:pPr>
             <a:r>
-              <a:rPr lang="en-US" sz="2200" b="1" dirty="0">
+              <a:rPr lang="en-US" sz="2200" dirty="0">
                 <a:solidFill>
                   <a:srgbClr val="000000"/>
                 </a:solidFill>
                 <a:latin typeface="Georgia" panose="02040502050405020303" pitchFamily="18" charset="0"/>
               </a:rPr>
-              <a:t>	Learning rate: </a:t>
-            </a:r>
-            <a:endParaRPr lang="en-US" sz="2200" dirty="0">
-              <a:solidFill>
-                <a:srgbClr val="000000"/>
-              </a:solidFill>
-              <a:latin typeface="Georgia" panose="02040502050405020303" pitchFamily="18" charset="0"/>
-            </a:endParaRPr>
+              <a:t>	# of heads in Self-attention: 8</a:t>
+            </a:r>
           </a:p>
           <a:p>
             <a:pPr rtl="0">
@@ -4849,12 +4607,15 @@
                 <a:spcPts val="0"/>
               </a:spcAft>
             </a:pPr>
-            <a:endParaRPr lang="en-US" sz="2200" dirty="0">
-              <a:solidFill>
-                <a:srgbClr val="000000"/>
-              </a:solidFill>
-              <a:latin typeface="Georgia" panose="02040502050405020303" pitchFamily="18" charset="0"/>
-            </a:endParaRPr>
+            <a:r>
+              <a:rPr lang="en-US" sz="2200" dirty="0">
+                <a:solidFill>
+                  <a:srgbClr val="000000"/>
+                </a:solidFill>
+                <a:latin typeface="Georgia" panose="02040502050405020303" pitchFamily="18" charset="0"/>
+              </a:rPr>
+              <a:t>	Used a 1d Convolution to decrease input size when necessary</a:t>
+            </a:r>
           </a:p>
         </p:txBody>
       </p:sp>
@@ -4873,9 +4634,9 @@
         <p:grpSpPr>
           <a:xfrm>
             <a:off x="452158" y="13460590"/>
-            <a:ext cx="8528451" cy="8195026"/>
+            <a:ext cx="8380430" cy="8195026"/>
             <a:chOff x="452158" y="13460590"/>
-            <a:chExt cx="8528451" cy="8195026"/>
+            <a:chExt cx="8380430" cy="8195026"/>
           </a:xfrm>
         </p:grpSpPr>
         <p:sp>
@@ -7686,8 +7447,8 @@
           </p:nvSpPr>
           <p:spPr>
             <a:xfrm flipH="1">
-              <a:off x="7248465" y="17084077"/>
-              <a:ext cx="1732144" cy="307777"/>
+              <a:off x="7896165" y="17084077"/>
+              <a:ext cx="822362" cy="317287"/>
             </a:xfrm>
             <a:prstGeom prst="rect">
               <a:avLst/>
@@ -7707,7 +7468,7 @@
                 <a:rPr lang="en-US" sz="1400" dirty="0">
                   <a:latin typeface="Georgia" panose="02040502050405020303" pitchFamily="18" charset="0"/>
                 </a:rPr>
-                <a:t>Repeat 7 times</a:t>
+                <a:t>Repeat</a:t>
               </a:r>
             </a:p>
           </p:txBody>
@@ -8726,7 +8487,7 @@
         </p:nvSpPr>
         <p:spPr>
           <a:xfrm>
-            <a:off x="24011467" y="12021055"/>
+            <a:off x="24011467" y="13057375"/>
             <a:ext cx="8487833" cy="838200"/>
           </a:xfrm>
           <a:prstGeom prst="rect">
@@ -8779,7 +8540,7 @@
         </p:nvSpPr>
         <p:spPr>
           <a:xfrm>
-            <a:off x="9604983" y="11532490"/>
+            <a:off x="9604983" y="12063425"/>
             <a:ext cx="6563620" cy="1446550"/>
           </a:xfrm>
           <a:prstGeom prst="rect">
@@ -8847,13 +8608,13 @@
           <p:nvPr>
             <p:extLst>
               <p:ext uri="{D42A27DB-BD31-4B8C-83A1-F6EECF244321}">
-                <p14:modId xmlns:p14="http://schemas.microsoft.com/office/powerpoint/2010/main" val="1093574051"/>
+                <p14:modId xmlns:p14="http://schemas.microsoft.com/office/powerpoint/2010/main" val="744857822"/>
               </p:ext>
             </p:extLst>
           </p:nvPr>
         </p:nvGraphicFramePr>
         <p:xfrm>
-          <a:off x="9769315" y="14544763"/>
+          <a:off x="9769315" y="15075698"/>
           <a:ext cx="13595013" cy="1706880"/>
         </p:xfrm>
         <a:graphic>
@@ -11202,7 +10963,7 @@
         </p:nvSpPr>
         <p:spPr>
           <a:xfrm>
-            <a:off x="9638843" y="13018685"/>
+            <a:off x="9638843" y="13549620"/>
             <a:ext cx="13695454" cy="1446550"/>
           </a:xfrm>
           <a:prstGeom prst="rect">
@@ -11263,7 +11024,7 @@
         </p:nvSpPr>
         <p:spPr>
           <a:xfrm>
-            <a:off x="12764852" y="14405641"/>
+            <a:off x="12764852" y="14936576"/>
             <a:ext cx="1328057" cy="1941793"/>
           </a:xfrm>
           <a:prstGeom prst="roundRect">
@@ -11311,7 +11072,7 @@
         </p:nvSpPr>
         <p:spPr>
           <a:xfrm>
-            <a:off x="18801251" y="14427306"/>
+            <a:off x="18801251" y="14958241"/>
             <a:ext cx="1328057" cy="1941793"/>
           </a:xfrm>
           <a:prstGeom prst="roundRect">
@@ -11363,7 +11124,7 @@
         </p:nvSpPr>
         <p:spPr>
           <a:xfrm>
-            <a:off x="9606894" y="16403838"/>
+            <a:off x="9606894" y="17039873"/>
             <a:ext cx="13695454" cy="4832092"/>
           </a:xfrm>
           <a:prstGeom prst="rect">
@@ -11378,14 +11139,11 @@
           <a:lstStyle/>
           <a:p>
             <a:r>
-              <a:rPr lang="en-US" sz="2200" b="1">
+              <a:rPr lang="en-US" sz="2200" b="1" dirty="0">
                 <a:latin typeface="Georgia" panose="02040502050405020303" pitchFamily="18" charset="0"/>
               </a:rPr>
               <a:t>Error Type Examples</a:t>
             </a:r>
-            <a:endParaRPr lang="en-US" sz="2200" b="1" dirty="0">
-              <a:latin typeface="Georgia" panose="02040502050405020303" pitchFamily="18" charset="0"/>
-            </a:endParaRPr>
           </a:p>
           <a:p>
             <a:pPr marL="914400" lvl="1" indent="-457200">
@@ -11484,7 +11242,7 @@
               <a:rPr lang="en-US" sz="2200" dirty="0" err="1">
                 <a:latin typeface="Georgia" panose="02040502050405020303" pitchFamily="18" charset="0"/>
               </a:rPr>
-              <a:t>Confouding</a:t>
+              <a:t>Confonuding</a:t>
             </a:r>
             <a:r>
               <a:rPr lang="en-US" sz="2200" dirty="0">
@@ -11564,6 +11322,1608 @@
               </a:rPr>
               <a:t>Nice Treaty</a:t>
             </a:r>
+          </a:p>
+        </p:txBody>
+      </p:sp>
+      <p:grpSp>
+        <p:nvGrpSpPr>
+          <p:cNvPr id="31" name="Group 30">
+            <a:extLst>
+              <a:ext uri="{FF2B5EF4-FFF2-40B4-BE49-F238E27FC236}">
+                <a16:creationId xmlns:a16="http://schemas.microsoft.com/office/drawing/2014/main" id="{1603BA25-02E4-4695-910B-11E29951E5A9}"/>
+              </a:ext>
+            </a:extLst>
+          </p:cNvPr>
+          <p:cNvGrpSpPr/>
+          <p:nvPr/>
+        </p:nvGrpSpPr>
+        <p:grpSpPr>
+          <a:xfrm>
+            <a:off x="23884561" y="4667461"/>
+            <a:ext cx="4461839" cy="3156726"/>
+            <a:chOff x="23884561" y="4583381"/>
+            <a:chExt cx="4461839" cy="3156726"/>
+          </a:xfrm>
+        </p:grpSpPr>
+        <p:pic>
+          <p:nvPicPr>
+            <p:cNvPr id="94" name="Picture 93" descr="Chart&#10;&#10;Description automatically generated">
+              <a:extLst>
+                <a:ext uri="{FF2B5EF4-FFF2-40B4-BE49-F238E27FC236}">
+                  <a16:creationId xmlns:a16="http://schemas.microsoft.com/office/drawing/2014/main" id="{18B5862A-4DA2-4801-AC97-515C01ECF94B}"/>
+                </a:ext>
+              </a:extLst>
+            </p:cNvPr>
+            <p:cNvPicPr>
+              <a:picLocks noChangeAspect="1"/>
+            </p:cNvPicPr>
+            <p:nvPr/>
+          </p:nvPicPr>
+          <p:blipFill rotWithShape="1">
+            <a:blip r:embed="rId3">
+              <a:extLst>
+                <a:ext uri="{28A0092B-C50C-407E-A947-70E740481C1C}">
+                  <a14:useLocalDpi xmlns:a14="http://schemas.microsoft.com/office/drawing/2010/main" val="0"/>
+                </a:ext>
+              </a:extLst>
+            </a:blip>
+            <a:srcRect l="4854" t="6618" r="13559" b="7910"/>
+            <a:stretch/>
+          </p:blipFill>
+          <p:spPr>
+            <a:xfrm>
+              <a:off x="24187331" y="4596051"/>
+              <a:ext cx="3911417" cy="2900762"/>
+            </a:xfrm>
+            <a:prstGeom prst="rect">
+              <a:avLst/>
+            </a:prstGeom>
+          </p:spPr>
+        </p:pic>
+        <p:sp>
+          <p:nvSpPr>
+            <p:cNvPr id="18" name="TextBox 17">
+              <a:extLst>
+                <a:ext uri="{FF2B5EF4-FFF2-40B4-BE49-F238E27FC236}">
+                  <a16:creationId xmlns:a16="http://schemas.microsoft.com/office/drawing/2014/main" id="{2316316C-2C67-4BE4-8D75-9126FD7E301C}"/>
+                </a:ext>
+              </a:extLst>
+            </p:cNvPr>
+            <p:cNvSpPr txBox="1"/>
+            <p:nvPr/>
+          </p:nvSpPr>
+          <p:spPr>
+            <a:xfrm>
+              <a:off x="24116097" y="7432330"/>
+              <a:ext cx="4230303" cy="307777"/>
+            </a:xfrm>
+            <a:prstGeom prst="rect">
+              <a:avLst/>
+            </a:prstGeom>
+            <a:noFill/>
+          </p:spPr>
+          <p:txBody>
+            <a:bodyPr wrap="square" rtlCol="0">
+              <a:spAutoFit/>
+            </a:bodyPr>
+            <a:lstStyle/>
+            <a:p>
+              <a:r>
+                <a:rPr lang="en-US" sz="1400" dirty="0">
+                  <a:latin typeface="Georgia" panose="02040502050405020303" pitchFamily="18" charset="0"/>
+                </a:rPr>
+                <a:t>   0               1e+6	          2e+6	          3e+6            4e+6</a:t>
+              </a:r>
+            </a:p>
+          </p:txBody>
+        </p:sp>
+        <p:sp>
+          <p:nvSpPr>
+            <p:cNvPr id="99" name="TextBox 98">
+              <a:extLst>
+                <a:ext uri="{FF2B5EF4-FFF2-40B4-BE49-F238E27FC236}">
+                  <a16:creationId xmlns:a16="http://schemas.microsoft.com/office/drawing/2014/main" id="{ECA16B04-96D0-4D14-850B-8E8E872B2FF8}"/>
+                </a:ext>
+              </a:extLst>
+            </p:cNvPr>
+            <p:cNvSpPr txBox="1"/>
+            <p:nvPr/>
+          </p:nvSpPr>
+          <p:spPr>
+            <a:xfrm>
+              <a:off x="23884561" y="4583381"/>
+              <a:ext cx="394127" cy="2693045"/>
+            </a:xfrm>
+            <a:prstGeom prst="rect">
+              <a:avLst/>
+            </a:prstGeom>
+            <a:noFill/>
+          </p:spPr>
+          <p:txBody>
+            <a:bodyPr wrap="square" rtlCol="0">
+              <a:spAutoFit/>
+            </a:bodyPr>
+            <a:lstStyle/>
+            <a:p>
+              <a:r>
+                <a:rPr lang="en-US" sz="1300" dirty="0">
+                  <a:latin typeface="Georgia" panose="02040502050405020303" pitchFamily="18" charset="0"/>
+                </a:rPr>
+                <a:t>70</a:t>
+              </a:r>
+            </a:p>
+            <a:p>
+              <a:endParaRPr lang="en-US" sz="1300" dirty="0">
+                <a:latin typeface="Georgia" panose="02040502050405020303" pitchFamily="18" charset="0"/>
+              </a:endParaRPr>
+            </a:p>
+            <a:p>
+              <a:endParaRPr lang="en-US" sz="1300" dirty="0">
+                <a:latin typeface="Georgia" panose="02040502050405020303" pitchFamily="18" charset="0"/>
+              </a:endParaRPr>
+            </a:p>
+            <a:p>
+              <a:r>
+                <a:rPr lang="en-US" sz="1300" dirty="0">
+                  <a:latin typeface="Georgia" panose="02040502050405020303" pitchFamily="18" charset="0"/>
+                </a:rPr>
+                <a:t>65</a:t>
+              </a:r>
+            </a:p>
+            <a:p>
+              <a:endParaRPr lang="en-US" sz="1300" dirty="0">
+                <a:latin typeface="Georgia" panose="02040502050405020303" pitchFamily="18" charset="0"/>
+              </a:endParaRPr>
+            </a:p>
+            <a:p>
+              <a:endParaRPr lang="en-US" sz="1300" dirty="0">
+                <a:latin typeface="Georgia" panose="02040502050405020303" pitchFamily="18" charset="0"/>
+              </a:endParaRPr>
+            </a:p>
+            <a:p>
+              <a:r>
+                <a:rPr lang="en-US" sz="1300" dirty="0">
+                  <a:latin typeface="Georgia" panose="02040502050405020303" pitchFamily="18" charset="0"/>
+                </a:rPr>
+                <a:t>60</a:t>
+              </a:r>
+            </a:p>
+            <a:p>
+              <a:endParaRPr lang="en-US" sz="1300" dirty="0">
+                <a:latin typeface="Georgia" panose="02040502050405020303" pitchFamily="18" charset="0"/>
+              </a:endParaRPr>
+            </a:p>
+            <a:p>
+              <a:endParaRPr lang="en-US" sz="1300" dirty="0">
+                <a:latin typeface="Georgia" panose="02040502050405020303" pitchFamily="18" charset="0"/>
+              </a:endParaRPr>
+            </a:p>
+            <a:p>
+              <a:r>
+                <a:rPr lang="en-US" sz="1300" dirty="0">
+                  <a:latin typeface="Georgia" panose="02040502050405020303" pitchFamily="18" charset="0"/>
+                </a:rPr>
+                <a:t>55</a:t>
+              </a:r>
+            </a:p>
+            <a:p>
+              <a:endParaRPr lang="en-US" sz="1300" dirty="0">
+                <a:latin typeface="Georgia" panose="02040502050405020303" pitchFamily="18" charset="0"/>
+              </a:endParaRPr>
+            </a:p>
+            <a:p>
+              <a:endParaRPr lang="en-US" sz="1300" dirty="0">
+                <a:latin typeface="Georgia" panose="02040502050405020303" pitchFamily="18" charset="0"/>
+              </a:endParaRPr>
+            </a:p>
+            <a:p>
+              <a:r>
+                <a:rPr lang="en-US" sz="1300" dirty="0">
+                  <a:latin typeface="Georgia" panose="02040502050405020303" pitchFamily="18" charset="0"/>
+                </a:rPr>
+                <a:t>50</a:t>
+              </a:r>
+            </a:p>
+          </p:txBody>
+        </p:sp>
+      </p:grpSp>
+      <p:grpSp>
+        <p:nvGrpSpPr>
+          <p:cNvPr id="33" name="Group 32">
+            <a:extLst>
+              <a:ext uri="{FF2B5EF4-FFF2-40B4-BE49-F238E27FC236}">
+                <a16:creationId xmlns:a16="http://schemas.microsoft.com/office/drawing/2014/main" id="{D2593F3A-67BF-48F9-8495-4B638DE05F92}"/>
+              </a:ext>
+            </a:extLst>
+          </p:cNvPr>
+          <p:cNvGrpSpPr/>
+          <p:nvPr/>
+        </p:nvGrpSpPr>
+        <p:grpSpPr>
+          <a:xfrm>
+            <a:off x="28234098" y="4680131"/>
+            <a:ext cx="4265199" cy="3143033"/>
+            <a:chOff x="28234098" y="4596051"/>
+            <a:chExt cx="4265199" cy="3143033"/>
+          </a:xfrm>
+        </p:grpSpPr>
+        <p:pic>
+          <p:nvPicPr>
+            <p:cNvPr id="30" name="Picture 29" descr="Chart&#10;&#10;Description automatically generated">
+              <a:extLst>
+                <a:ext uri="{FF2B5EF4-FFF2-40B4-BE49-F238E27FC236}">
+                  <a16:creationId xmlns:a16="http://schemas.microsoft.com/office/drawing/2014/main" id="{CF469230-E169-4063-AAE7-24498B5614C1}"/>
+                </a:ext>
+              </a:extLst>
+            </p:cNvPr>
+            <p:cNvPicPr>
+              <a:picLocks noChangeAspect="1"/>
+            </p:cNvPicPr>
+            <p:nvPr/>
+          </p:nvPicPr>
+          <p:blipFill rotWithShape="1">
+            <a:blip r:embed="rId4">
+              <a:extLst>
+                <a:ext uri="{28A0092B-C50C-407E-A947-70E740481C1C}">
+                  <a14:useLocalDpi xmlns:a14="http://schemas.microsoft.com/office/drawing/2010/main" val="0"/>
+                </a:ext>
+              </a:extLst>
+            </a:blip>
+            <a:srcRect l="5082" t="6314" r="13182" b="7847"/>
+            <a:stretch/>
+          </p:blipFill>
+          <p:spPr>
+            <a:xfrm>
+              <a:off x="28538648" y="4596051"/>
+              <a:ext cx="3911418" cy="2900762"/>
+            </a:xfrm>
+            <a:prstGeom prst="rect">
+              <a:avLst/>
+            </a:prstGeom>
+          </p:spPr>
+        </p:pic>
+        <p:sp>
+          <p:nvSpPr>
+            <p:cNvPr id="102" name="TextBox 101">
+              <a:extLst>
+                <a:ext uri="{FF2B5EF4-FFF2-40B4-BE49-F238E27FC236}">
+                  <a16:creationId xmlns:a16="http://schemas.microsoft.com/office/drawing/2014/main" id="{0FA3CB42-4EB3-4CC5-B70B-286160CD9B8B}"/>
+                </a:ext>
+              </a:extLst>
+            </p:cNvPr>
+            <p:cNvSpPr txBox="1"/>
+            <p:nvPr/>
+          </p:nvSpPr>
+          <p:spPr>
+            <a:xfrm>
+              <a:off x="28268994" y="7431307"/>
+              <a:ext cx="4230303" cy="307777"/>
+            </a:xfrm>
+            <a:prstGeom prst="rect">
+              <a:avLst/>
+            </a:prstGeom>
+            <a:noFill/>
+          </p:spPr>
+          <p:txBody>
+            <a:bodyPr wrap="square" rtlCol="0">
+              <a:spAutoFit/>
+            </a:bodyPr>
+            <a:lstStyle/>
+            <a:p>
+              <a:r>
+                <a:rPr lang="en-US" sz="1400" dirty="0">
+                  <a:latin typeface="Georgia" panose="02040502050405020303" pitchFamily="18" charset="0"/>
+                </a:rPr>
+                <a:t>       0              1e+6              2e+6           3e+6         4e+6</a:t>
+              </a:r>
+            </a:p>
+          </p:txBody>
+        </p:sp>
+        <p:sp>
+          <p:nvSpPr>
+            <p:cNvPr id="32" name="TextBox 31">
+              <a:extLst>
+                <a:ext uri="{FF2B5EF4-FFF2-40B4-BE49-F238E27FC236}">
+                  <a16:creationId xmlns:a16="http://schemas.microsoft.com/office/drawing/2014/main" id="{441B4F6A-9DF2-480C-BAA3-1B7471B1E1BE}"/>
+                </a:ext>
+              </a:extLst>
+            </p:cNvPr>
+            <p:cNvSpPr txBox="1"/>
+            <p:nvPr/>
+          </p:nvSpPr>
+          <p:spPr>
+            <a:xfrm flipH="1">
+              <a:off x="28237910" y="4812696"/>
+              <a:ext cx="437690" cy="300082"/>
+            </a:xfrm>
+            <a:prstGeom prst="rect">
+              <a:avLst/>
+            </a:prstGeom>
+            <a:noFill/>
+          </p:spPr>
+          <p:txBody>
+            <a:bodyPr wrap="square" rtlCol="0">
+              <a:spAutoFit/>
+            </a:bodyPr>
+            <a:lstStyle/>
+            <a:p>
+              <a:r>
+                <a:rPr lang="en-US" sz="1300" dirty="0">
+                  <a:latin typeface="Georgia" panose="02040502050405020303" pitchFamily="18" charset="0"/>
+                </a:rPr>
+                <a:t>65</a:t>
+              </a:r>
+            </a:p>
+          </p:txBody>
+        </p:sp>
+        <p:sp>
+          <p:nvSpPr>
+            <p:cNvPr id="108" name="TextBox 107">
+              <a:extLst>
+                <a:ext uri="{FF2B5EF4-FFF2-40B4-BE49-F238E27FC236}">
+                  <a16:creationId xmlns:a16="http://schemas.microsoft.com/office/drawing/2014/main" id="{90E88722-0416-4591-A16F-4A3A2578D08C}"/>
+                </a:ext>
+              </a:extLst>
+            </p:cNvPr>
+            <p:cNvSpPr txBox="1"/>
+            <p:nvPr/>
+          </p:nvSpPr>
+          <p:spPr>
+            <a:xfrm flipH="1">
+              <a:off x="28237910" y="5497320"/>
+              <a:ext cx="437690" cy="300082"/>
+            </a:xfrm>
+            <a:prstGeom prst="rect">
+              <a:avLst/>
+            </a:prstGeom>
+            <a:noFill/>
+          </p:spPr>
+          <p:txBody>
+            <a:bodyPr wrap="square" rtlCol="0">
+              <a:spAutoFit/>
+            </a:bodyPr>
+            <a:lstStyle/>
+            <a:p>
+              <a:r>
+                <a:rPr lang="en-US" sz="1300" dirty="0">
+                  <a:latin typeface="Georgia" panose="02040502050405020303" pitchFamily="18" charset="0"/>
+                </a:rPr>
+                <a:t>60</a:t>
+              </a:r>
+            </a:p>
+          </p:txBody>
+        </p:sp>
+        <p:sp>
+          <p:nvSpPr>
+            <p:cNvPr id="109" name="TextBox 108">
+              <a:extLst>
+                <a:ext uri="{FF2B5EF4-FFF2-40B4-BE49-F238E27FC236}">
+                  <a16:creationId xmlns:a16="http://schemas.microsoft.com/office/drawing/2014/main" id="{A5591FB8-45C9-4FCB-A451-3FE4B46E6709}"/>
+                </a:ext>
+              </a:extLst>
+            </p:cNvPr>
+            <p:cNvSpPr txBox="1"/>
+            <p:nvPr/>
+          </p:nvSpPr>
+          <p:spPr>
+            <a:xfrm flipH="1">
+              <a:off x="28234098" y="6119540"/>
+              <a:ext cx="437690" cy="300082"/>
+            </a:xfrm>
+            <a:prstGeom prst="rect">
+              <a:avLst/>
+            </a:prstGeom>
+            <a:noFill/>
+          </p:spPr>
+          <p:txBody>
+            <a:bodyPr wrap="square" rtlCol="0">
+              <a:spAutoFit/>
+            </a:bodyPr>
+            <a:lstStyle/>
+            <a:p>
+              <a:r>
+                <a:rPr lang="en-US" sz="1300" dirty="0">
+                  <a:latin typeface="Georgia" panose="02040502050405020303" pitchFamily="18" charset="0"/>
+                </a:rPr>
+                <a:t>55</a:t>
+              </a:r>
+            </a:p>
+          </p:txBody>
+        </p:sp>
+        <p:sp>
+          <p:nvSpPr>
+            <p:cNvPr id="110" name="TextBox 109">
+              <a:extLst>
+                <a:ext uri="{FF2B5EF4-FFF2-40B4-BE49-F238E27FC236}">
+                  <a16:creationId xmlns:a16="http://schemas.microsoft.com/office/drawing/2014/main" id="{8F9A9D51-9422-4755-AE92-730F21A48DFE}"/>
+                </a:ext>
+              </a:extLst>
+            </p:cNvPr>
+            <p:cNvSpPr txBox="1"/>
+            <p:nvPr/>
+          </p:nvSpPr>
+          <p:spPr>
+            <a:xfrm flipH="1">
+              <a:off x="28234098" y="6820572"/>
+              <a:ext cx="437690" cy="300082"/>
+            </a:xfrm>
+            <a:prstGeom prst="rect">
+              <a:avLst/>
+            </a:prstGeom>
+            <a:noFill/>
+          </p:spPr>
+          <p:txBody>
+            <a:bodyPr wrap="square" rtlCol="0">
+              <a:spAutoFit/>
+            </a:bodyPr>
+            <a:lstStyle/>
+            <a:p>
+              <a:r>
+                <a:rPr lang="en-US" sz="1300" dirty="0">
+                  <a:latin typeface="Georgia" panose="02040502050405020303" pitchFamily="18" charset="0"/>
+                </a:rPr>
+                <a:t>50</a:t>
+              </a:r>
+            </a:p>
+          </p:txBody>
+        </p:sp>
+      </p:grpSp>
+      <p:grpSp>
+        <p:nvGrpSpPr>
+          <p:cNvPr id="37" name="Group 36">
+            <a:extLst>
+              <a:ext uri="{FF2B5EF4-FFF2-40B4-BE49-F238E27FC236}">
+                <a16:creationId xmlns:a16="http://schemas.microsoft.com/office/drawing/2014/main" id="{AE22949E-D825-48A1-8966-85DC7BCEFE7A}"/>
+              </a:ext>
+            </a:extLst>
+          </p:cNvPr>
+          <p:cNvGrpSpPr/>
+          <p:nvPr/>
+        </p:nvGrpSpPr>
+        <p:grpSpPr>
+          <a:xfrm>
+            <a:off x="31000893" y="6685772"/>
+            <a:ext cx="1707179" cy="738664"/>
+            <a:chOff x="31124545" y="6601281"/>
+            <a:chExt cx="1707179" cy="738664"/>
+          </a:xfrm>
+        </p:grpSpPr>
+        <p:pic>
+          <p:nvPicPr>
+            <p:cNvPr id="116" name="Picture 115">
+              <a:extLst>
+                <a:ext uri="{FF2B5EF4-FFF2-40B4-BE49-F238E27FC236}">
+                  <a16:creationId xmlns:a16="http://schemas.microsoft.com/office/drawing/2014/main" id="{A9FE37A1-4EB1-4A51-AF41-A6940A8299CC}"/>
+                </a:ext>
+              </a:extLst>
+            </p:cNvPr>
+            <p:cNvPicPr>
+              <a:picLocks noChangeAspect="1"/>
+            </p:cNvPicPr>
+            <p:nvPr/>
+          </p:nvPicPr>
+          <p:blipFill rotWithShape="1">
+            <a:blip r:embed="rId4">
+              <a:extLst>
+                <a:ext uri="{28A0092B-C50C-407E-A947-70E740481C1C}">
+                  <a14:useLocalDpi xmlns:a14="http://schemas.microsoft.com/office/drawing/2010/main" val="0"/>
+                </a:ext>
+              </a:extLst>
+            </a:blip>
+            <a:srcRect l="88573" t="44195" r="7549" b="41832"/>
+            <a:stretch/>
+          </p:blipFill>
+          <p:spPr>
+            <a:xfrm>
+              <a:off x="31124545" y="6659813"/>
+              <a:ext cx="291210" cy="669169"/>
+            </a:xfrm>
+            <a:prstGeom prst="rect">
+              <a:avLst/>
+            </a:prstGeom>
+          </p:spPr>
+        </p:pic>
+        <p:sp>
+          <p:nvSpPr>
+            <p:cNvPr id="36" name="TextBox 35">
+              <a:extLst>
+                <a:ext uri="{FF2B5EF4-FFF2-40B4-BE49-F238E27FC236}">
+                  <a16:creationId xmlns:a16="http://schemas.microsoft.com/office/drawing/2014/main" id="{1A7D4A4E-AD85-4B7E-BDEF-F2B2BD993DA4}"/>
+                </a:ext>
+              </a:extLst>
+            </p:cNvPr>
+            <p:cNvSpPr txBox="1"/>
+            <p:nvPr/>
+          </p:nvSpPr>
+          <p:spPr>
+            <a:xfrm>
+              <a:off x="31334904" y="6601281"/>
+              <a:ext cx="1496820" cy="738664"/>
+            </a:xfrm>
+            <a:prstGeom prst="rect">
+              <a:avLst/>
+            </a:prstGeom>
+            <a:noFill/>
+          </p:spPr>
+          <p:txBody>
+            <a:bodyPr wrap="square" rtlCol="0">
+              <a:spAutoFit/>
+            </a:bodyPr>
+            <a:lstStyle/>
+            <a:p>
+              <a:r>
+                <a:rPr lang="en-US" sz="1400" dirty="0" err="1">
+                  <a:latin typeface="Georgia" panose="02040502050405020303" pitchFamily="18" charset="0"/>
+                </a:rPr>
+                <a:t>Bidaf</a:t>
+              </a:r>
+              <a:r>
+                <a:rPr lang="en-US" sz="1400" dirty="0">
+                  <a:latin typeface="Georgia" panose="02040502050405020303" pitchFamily="18" charset="0"/>
+                </a:rPr>
+                <a:t> w/ Char</a:t>
+              </a:r>
+            </a:p>
+            <a:p>
+              <a:r>
+                <a:rPr lang="en-US" sz="1400" dirty="0">
+                  <a:latin typeface="Georgia" panose="02040502050405020303" pitchFamily="18" charset="0"/>
+                </a:rPr>
+                <a:t>Baseline</a:t>
+              </a:r>
+            </a:p>
+            <a:p>
+              <a:r>
+                <a:rPr lang="en-US" sz="1400" dirty="0" err="1">
+                  <a:latin typeface="Georgia" panose="02040502050405020303" pitchFamily="18" charset="0"/>
+                </a:rPr>
+                <a:t>QANet</a:t>
+              </a:r>
+              <a:endParaRPr lang="en-US" sz="1400" dirty="0">
+                <a:latin typeface="Georgia" panose="02040502050405020303" pitchFamily="18" charset="0"/>
+              </a:endParaRPr>
+            </a:p>
+          </p:txBody>
+        </p:sp>
+      </p:grpSp>
+      <p:graphicFrame>
+        <p:nvGraphicFramePr>
+          <p:cNvPr id="38" name="Table 38">
+            <a:extLst>
+              <a:ext uri="{FF2B5EF4-FFF2-40B4-BE49-F238E27FC236}">
+                <a16:creationId xmlns:a16="http://schemas.microsoft.com/office/drawing/2014/main" id="{347E9436-430B-4477-8A62-203F3E03D364}"/>
+              </a:ext>
+            </a:extLst>
+          </p:cNvPr>
+          <p:cNvGraphicFramePr>
+            <a:graphicFrameLocks noGrp="1"/>
+          </p:cNvGraphicFramePr>
+          <p:nvPr>
+            <p:extLst>
+              <p:ext uri="{D42A27DB-BD31-4B8C-83A1-F6EECF244321}">
+                <p14:modId xmlns:p14="http://schemas.microsoft.com/office/powerpoint/2010/main" val="3053323528"/>
+              </p:ext>
+            </p:extLst>
+          </p:nvPr>
+        </p:nvGraphicFramePr>
+        <p:xfrm>
+          <a:off x="9622220" y="4513523"/>
+          <a:ext cx="7570076" cy="4319016"/>
+        </p:xfrm>
+        <a:graphic>
+          <a:graphicData uri="http://schemas.openxmlformats.org/drawingml/2006/table">
+            <a:tbl>
+              <a:tblPr firstRow="1" bandRow="1">
+                <a:tableStyleId>{5940675A-B579-460E-94D1-54222C63F5DA}</a:tableStyleId>
+              </a:tblPr>
+              <a:tblGrid>
+                <a:gridCol w="2413438">
+                  <a:extLst>
+                    <a:ext uri="{9D8B030D-6E8A-4147-A177-3AD203B41FA5}">
+                      <a16:colId xmlns:a16="http://schemas.microsoft.com/office/drawing/2014/main" val="941148619"/>
+                    </a:ext>
+                  </a:extLst>
+                </a:gridCol>
+                <a:gridCol w="2413438">
+                  <a:extLst>
+                    <a:ext uri="{9D8B030D-6E8A-4147-A177-3AD203B41FA5}">
+                      <a16:colId xmlns:a16="http://schemas.microsoft.com/office/drawing/2014/main" val="2557878258"/>
+                    </a:ext>
+                  </a:extLst>
+                </a:gridCol>
+                <a:gridCol w="1371600">
+                  <a:extLst>
+                    <a:ext uri="{9D8B030D-6E8A-4147-A177-3AD203B41FA5}">
+                      <a16:colId xmlns:a16="http://schemas.microsoft.com/office/drawing/2014/main" val="640481716"/>
+                    </a:ext>
+                  </a:extLst>
+                </a:gridCol>
+                <a:gridCol w="1371600">
+                  <a:extLst>
+                    <a:ext uri="{9D8B030D-6E8A-4147-A177-3AD203B41FA5}">
+                      <a16:colId xmlns:a16="http://schemas.microsoft.com/office/drawing/2014/main" val="3293780260"/>
+                    </a:ext>
+                  </a:extLst>
+                </a:gridCol>
+              </a:tblGrid>
+              <a:tr h="429768">
+                <a:tc>
+                  <a:txBody>
+                    <a:bodyPr/>
+                    <a:lstStyle/>
+                    <a:p>
+                      <a:r>
+                        <a:rPr lang="en-US" sz="2200" dirty="0">
+                          <a:latin typeface="Georgia" panose="02040502050405020303" pitchFamily="18" charset="0"/>
+                        </a:rPr>
+                        <a:t>Tuned Parameter</a:t>
+                      </a:r>
+                    </a:p>
+                  </a:txBody>
+                  <a:tcPr>
+                    <a:solidFill>
+                      <a:srgbClr val="D3DEF1"/>
+                    </a:solidFill>
+                  </a:tcPr>
+                </a:tc>
+                <a:tc>
+                  <a:txBody>
+                    <a:bodyPr/>
+                    <a:lstStyle/>
+                    <a:p>
+                      <a:r>
+                        <a:rPr lang="en-US" sz="2200" dirty="0">
+                          <a:latin typeface="Georgia" panose="02040502050405020303" pitchFamily="18" charset="0"/>
+                        </a:rPr>
+                        <a:t>Value</a:t>
+                      </a:r>
+                    </a:p>
+                  </a:txBody>
+                  <a:tcPr>
+                    <a:solidFill>
+                      <a:srgbClr val="D3DEF1"/>
+                    </a:solidFill>
+                  </a:tcPr>
+                </a:tc>
+                <a:tc>
+                  <a:txBody>
+                    <a:bodyPr/>
+                    <a:lstStyle/>
+                    <a:p>
+                      <a:r>
+                        <a:rPr lang="en-US" sz="2200" dirty="0">
+                          <a:latin typeface="Georgia" panose="02040502050405020303" pitchFamily="18" charset="0"/>
+                        </a:rPr>
+                        <a:t>F1</a:t>
+                      </a:r>
+                    </a:p>
+                  </a:txBody>
+                  <a:tcPr>
+                    <a:solidFill>
+                      <a:srgbClr val="D3DEF1"/>
+                    </a:solidFill>
+                  </a:tcPr>
+                </a:tc>
+                <a:tc>
+                  <a:txBody>
+                    <a:bodyPr/>
+                    <a:lstStyle/>
+                    <a:p>
+                      <a:r>
+                        <a:rPr lang="en-US" sz="2200" dirty="0">
+                          <a:latin typeface="Georgia" panose="02040502050405020303" pitchFamily="18" charset="0"/>
+                        </a:rPr>
+                        <a:t>EM</a:t>
+                      </a:r>
+                    </a:p>
+                  </a:txBody>
+                  <a:tcPr>
+                    <a:solidFill>
+                      <a:srgbClr val="D3DEF1"/>
+                    </a:solidFill>
+                  </a:tcPr>
+                </a:tc>
+                <a:extLst>
+                  <a:ext uri="{0D108BD9-81ED-4DB2-BD59-A6C34878D82A}">
+                    <a16:rowId xmlns:a16="http://schemas.microsoft.com/office/drawing/2014/main" val="1360807951"/>
+                  </a:ext>
+                </a:extLst>
+              </a:tr>
+              <a:tr h="429768">
+                <a:tc rowSpan="3">
+                  <a:txBody>
+                    <a:bodyPr/>
+                    <a:lstStyle/>
+                    <a:p>
+                      <a:r>
+                        <a:rPr lang="en-US" sz="2200" dirty="0">
+                          <a:latin typeface="Georgia" panose="02040502050405020303" pitchFamily="18" charset="0"/>
+                        </a:rPr>
+                        <a:t>Learning Rate</a:t>
+                      </a:r>
+                    </a:p>
+                  </a:txBody>
+                  <a:tcPr>
+                    <a:solidFill>
+                      <a:srgbClr val="D3DEF1"/>
+                    </a:solidFill>
+                  </a:tcPr>
+                </a:tc>
+                <a:tc>
+                  <a:txBody>
+                    <a:bodyPr/>
+                    <a:lstStyle/>
+                    <a:p>
+                      <a:r>
+                        <a:rPr lang="en-US" sz="2200" dirty="0">
+                          <a:latin typeface="Georgia" panose="02040502050405020303" pitchFamily="18" charset="0"/>
+                        </a:rPr>
+                        <a:t>0.0005</a:t>
+                      </a:r>
+                    </a:p>
+                  </a:txBody>
+                  <a:tcPr/>
+                </a:tc>
+                <a:tc>
+                  <a:txBody>
+                    <a:bodyPr/>
+                    <a:lstStyle/>
+                    <a:p>
+                      <a:endParaRPr lang="en-US" sz="2200" dirty="0">
+                        <a:latin typeface="Georgia" panose="02040502050405020303" pitchFamily="18" charset="0"/>
+                      </a:endParaRPr>
+                    </a:p>
+                  </a:txBody>
+                  <a:tcPr/>
+                </a:tc>
+                <a:tc>
+                  <a:txBody>
+                    <a:bodyPr/>
+                    <a:lstStyle/>
+                    <a:p>
+                      <a:endParaRPr lang="en-US" sz="2200">
+                        <a:latin typeface="Georgia" panose="02040502050405020303" pitchFamily="18" charset="0"/>
+                      </a:endParaRPr>
+                    </a:p>
+                  </a:txBody>
+                  <a:tcPr/>
+                </a:tc>
+                <a:extLst>
+                  <a:ext uri="{0D108BD9-81ED-4DB2-BD59-A6C34878D82A}">
+                    <a16:rowId xmlns:a16="http://schemas.microsoft.com/office/drawing/2014/main" val="511714526"/>
+                  </a:ext>
+                </a:extLst>
+              </a:tr>
+              <a:tr h="429768">
+                <a:tc vMerge="1">
+                  <a:txBody>
+                    <a:bodyPr/>
+                    <a:lstStyle/>
+                    <a:p>
+                      <a:endParaRPr lang="en-US" sz="2200" dirty="0">
+                        <a:latin typeface="Georgia" panose="02040502050405020303" pitchFamily="18" charset="0"/>
+                      </a:endParaRPr>
+                    </a:p>
+                  </a:txBody>
+                  <a:tcPr/>
+                </a:tc>
+                <a:tc>
+                  <a:txBody>
+                    <a:bodyPr/>
+                    <a:lstStyle/>
+                    <a:p>
+                      <a:r>
+                        <a:rPr lang="en-US" sz="2200" b="1" dirty="0">
+                          <a:latin typeface="Georgia" panose="02040502050405020303" pitchFamily="18" charset="0"/>
+                        </a:rPr>
+                        <a:t>0.001</a:t>
+                      </a:r>
+                    </a:p>
+                  </a:txBody>
+                  <a:tcPr/>
+                </a:tc>
+                <a:tc>
+                  <a:txBody>
+                    <a:bodyPr/>
+                    <a:lstStyle/>
+                    <a:p>
+                      <a:endParaRPr lang="en-US" sz="2200" dirty="0">
+                        <a:latin typeface="Georgia" panose="02040502050405020303" pitchFamily="18" charset="0"/>
+                      </a:endParaRPr>
+                    </a:p>
+                  </a:txBody>
+                  <a:tcPr/>
+                </a:tc>
+                <a:tc>
+                  <a:txBody>
+                    <a:bodyPr/>
+                    <a:lstStyle/>
+                    <a:p>
+                      <a:endParaRPr lang="en-US" sz="2200">
+                        <a:latin typeface="Georgia" panose="02040502050405020303" pitchFamily="18" charset="0"/>
+                      </a:endParaRPr>
+                    </a:p>
+                  </a:txBody>
+                  <a:tcPr/>
+                </a:tc>
+                <a:extLst>
+                  <a:ext uri="{0D108BD9-81ED-4DB2-BD59-A6C34878D82A}">
+                    <a16:rowId xmlns:a16="http://schemas.microsoft.com/office/drawing/2014/main" val="3450800244"/>
+                  </a:ext>
+                </a:extLst>
+              </a:tr>
+              <a:tr h="429768">
+                <a:tc vMerge="1">
+                  <a:txBody>
+                    <a:bodyPr/>
+                    <a:lstStyle/>
+                    <a:p>
+                      <a:endParaRPr lang="en-US" sz="2200" dirty="0">
+                        <a:latin typeface="Georgia" panose="02040502050405020303" pitchFamily="18" charset="0"/>
+                      </a:endParaRPr>
+                    </a:p>
+                  </a:txBody>
+                  <a:tcPr/>
+                </a:tc>
+                <a:tc>
+                  <a:txBody>
+                    <a:bodyPr/>
+                    <a:lstStyle/>
+                    <a:p>
+                      <a:r>
+                        <a:rPr lang="en-US" sz="2200" dirty="0">
+                          <a:latin typeface="Georgia" panose="02040502050405020303" pitchFamily="18" charset="0"/>
+                        </a:rPr>
+                        <a:t>0.005</a:t>
+                      </a:r>
+                    </a:p>
+                  </a:txBody>
+                  <a:tcPr/>
+                </a:tc>
+                <a:tc>
+                  <a:txBody>
+                    <a:bodyPr/>
+                    <a:lstStyle/>
+                    <a:p>
+                      <a:endParaRPr lang="en-US" sz="2200" dirty="0">
+                        <a:latin typeface="Georgia" panose="02040502050405020303" pitchFamily="18" charset="0"/>
+                      </a:endParaRPr>
+                    </a:p>
+                  </a:txBody>
+                  <a:tcPr/>
+                </a:tc>
+                <a:tc>
+                  <a:txBody>
+                    <a:bodyPr/>
+                    <a:lstStyle/>
+                    <a:p>
+                      <a:endParaRPr lang="en-US" sz="2200" dirty="0">
+                        <a:latin typeface="Georgia" panose="02040502050405020303" pitchFamily="18" charset="0"/>
+                      </a:endParaRPr>
+                    </a:p>
+                  </a:txBody>
+                  <a:tcPr/>
+                </a:tc>
+                <a:extLst>
+                  <a:ext uri="{0D108BD9-81ED-4DB2-BD59-A6C34878D82A}">
+                    <a16:rowId xmlns:a16="http://schemas.microsoft.com/office/drawing/2014/main" val="2785863823"/>
+                  </a:ext>
+                </a:extLst>
+              </a:tr>
+              <a:tr h="429768">
+                <a:tc rowSpan="3">
+                  <a:txBody>
+                    <a:bodyPr/>
+                    <a:lstStyle/>
+                    <a:p>
+                      <a:r>
+                        <a:rPr lang="en-US" sz="2200" dirty="0">
+                          <a:latin typeface="Georgia" panose="02040502050405020303" pitchFamily="18" charset="0"/>
+                        </a:rPr>
+                        <a:t>Dropout Prob</a:t>
+                      </a:r>
+                    </a:p>
+                  </a:txBody>
+                  <a:tcPr>
+                    <a:solidFill>
+                      <a:srgbClr val="D3DEF1"/>
+                    </a:solidFill>
+                  </a:tcPr>
+                </a:tc>
+                <a:tc>
+                  <a:txBody>
+                    <a:bodyPr/>
+                    <a:lstStyle/>
+                    <a:p>
+                      <a:r>
+                        <a:rPr lang="en-US" sz="2200" dirty="0">
+                          <a:latin typeface="Georgia" panose="02040502050405020303" pitchFamily="18" charset="0"/>
+                        </a:rPr>
+                        <a:t>0.05</a:t>
+                      </a:r>
+                    </a:p>
+                  </a:txBody>
+                  <a:tcPr/>
+                </a:tc>
+                <a:tc>
+                  <a:txBody>
+                    <a:bodyPr/>
+                    <a:lstStyle/>
+                    <a:p>
+                      <a:r>
+                        <a:rPr lang="en-US" sz="2200" dirty="0">
+                          <a:latin typeface="Georgia" panose="02040502050405020303" pitchFamily="18" charset="0"/>
+                        </a:rPr>
+                        <a:t>69.62</a:t>
+                      </a:r>
+                    </a:p>
+                  </a:txBody>
+                  <a:tcPr/>
+                </a:tc>
+                <a:tc>
+                  <a:txBody>
+                    <a:bodyPr/>
+                    <a:lstStyle/>
+                    <a:p>
+                      <a:r>
+                        <a:rPr lang="en-US" sz="2200" dirty="0">
+                          <a:latin typeface="Georgia" panose="02040502050405020303" pitchFamily="18" charset="0"/>
+                        </a:rPr>
+                        <a:t>65.89</a:t>
+                      </a:r>
+                    </a:p>
+                  </a:txBody>
+                  <a:tcPr/>
+                </a:tc>
+                <a:extLst>
+                  <a:ext uri="{0D108BD9-81ED-4DB2-BD59-A6C34878D82A}">
+                    <a16:rowId xmlns:a16="http://schemas.microsoft.com/office/drawing/2014/main" val="1669451286"/>
+                  </a:ext>
+                </a:extLst>
+              </a:tr>
+              <a:tr h="429768">
+                <a:tc vMerge="1">
+                  <a:txBody>
+                    <a:bodyPr/>
+                    <a:lstStyle/>
+                    <a:p>
+                      <a:endParaRPr lang="en-US" sz="2200" dirty="0">
+                        <a:latin typeface="Georgia" panose="02040502050405020303" pitchFamily="18" charset="0"/>
+                      </a:endParaRPr>
+                    </a:p>
+                  </a:txBody>
+                  <a:tcPr/>
+                </a:tc>
+                <a:tc>
+                  <a:txBody>
+                    <a:bodyPr/>
+                    <a:lstStyle/>
+                    <a:p>
+                      <a:r>
+                        <a:rPr lang="en-US" sz="2200" b="1" dirty="0">
+                          <a:latin typeface="Georgia" panose="02040502050405020303" pitchFamily="18" charset="0"/>
+                        </a:rPr>
+                        <a:t>0.1</a:t>
+                      </a:r>
+                    </a:p>
+                  </a:txBody>
+                  <a:tcPr/>
+                </a:tc>
+                <a:tc>
+                  <a:txBody>
+                    <a:bodyPr/>
+                    <a:lstStyle/>
+                    <a:p>
+                      <a:r>
+                        <a:rPr lang="en-US" sz="2200" b="1" dirty="0">
+                          <a:latin typeface="Georgia" panose="02040502050405020303" pitchFamily="18" charset="0"/>
+                        </a:rPr>
+                        <a:t>70.17</a:t>
+                      </a:r>
+                    </a:p>
+                  </a:txBody>
+                  <a:tcPr/>
+                </a:tc>
+                <a:tc>
+                  <a:txBody>
+                    <a:bodyPr/>
+                    <a:lstStyle/>
+                    <a:p>
+                      <a:r>
+                        <a:rPr lang="en-US" sz="2200" b="1" dirty="0">
+                          <a:latin typeface="Georgia" panose="02040502050405020303" pitchFamily="18" charset="0"/>
+                        </a:rPr>
+                        <a:t>66.81</a:t>
+                      </a:r>
+                    </a:p>
+                  </a:txBody>
+                  <a:tcPr/>
+                </a:tc>
+                <a:extLst>
+                  <a:ext uri="{0D108BD9-81ED-4DB2-BD59-A6C34878D82A}">
+                    <a16:rowId xmlns:a16="http://schemas.microsoft.com/office/drawing/2014/main" val="3412200859"/>
+                  </a:ext>
+                </a:extLst>
+              </a:tr>
+              <a:tr h="429768">
+                <a:tc vMerge="1">
+                  <a:txBody>
+                    <a:bodyPr/>
+                    <a:lstStyle/>
+                    <a:p>
+                      <a:endParaRPr lang="en-US" sz="2200" dirty="0">
+                        <a:latin typeface="Georgia" panose="02040502050405020303" pitchFamily="18" charset="0"/>
+                      </a:endParaRPr>
+                    </a:p>
+                  </a:txBody>
+                  <a:tcPr/>
+                </a:tc>
+                <a:tc>
+                  <a:txBody>
+                    <a:bodyPr/>
+                    <a:lstStyle/>
+                    <a:p>
+                      <a:r>
+                        <a:rPr lang="en-US" sz="2200" dirty="0">
+                          <a:latin typeface="Georgia" panose="02040502050405020303" pitchFamily="18" charset="0"/>
+                        </a:rPr>
+                        <a:t>0.2</a:t>
+                      </a:r>
+                    </a:p>
+                  </a:txBody>
+                  <a:tcPr/>
+                </a:tc>
+                <a:tc>
+                  <a:txBody>
+                    <a:bodyPr/>
+                    <a:lstStyle/>
+                    <a:p>
+                      <a:r>
+                        <a:rPr lang="en-US" sz="2200" dirty="0">
+                          <a:latin typeface="Georgia" panose="02040502050405020303" pitchFamily="18" charset="0"/>
+                        </a:rPr>
+                        <a:t>69.17</a:t>
+                      </a:r>
+                    </a:p>
+                  </a:txBody>
+                  <a:tcPr/>
+                </a:tc>
+                <a:tc>
+                  <a:txBody>
+                    <a:bodyPr/>
+                    <a:lstStyle/>
+                    <a:p>
+                      <a:r>
+                        <a:rPr lang="en-US" sz="2200" dirty="0">
+                          <a:latin typeface="Georgia" panose="02040502050405020303" pitchFamily="18" charset="0"/>
+                        </a:rPr>
+                        <a:t>65.82</a:t>
+                      </a:r>
+                    </a:p>
+                  </a:txBody>
+                  <a:tcPr/>
+                </a:tc>
+                <a:extLst>
+                  <a:ext uri="{0D108BD9-81ED-4DB2-BD59-A6C34878D82A}">
+                    <a16:rowId xmlns:a16="http://schemas.microsoft.com/office/drawing/2014/main" val="3229218138"/>
+                  </a:ext>
+                </a:extLst>
+              </a:tr>
+              <a:tr h="429768">
+                <a:tc rowSpan="3">
+                  <a:txBody>
+                    <a:bodyPr/>
+                    <a:lstStyle/>
+                    <a:p>
+                      <a:r>
+                        <a:rPr lang="en-US" sz="2200" dirty="0">
+                          <a:latin typeface="Georgia" panose="02040502050405020303" pitchFamily="18" charset="0"/>
+                        </a:rPr>
+                        <a:t>B</a:t>
+                      </a:r>
+                      <a:r>
+                        <a:rPr lang="en-US" altLang="zh-CN" sz="2200" dirty="0">
+                          <a:latin typeface="Georgia" panose="02040502050405020303" pitchFamily="18" charset="0"/>
+                        </a:rPr>
+                        <a:t>atch size ~ # Repetitions </a:t>
+                      </a:r>
+                      <a:r>
+                        <a:rPr lang="en-US" altLang="zh-CN" sz="1800" dirty="0">
+                          <a:latin typeface="Georgia" panose="02040502050405020303" pitchFamily="18" charset="0"/>
+                        </a:rPr>
+                        <a:t>(of </a:t>
+                      </a:r>
+                      <a:r>
+                        <a:rPr lang="en-US" altLang="zh-CN" sz="1800" dirty="0" err="1">
+                          <a:latin typeface="Georgia" panose="02040502050405020303" pitchFamily="18" charset="0"/>
+                        </a:rPr>
+                        <a:t>Convs</a:t>
+                      </a:r>
+                      <a:r>
+                        <a:rPr lang="en-US" altLang="zh-CN" sz="1800" dirty="0">
+                          <a:latin typeface="Georgia" panose="02040502050405020303" pitchFamily="18" charset="0"/>
+                        </a:rPr>
+                        <a:t> in an encoder block,</a:t>
+                      </a:r>
+                      <a:r>
+                        <a:rPr lang="zh-CN" altLang="en-US" sz="1800" dirty="0">
+                          <a:latin typeface="Georgia" panose="02040502050405020303" pitchFamily="18" charset="0"/>
+                        </a:rPr>
+                        <a:t> </a:t>
+                      </a:r>
+                      <a:r>
+                        <a:rPr lang="en-US" altLang="zh-CN" sz="1800" dirty="0">
+                          <a:latin typeface="Georgia" panose="02040502050405020303" pitchFamily="18" charset="0"/>
+                        </a:rPr>
+                        <a:t>see</a:t>
+                      </a:r>
+                      <a:r>
+                        <a:rPr lang="zh-CN" altLang="en-US" sz="1800" dirty="0">
+                          <a:latin typeface="Georgia" panose="02040502050405020303" pitchFamily="18" charset="0"/>
+                        </a:rPr>
+                        <a:t> </a:t>
+                      </a:r>
+                      <a:r>
+                        <a:rPr lang="en-US" altLang="zh-CN" sz="1800" dirty="0">
+                          <a:latin typeface="Georgia" panose="02040502050405020303" pitchFamily="18" charset="0"/>
+                        </a:rPr>
+                        <a:t>fig. 1)</a:t>
+                      </a:r>
+                      <a:endParaRPr lang="en-US" sz="1800" dirty="0">
+                        <a:latin typeface="Georgia" panose="02040502050405020303" pitchFamily="18" charset="0"/>
+                      </a:endParaRPr>
+                    </a:p>
+                  </a:txBody>
+                  <a:tcPr>
+                    <a:solidFill>
+                      <a:srgbClr val="D3DEF1"/>
+                    </a:solidFill>
+                  </a:tcPr>
+                </a:tc>
+                <a:tc>
+                  <a:txBody>
+                    <a:bodyPr/>
+                    <a:lstStyle/>
+                    <a:p>
+                      <a:r>
+                        <a:rPr lang="en-US" sz="2200" dirty="0">
+                          <a:latin typeface="Georgia" panose="02040502050405020303" pitchFamily="18" charset="0"/>
+                        </a:rPr>
+                        <a:t>#Rep = 7, B = 30</a:t>
+                      </a:r>
+                    </a:p>
+                  </a:txBody>
+                  <a:tcPr/>
+                </a:tc>
+                <a:tc>
+                  <a:txBody>
+                    <a:bodyPr/>
+                    <a:lstStyle/>
+                    <a:p>
+                      <a:endParaRPr lang="en-US" sz="2200" dirty="0">
+                        <a:latin typeface="Georgia" panose="02040502050405020303" pitchFamily="18" charset="0"/>
+                      </a:endParaRPr>
+                    </a:p>
+                  </a:txBody>
+                  <a:tcPr/>
+                </a:tc>
+                <a:tc>
+                  <a:txBody>
+                    <a:bodyPr/>
+                    <a:lstStyle/>
+                    <a:p>
+                      <a:endParaRPr lang="en-US" sz="2200" dirty="0">
+                        <a:latin typeface="Georgia" panose="02040502050405020303" pitchFamily="18" charset="0"/>
+                      </a:endParaRPr>
+                    </a:p>
+                  </a:txBody>
+                  <a:tcPr/>
+                </a:tc>
+                <a:extLst>
+                  <a:ext uri="{0D108BD9-81ED-4DB2-BD59-A6C34878D82A}">
+                    <a16:rowId xmlns:a16="http://schemas.microsoft.com/office/drawing/2014/main" val="1970475897"/>
+                  </a:ext>
+                </a:extLst>
+              </a:tr>
+              <a:tr h="429768">
+                <a:tc vMerge="1">
+                  <a:txBody>
+                    <a:bodyPr/>
+                    <a:lstStyle/>
+                    <a:p>
+                      <a:endParaRPr lang="en-US" sz="2200" dirty="0">
+                        <a:latin typeface="Georgia" panose="02040502050405020303" pitchFamily="18" charset="0"/>
+                      </a:endParaRPr>
+                    </a:p>
+                  </a:txBody>
+                  <a:tcPr/>
+                </a:tc>
+                <a:tc>
+                  <a:txBody>
+                    <a:bodyPr/>
+                    <a:lstStyle/>
+                    <a:p>
+                      <a:r>
+                        <a:rPr lang="en-US" sz="2200" dirty="0">
+                          <a:latin typeface="Georgia" panose="02040502050405020303" pitchFamily="18" charset="0"/>
+                        </a:rPr>
+                        <a:t>#Rep = 5, B = 40</a:t>
+                      </a:r>
+                    </a:p>
+                  </a:txBody>
+                  <a:tcPr/>
+                </a:tc>
+                <a:tc>
+                  <a:txBody>
+                    <a:bodyPr/>
+                    <a:lstStyle/>
+                    <a:p>
+                      <a:endParaRPr lang="en-US" sz="2200" dirty="0">
+                        <a:latin typeface="Georgia" panose="02040502050405020303" pitchFamily="18" charset="0"/>
+                      </a:endParaRPr>
+                    </a:p>
+                  </a:txBody>
+                  <a:tcPr/>
+                </a:tc>
+                <a:tc>
+                  <a:txBody>
+                    <a:bodyPr/>
+                    <a:lstStyle/>
+                    <a:p>
+                      <a:endParaRPr lang="en-US" sz="2200" dirty="0">
+                        <a:latin typeface="Georgia" panose="02040502050405020303" pitchFamily="18" charset="0"/>
+                      </a:endParaRPr>
+                    </a:p>
+                  </a:txBody>
+                  <a:tcPr/>
+                </a:tc>
+                <a:extLst>
+                  <a:ext uri="{0D108BD9-81ED-4DB2-BD59-A6C34878D82A}">
+                    <a16:rowId xmlns:a16="http://schemas.microsoft.com/office/drawing/2014/main" val="2672301600"/>
+                  </a:ext>
+                </a:extLst>
+              </a:tr>
+              <a:tr h="429768">
+                <a:tc vMerge="1">
+                  <a:txBody>
+                    <a:bodyPr/>
+                    <a:lstStyle/>
+                    <a:p>
+                      <a:endParaRPr lang="en-US" sz="2200" dirty="0">
+                        <a:latin typeface="Georgia" panose="02040502050405020303" pitchFamily="18" charset="0"/>
+                      </a:endParaRPr>
+                    </a:p>
+                  </a:txBody>
+                  <a:tcPr/>
+                </a:tc>
+                <a:tc>
+                  <a:txBody>
+                    <a:bodyPr/>
+                    <a:lstStyle/>
+                    <a:p>
+                      <a:r>
+                        <a:rPr lang="en-US" sz="2200" dirty="0">
+                          <a:latin typeface="Georgia" panose="02040502050405020303" pitchFamily="18" charset="0"/>
+                        </a:rPr>
+                        <a:t>#Rep = 4, B = 48</a:t>
+                      </a:r>
+                    </a:p>
+                  </a:txBody>
+                  <a:tcPr/>
+                </a:tc>
+                <a:tc>
+                  <a:txBody>
+                    <a:bodyPr/>
+                    <a:lstStyle/>
+                    <a:p>
+                      <a:r>
+                        <a:rPr lang="en-US" sz="2200" dirty="0">
+                          <a:latin typeface="Georgia" panose="02040502050405020303" pitchFamily="18" charset="0"/>
+                        </a:rPr>
+                        <a:t>70.17</a:t>
+                      </a:r>
+                    </a:p>
+                  </a:txBody>
+                  <a:tcPr/>
+                </a:tc>
+                <a:tc>
+                  <a:txBody>
+                    <a:bodyPr/>
+                    <a:lstStyle/>
+                    <a:p>
+                      <a:r>
+                        <a:rPr lang="en-US" sz="2200" dirty="0">
+                          <a:latin typeface="Georgia" panose="02040502050405020303" pitchFamily="18" charset="0"/>
+                        </a:rPr>
+                        <a:t>66.83</a:t>
+                      </a:r>
+                    </a:p>
+                  </a:txBody>
+                  <a:tcPr/>
+                </a:tc>
+                <a:extLst>
+                  <a:ext uri="{0D108BD9-81ED-4DB2-BD59-A6C34878D82A}">
+                    <a16:rowId xmlns:a16="http://schemas.microsoft.com/office/drawing/2014/main" val="390069978"/>
+                  </a:ext>
+                </a:extLst>
+              </a:tr>
+            </a:tbl>
+          </a:graphicData>
+        </a:graphic>
+      </p:graphicFrame>
+      <p:sp>
+        <p:nvSpPr>
+          <p:cNvPr id="40" name="TextBox 39">
+            <a:extLst>
+              <a:ext uri="{FF2B5EF4-FFF2-40B4-BE49-F238E27FC236}">
+                <a16:creationId xmlns:a16="http://schemas.microsoft.com/office/drawing/2014/main" id="{158155A4-AC1D-4727-A721-EC1E09BD39F7}"/>
+              </a:ext>
+            </a:extLst>
+          </p:cNvPr>
+          <p:cNvSpPr txBox="1"/>
+          <p:nvPr/>
+        </p:nvSpPr>
+        <p:spPr>
+          <a:xfrm>
+            <a:off x="6057472" y="21534082"/>
+            <a:ext cx="2627584" cy="369332"/>
+          </a:xfrm>
+          <a:prstGeom prst="rect">
+            <a:avLst/>
+          </a:prstGeom>
+          <a:noFill/>
+        </p:spPr>
+        <p:txBody>
+          <a:bodyPr wrap="square" rtlCol="0">
+            <a:spAutoFit/>
+          </a:bodyPr>
+          <a:lstStyle/>
+          <a:p>
+            <a:r>
+              <a:rPr lang="en-US" b="1" dirty="0"/>
+              <a:t>Figure 1.</a:t>
+            </a:r>
+            <a:r>
+              <a:rPr lang="en-US" dirty="0"/>
+              <a:t> </a:t>
+            </a:r>
+            <a:r>
+              <a:rPr lang="en-US" dirty="0" err="1"/>
+              <a:t>QANet</a:t>
+            </a:r>
+            <a:r>
+              <a:rPr lang="en-US" dirty="0"/>
+              <a:t> Diagram</a:t>
+            </a:r>
+          </a:p>
+        </p:txBody>
+      </p:sp>
+      <p:sp>
+        <p:nvSpPr>
+          <p:cNvPr id="41" name="TextBox 40">
+            <a:extLst>
+              <a:ext uri="{FF2B5EF4-FFF2-40B4-BE49-F238E27FC236}">
+                <a16:creationId xmlns:a16="http://schemas.microsoft.com/office/drawing/2014/main" id="{256F47B6-33C0-4DED-9E5E-F0EA2903E7DF}"/>
+              </a:ext>
+            </a:extLst>
+          </p:cNvPr>
+          <p:cNvSpPr txBox="1"/>
+          <p:nvPr/>
+        </p:nvSpPr>
+        <p:spPr>
+          <a:xfrm>
+            <a:off x="21581631" y="13486551"/>
+            <a:ext cx="1735569" cy="369332"/>
+          </a:xfrm>
+          <a:prstGeom prst="rect">
+            <a:avLst/>
+          </a:prstGeom>
+          <a:noFill/>
+        </p:spPr>
+        <p:txBody>
+          <a:bodyPr wrap="square" rtlCol="0">
+            <a:spAutoFit/>
+          </a:bodyPr>
+          <a:lstStyle/>
+          <a:p>
+            <a:r>
+              <a:rPr lang="en-US" b="1" dirty="0">
+                <a:latin typeface="Georgia" panose="02040502050405020303" pitchFamily="18" charset="0"/>
+              </a:rPr>
+              <a:t>Table 1. </a:t>
+            </a:r>
+            <a:r>
+              <a:rPr lang="en-US" dirty="0" err="1">
+                <a:latin typeface="Georgia" panose="02040502050405020303" pitchFamily="18" charset="0"/>
+              </a:rPr>
+              <a:t>AvNA</a:t>
+            </a:r>
+            <a:endParaRPr lang="en-US" dirty="0">
+              <a:latin typeface="Georgia" panose="02040502050405020303" pitchFamily="18" charset="0"/>
+            </a:endParaRPr>
+          </a:p>
+        </p:txBody>
+      </p:sp>
+      <p:sp>
+        <p:nvSpPr>
+          <p:cNvPr id="124" name="TextBox 123">
+            <a:extLst>
+              <a:ext uri="{FF2B5EF4-FFF2-40B4-BE49-F238E27FC236}">
+                <a16:creationId xmlns:a16="http://schemas.microsoft.com/office/drawing/2014/main" id="{AC98E057-D1CF-4B27-A2A3-3F27464001ED}"/>
+              </a:ext>
+            </a:extLst>
+          </p:cNvPr>
+          <p:cNvSpPr txBox="1"/>
+          <p:nvPr/>
+        </p:nvSpPr>
+        <p:spPr>
+          <a:xfrm>
+            <a:off x="19454648" y="16864576"/>
+            <a:ext cx="3910155" cy="369332"/>
+          </a:xfrm>
+          <a:prstGeom prst="rect">
+            <a:avLst/>
+          </a:prstGeom>
+          <a:noFill/>
+        </p:spPr>
+        <p:txBody>
+          <a:bodyPr wrap="square" rtlCol="0">
+            <a:spAutoFit/>
+          </a:bodyPr>
+          <a:lstStyle/>
+          <a:p>
+            <a:r>
+              <a:rPr lang="en-US" b="1" dirty="0">
+                <a:latin typeface="Georgia" panose="02040502050405020303" pitchFamily="18" charset="0"/>
+              </a:rPr>
+              <a:t>      Table 2. </a:t>
+            </a:r>
+            <a:r>
+              <a:rPr lang="en-US" dirty="0">
+                <a:latin typeface="Georgia" panose="02040502050405020303" pitchFamily="18" charset="0"/>
+              </a:rPr>
+              <a:t>Performance by Q Type</a:t>
+            </a:r>
+          </a:p>
+        </p:txBody>
+      </p:sp>
+      <p:sp>
+        <p:nvSpPr>
+          <p:cNvPr id="42" name="TextBox 41">
+            <a:extLst>
+              <a:ext uri="{FF2B5EF4-FFF2-40B4-BE49-F238E27FC236}">
+                <a16:creationId xmlns:a16="http://schemas.microsoft.com/office/drawing/2014/main" id="{F1027EFF-E699-4301-A97E-E93376E16421}"/>
+              </a:ext>
+            </a:extLst>
+          </p:cNvPr>
+          <p:cNvSpPr txBox="1"/>
+          <p:nvPr/>
+        </p:nvSpPr>
+        <p:spPr>
+          <a:xfrm>
+            <a:off x="25634975" y="4423549"/>
+            <a:ext cx="1524000" cy="369332"/>
+          </a:xfrm>
+          <a:prstGeom prst="rect">
+            <a:avLst/>
+          </a:prstGeom>
+          <a:noFill/>
+        </p:spPr>
+        <p:txBody>
+          <a:bodyPr wrap="square" rtlCol="0">
+            <a:spAutoFit/>
+          </a:bodyPr>
+          <a:lstStyle/>
+          <a:p>
+            <a:r>
+              <a:rPr lang="en-US" dirty="0">
+                <a:latin typeface="Georgia" panose="02040502050405020303" pitchFamily="18" charset="0"/>
+              </a:rPr>
+              <a:t>F1 Score</a:t>
+            </a:r>
+          </a:p>
+        </p:txBody>
+      </p:sp>
+      <p:sp>
+        <p:nvSpPr>
+          <p:cNvPr id="126" name="TextBox 125">
+            <a:extLst>
+              <a:ext uri="{FF2B5EF4-FFF2-40B4-BE49-F238E27FC236}">
+                <a16:creationId xmlns:a16="http://schemas.microsoft.com/office/drawing/2014/main" id="{E5D20448-E7CF-4F6D-9853-08A2737CEE59}"/>
+              </a:ext>
+            </a:extLst>
+          </p:cNvPr>
+          <p:cNvSpPr txBox="1"/>
+          <p:nvPr/>
+        </p:nvSpPr>
+        <p:spPr>
+          <a:xfrm>
+            <a:off x="29909730" y="4423549"/>
+            <a:ext cx="1524000" cy="369332"/>
+          </a:xfrm>
+          <a:prstGeom prst="rect">
+            <a:avLst/>
+          </a:prstGeom>
+          <a:noFill/>
+        </p:spPr>
+        <p:txBody>
+          <a:bodyPr wrap="square" rtlCol="0">
+            <a:spAutoFit/>
+          </a:bodyPr>
+          <a:lstStyle/>
+          <a:p>
+            <a:r>
+              <a:rPr lang="en-US" dirty="0">
+                <a:latin typeface="Georgia" panose="02040502050405020303" pitchFamily="18" charset="0"/>
+              </a:rPr>
+              <a:t>EM Score</a:t>
+            </a:r>
+          </a:p>
+        </p:txBody>
+      </p:sp>
+      <p:sp>
+        <p:nvSpPr>
+          <p:cNvPr id="43" name="TextBox 42">
+            <a:extLst>
+              <a:ext uri="{FF2B5EF4-FFF2-40B4-BE49-F238E27FC236}">
+                <a16:creationId xmlns:a16="http://schemas.microsoft.com/office/drawing/2014/main" id="{9FEA6BD8-980B-468E-8DA7-17D4B3579A59}"/>
+              </a:ext>
+            </a:extLst>
+          </p:cNvPr>
+          <p:cNvSpPr txBox="1"/>
+          <p:nvPr/>
+        </p:nvSpPr>
+        <p:spPr>
+          <a:xfrm>
+            <a:off x="24187331" y="8369300"/>
+            <a:ext cx="8262735" cy="769441"/>
+          </a:xfrm>
+          <a:prstGeom prst="rect">
+            <a:avLst/>
+          </a:prstGeom>
+          <a:noFill/>
+        </p:spPr>
+        <p:txBody>
+          <a:bodyPr wrap="square" rtlCol="0">
+            <a:spAutoFit/>
+          </a:bodyPr>
+          <a:lstStyle/>
+          <a:p>
+            <a:r>
+              <a:rPr lang="en-US" sz="2200" dirty="0">
+                <a:latin typeface="Georgia" panose="02040502050405020303" pitchFamily="18" charset="0"/>
+              </a:rPr>
+              <a:t>The final model?? Description…….</a:t>
+            </a:r>
+          </a:p>
+          <a:p>
+            <a:r>
+              <a:rPr lang="en-US" sz="2200" dirty="0">
+                <a:latin typeface="Georgia" panose="02040502050405020303" pitchFamily="18" charset="0"/>
+              </a:rPr>
+              <a:t>Comparison with baseline and </a:t>
+            </a:r>
+            <a:r>
+              <a:rPr lang="en-US" sz="2200" dirty="0" err="1">
+                <a:latin typeface="Georgia" panose="02040502050405020303" pitchFamily="18" charset="0"/>
+              </a:rPr>
+              <a:t>bidaf</a:t>
+            </a:r>
+            <a:r>
+              <a:rPr lang="en-US" sz="2200" dirty="0">
+                <a:latin typeface="Georgia" panose="02040502050405020303" pitchFamily="18" charset="0"/>
+              </a:rPr>
+              <a:t> w</a:t>
+            </a:r>
+            <a:r>
+              <a:rPr lang="en-US" sz="2200">
+                <a:latin typeface="Georgia" panose="02040502050405020303" pitchFamily="18" charset="0"/>
+              </a:rPr>
+              <a:t>/Char</a:t>
+            </a:r>
+            <a:endParaRPr lang="en-US" sz="2200" dirty="0">
+              <a:latin typeface="Georgia" panose="02040502050405020303" pitchFamily="18" charset="0"/>
+            </a:endParaRPr>
           </a:p>
         </p:txBody>
       </p:sp>

</xml_diff>

<commit_message>
update hyper tune and future work
</commit_message>
<xml_diff>
--- a/Poster.pptx
+++ b/Poster.pptx
@@ -3776,7 +3776,7 @@
         </p:nvSpPr>
         <p:spPr>
           <a:xfrm>
-            <a:off x="9604983" y="11150259"/>
+            <a:off x="9604983" y="11112159"/>
             <a:ext cx="13716000" cy="838200"/>
           </a:xfrm>
           <a:prstGeom prst="rect">
@@ -4140,13 +4140,13 @@
           <p:nvPr>
             <p:extLst>
               <p:ext uri="{D42A27DB-BD31-4B8C-83A1-F6EECF244321}">
-                <p14:modId xmlns:p14="http://schemas.microsoft.com/office/powerpoint/2010/main" val="3299354392"/>
+                <p14:modId xmlns:p14="http://schemas.microsoft.com/office/powerpoint/2010/main" val="3784159273"/>
               </p:ext>
             </p:extLst>
           </p:nvPr>
         </p:nvGraphicFramePr>
         <p:xfrm>
-          <a:off x="16472508" y="12162764"/>
+          <a:off x="16472508" y="12124664"/>
           <a:ext cx="6871275" cy="1280160"/>
         </p:xfrm>
         <a:graphic>
@@ -8521,7 +8521,7 @@
               <a:rPr lang="en-US" sz="4000" dirty="0">
                 <a:latin typeface="Georgia" panose="02040502050405020303" pitchFamily="18" charset="0"/>
               </a:rPr>
-              <a:t>   Future Works</a:t>
+              <a:t>   Future Work</a:t>
             </a:r>
           </a:p>
         </p:txBody>
@@ -8540,7 +8540,7 @@
         </p:nvSpPr>
         <p:spPr>
           <a:xfrm>
-            <a:off x="9604983" y="12063425"/>
+            <a:off x="9604983" y="12025325"/>
             <a:ext cx="6563620" cy="1446550"/>
           </a:xfrm>
           <a:prstGeom prst="rect">
@@ -8608,13 +8608,13 @@
           <p:nvPr>
             <p:extLst>
               <p:ext uri="{D42A27DB-BD31-4B8C-83A1-F6EECF244321}">
-                <p14:modId xmlns:p14="http://schemas.microsoft.com/office/powerpoint/2010/main" val="744857822"/>
+                <p14:modId xmlns:p14="http://schemas.microsoft.com/office/powerpoint/2010/main" val="4027371242"/>
               </p:ext>
             </p:extLst>
           </p:nvPr>
         </p:nvGraphicFramePr>
         <p:xfrm>
-          <a:off x="9769315" y="15075698"/>
+          <a:off x="9769315" y="15037598"/>
           <a:ext cx="13595013" cy="1706880"/>
         </p:xfrm>
         <a:graphic>
@@ -10963,7 +10963,7 @@
         </p:nvSpPr>
         <p:spPr>
           <a:xfrm>
-            <a:off x="9638843" y="13549620"/>
+            <a:off x="9638843" y="13511520"/>
             <a:ext cx="13695454" cy="1446550"/>
           </a:xfrm>
           <a:prstGeom prst="rect">
@@ -11024,7 +11024,7 @@
         </p:nvSpPr>
         <p:spPr>
           <a:xfrm>
-            <a:off x="12764852" y="14936576"/>
+            <a:off x="12764852" y="14898476"/>
             <a:ext cx="1328057" cy="1941793"/>
           </a:xfrm>
           <a:prstGeom prst="roundRect">
@@ -11072,7 +11072,7 @@
         </p:nvSpPr>
         <p:spPr>
           <a:xfrm>
-            <a:off x="18801251" y="14958241"/>
+            <a:off x="18801251" y="14920141"/>
             <a:ext cx="1328057" cy="1941793"/>
           </a:xfrm>
           <a:prstGeom prst="roundRect">
@@ -11124,7 +11124,7 @@
         </p:nvSpPr>
         <p:spPr>
           <a:xfrm>
-            <a:off x="9606894" y="17039873"/>
+            <a:off x="9606894" y="17001773"/>
             <a:ext cx="13695454" cy="4832092"/>
           </a:xfrm>
           <a:prstGeom prst="rect">
@@ -11901,7 +11901,7 @@
           <p:nvPr>
             <p:extLst>
               <p:ext uri="{D42A27DB-BD31-4B8C-83A1-F6EECF244321}">
-                <p14:modId xmlns:p14="http://schemas.microsoft.com/office/powerpoint/2010/main" val="1786697283"/>
+                <p14:modId xmlns:p14="http://schemas.microsoft.com/office/powerpoint/2010/main" val="1176680530"/>
               </p:ext>
             </p:extLst>
           </p:nvPr>
@@ -12127,9 +12127,12 @@
                     <a:bodyPr/>
                     <a:lstStyle/>
                     <a:p>
-                      <a:endParaRPr lang="en-US" sz="2200" dirty="0">
-                        <a:latin typeface="Georgia" panose="02040502050405020303" pitchFamily="18" charset="0"/>
-                      </a:endParaRPr>
+                      <a:r>
+                        <a:rPr lang="en-US" sz="2200" dirty="0">
+                          <a:latin typeface="Georgia" panose="02040502050405020303" pitchFamily="18" charset="0"/>
+                        </a:rPr>
+                        <a:t>69.17</a:t>
+                      </a:r>
                     </a:p>
                   </a:txBody>
                   <a:tcPr/>
@@ -12139,9 +12142,12 @@
                     <a:bodyPr/>
                     <a:lstStyle/>
                     <a:p>
-                      <a:endParaRPr lang="en-US" sz="2200">
-                        <a:latin typeface="Georgia" panose="02040502050405020303" pitchFamily="18" charset="0"/>
-                      </a:endParaRPr>
+                      <a:r>
+                        <a:rPr lang="en-US" sz="2200" dirty="0">
+                          <a:latin typeface="Georgia" panose="02040502050405020303" pitchFamily="18" charset="0"/>
+                        </a:rPr>
+                        <a:t>66.82</a:t>
+                      </a:r>
                     </a:p>
                   </a:txBody>
                   <a:tcPr/>
@@ -12185,9 +12191,12 @@
                     <a:bodyPr/>
                     <a:lstStyle/>
                     <a:p>
-                      <a:endParaRPr lang="en-US" sz="2200" dirty="0">
-                        <a:latin typeface="Georgia" panose="02040502050405020303" pitchFamily="18" charset="0"/>
-                      </a:endParaRPr>
+                      <a:r>
+                        <a:rPr lang="en-US" sz="2200" dirty="0">
+                          <a:latin typeface="Georgia" panose="02040502050405020303" pitchFamily="18" charset="0"/>
+                        </a:rPr>
+                        <a:t>52.19</a:t>
+                      </a:r>
                     </a:p>
                   </a:txBody>
                   <a:tcPr/>
@@ -12197,9 +12206,12 @@
                     <a:bodyPr/>
                     <a:lstStyle/>
                     <a:p>
-                      <a:endParaRPr lang="en-US" sz="2200" dirty="0">
-                        <a:latin typeface="Georgia" panose="02040502050405020303" pitchFamily="18" charset="0"/>
-                      </a:endParaRPr>
+                      <a:r>
+                        <a:rPr lang="en-US" sz="2200" dirty="0">
+                          <a:latin typeface="Georgia" panose="02040502050405020303" pitchFamily="18" charset="0"/>
+                        </a:rPr>
+                        <a:t>52.19</a:t>
+                      </a:r>
                     </a:p>
                   </a:txBody>
                   <a:tcPr/>
@@ -12718,7 +12730,7 @@
         </p:nvSpPr>
         <p:spPr>
           <a:xfrm>
-            <a:off x="21526501" y="13486551"/>
+            <a:off x="21526501" y="13448451"/>
             <a:ext cx="1790700" cy="369332"/>
           </a:xfrm>
           <a:prstGeom prst="rect">
@@ -12764,7 +12776,7 @@
         </p:nvSpPr>
         <p:spPr>
           <a:xfrm>
-            <a:off x="19454648" y="16864576"/>
+            <a:off x="19454648" y="16826476"/>
             <a:ext cx="3910155" cy="369332"/>
           </a:xfrm>
           <a:prstGeom prst="rect">
@@ -12926,51 +12938,6 @@
       </p:sp>
       <p:sp>
         <p:nvSpPr>
-          <p:cNvPr id="44" name="TextBox 43">
-            <a:extLst>
-              <a:ext uri="{FF2B5EF4-FFF2-40B4-BE49-F238E27FC236}">
-                <a16:creationId xmlns:a16="http://schemas.microsoft.com/office/drawing/2014/main" id="{9DD3AE71-E9C9-4EBE-9B22-1A6EA8B65399}"/>
-              </a:ext>
-            </a:extLst>
-          </p:cNvPr>
-          <p:cNvSpPr txBox="1"/>
-          <p:nvPr/>
-        </p:nvSpPr>
-        <p:spPr>
-          <a:xfrm>
-            <a:off x="9626600" y="9083312"/>
-            <a:ext cx="7565696" cy="1785104"/>
-          </a:xfrm>
-          <a:prstGeom prst="rect">
-            <a:avLst/>
-          </a:prstGeom>
-          <a:noFill/>
-        </p:spPr>
-        <p:txBody>
-          <a:bodyPr wrap="square" rtlCol="0">
-            <a:spAutoFit/>
-          </a:bodyPr>
-          <a:lstStyle/>
-          <a:p>
-            <a:r>
-              <a:rPr lang="en-US" sz="2200" dirty="0">
-                <a:latin typeface="Georgia" panose="02040502050405020303" pitchFamily="18" charset="0"/>
-              </a:rPr>
-              <a:t>*Default training param. </a:t>
-            </a:r>
-          </a:p>
-          <a:p>
-            <a:r>
-              <a:rPr lang="en-US" sz="2200" dirty="0">
-                <a:latin typeface="Georgia" panose="02040502050405020303" pitchFamily="18" charset="0"/>
-              </a:rPr>
-              <a:t>Note: due to time constraint, tuning was done in sequence. We started with learning rate, used the best learning rate to tune on dropout probability, and used the best learning rate and dropout probability to tune batch size and repetitions. </a:t>
-            </a:r>
-          </a:p>
-        </p:txBody>
-      </p:sp>
-      <p:sp>
-        <p:nvSpPr>
           <p:cNvPr id="129" name="TextBox 128">
             <a:extLst>
               <a:ext uri="{FF2B5EF4-FFF2-40B4-BE49-F238E27FC236}">
@@ -12983,8 +12950,8 @@
         </p:nvSpPr>
         <p:spPr>
           <a:xfrm>
-            <a:off x="14198601" y="8862289"/>
-            <a:ext cx="2993696" cy="369332"/>
+            <a:off x="11544299" y="8862289"/>
+            <a:ext cx="5647997" cy="369332"/>
           </a:xfrm>
           <a:prstGeom prst="rect">
             <a:avLst/>
@@ -13007,7 +12974,449 @@
               <a:rPr lang="en-US" dirty="0">
                 <a:latin typeface="Georgia" panose="02040502050405020303" pitchFamily="18" charset="0"/>
               </a:rPr>
-              <a:t>Parameter Tuning</a:t>
+              <a:t>Parameter Tuning (*Default training param)</a:t>
+            </a:r>
+          </a:p>
+        </p:txBody>
+      </p:sp>
+      <p:sp>
+        <p:nvSpPr>
+          <p:cNvPr id="45" name="Oval 44">
+            <a:extLst>
+              <a:ext uri="{FF2B5EF4-FFF2-40B4-BE49-F238E27FC236}">
+                <a16:creationId xmlns:a16="http://schemas.microsoft.com/office/drawing/2014/main" id="{14488D7F-F5F8-45B6-9047-AF89D16B83CA}"/>
+              </a:ext>
+            </a:extLst>
+          </p:cNvPr>
+          <p:cNvSpPr/>
+          <p:nvPr/>
+        </p:nvSpPr>
+        <p:spPr>
+          <a:xfrm>
+            <a:off x="17626599" y="5057348"/>
+            <a:ext cx="1916932" cy="790834"/>
+          </a:xfrm>
+          <a:prstGeom prst="ellipse">
+            <a:avLst/>
+          </a:prstGeom>
+          <a:solidFill>
+            <a:srgbClr val="DD9D4F"/>
+          </a:solidFill>
+        </p:spPr>
+        <p:style>
+          <a:lnRef idx="2">
+            <a:schemeClr val="accent1">
+              <a:shade val="50000"/>
+            </a:schemeClr>
+          </a:lnRef>
+          <a:fillRef idx="1">
+            <a:schemeClr val="accent1"/>
+          </a:fillRef>
+          <a:effectRef idx="0">
+            <a:schemeClr val="accent1"/>
+          </a:effectRef>
+          <a:fontRef idx="minor">
+            <a:schemeClr val="lt1"/>
+          </a:fontRef>
+        </p:style>
+        <p:txBody>
+          <a:bodyPr rtlCol="0" anchor="ctr"/>
+          <a:lstStyle/>
+          <a:p>
+            <a:pPr algn="ctr"/>
+            <a:r>
+              <a:rPr lang="en-US" sz="2000" dirty="0">
+                <a:latin typeface="Georgia" panose="02040502050405020303" pitchFamily="18" charset="0"/>
+              </a:rPr>
+              <a:t>Learning Rate</a:t>
+            </a:r>
+          </a:p>
+        </p:txBody>
+      </p:sp>
+      <p:sp>
+        <p:nvSpPr>
+          <p:cNvPr id="131" name="Oval 130">
+            <a:extLst>
+              <a:ext uri="{FF2B5EF4-FFF2-40B4-BE49-F238E27FC236}">
+                <a16:creationId xmlns:a16="http://schemas.microsoft.com/office/drawing/2014/main" id="{6B35AD20-4B35-43DB-9FBD-17F2D8E900CE}"/>
+              </a:ext>
+            </a:extLst>
+          </p:cNvPr>
+          <p:cNvSpPr/>
+          <p:nvPr/>
+        </p:nvSpPr>
+        <p:spPr>
+          <a:xfrm>
+            <a:off x="19166693" y="5762131"/>
+            <a:ext cx="1916932" cy="790835"/>
+          </a:xfrm>
+          <a:prstGeom prst="ellipse">
+            <a:avLst/>
+          </a:prstGeom>
+          <a:solidFill>
+            <a:srgbClr val="DD9D4F"/>
+          </a:solidFill>
+        </p:spPr>
+        <p:style>
+          <a:lnRef idx="2">
+            <a:schemeClr val="accent1">
+              <a:shade val="50000"/>
+            </a:schemeClr>
+          </a:lnRef>
+          <a:fillRef idx="1">
+            <a:schemeClr val="accent1"/>
+          </a:fillRef>
+          <a:effectRef idx="0">
+            <a:schemeClr val="accent1"/>
+          </a:effectRef>
+          <a:fontRef idx="minor">
+            <a:schemeClr val="lt1"/>
+          </a:fontRef>
+        </p:style>
+        <p:txBody>
+          <a:bodyPr rtlCol="0" anchor="ctr"/>
+          <a:lstStyle/>
+          <a:p>
+            <a:pPr algn="ctr"/>
+            <a:r>
+              <a:rPr lang="en-US" sz="2000" dirty="0">
+                <a:latin typeface="Georgia" panose="02040502050405020303" pitchFamily="18" charset="0"/>
+              </a:rPr>
+              <a:t>Dropout Prob</a:t>
+            </a:r>
+          </a:p>
+        </p:txBody>
+      </p:sp>
+      <p:sp>
+        <p:nvSpPr>
+          <p:cNvPr id="132" name="Oval 131">
+            <a:extLst>
+              <a:ext uri="{FF2B5EF4-FFF2-40B4-BE49-F238E27FC236}">
+                <a16:creationId xmlns:a16="http://schemas.microsoft.com/office/drawing/2014/main" id="{7648CF64-DD3E-4A4B-907B-FFB2E2DB62A5}"/>
+              </a:ext>
+            </a:extLst>
+          </p:cNvPr>
+          <p:cNvSpPr/>
+          <p:nvPr/>
+        </p:nvSpPr>
+        <p:spPr>
+          <a:xfrm>
+            <a:off x="20803077" y="6538466"/>
+            <a:ext cx="1916932" cy="790835"/>
+          </a:xfrm>
+          <a:prstGeom prst="ellipse">
+            <a:avLst/>
+          </a:prstGeom>
+          <a:solidFill>
+            <a:srgbClr val="DD9D4F"/>
+          </a:solidFill>
+        </p:spPr>
+        <p:style>
+          <a:lnRef idx="2">
+            <a:schemeClr val="accent1">
+              <a:shade val="50000"/>
+            </a:schemeClr>
+          </a:lnRef>
+          <a:fillRef idx="1">
+            <a:schemeClr val="accent1"/>
+          </a:fillRef>
+          <a:effectRef idx="0">
+            <a:schemeClr val="accent1"/>
+          </a:effectRef>
+          <a:fontRef idx="minor">
+            <a:schemeClr val="lt1"/>
+          </a:fontRef>
+        </p:style>
+        <p:txBody>
+          <a:bodyPr rtlCol="0" anchor="ctr"/>
+          <a:lstStyle/>
+          <a:p>
+            <a:pPr algn="ctr"/>
+            <a:r>
+              <a:rPr lang="en-US" sz="2000" dirty="0">
+                <a:latin typeface="Georgia" panose="02040502050405020303" pitchFamily="18" charset="0"/>
+              </a:rPr>
+              <a:t>Batch Size ~ Rep</a:t>
+            </a:r>
+          </a:p>
+        </p:txBody>
+      </p:sp>
+      <p:sp>
+        <p:nvSpPr>
+          <p:cNvPr id="46" name="TextBox 45">
+            <a:extLst>
+              <a:ext uri="{FF2B5EF4-FFF2-40B4-BE49-F238E27FC236}">
+                <a16:creationId xmlns:a16="http://schemas.microsoft.com/office/drawing/2014/main" id="{1B01E0CB-7406-4FB8-B8B9-36E94696A4EE}"/>
+              </a:ext>
+            </a:extLst>
+          </p:cNvPr>
+          <p:cNvSpPr txBox="1"/>
+          <p:nvPr/>
+        </p:nvSpPr>
+        <p:spPr>
+          <a:xfrm>
+            <a:off x="17508731" y="4519765"/>
+            <a:ext cx="5436057" cy="430887"/>
+          </a:xfrm>
+          <a:prstGeom prst="rect">
+            <a:avLst/>
+          </a:prstGeom>
+          <a:noFill/>
+        </p:spPr>
+        <p:txBody>
+          <a:bodyPr wrap="square" rtlCol="0">
+            <a:spAutoFit/>
+          </a:bodyPr>
+          <a:lstStyle/>
+          <a:p>
+            <a:r>
+              <a:rPr lang="en-US" sz="2200" dirty="0">
+                <a:latin typeface="Georgia" panose="02040502050405020303" pitchFamily="18" charset="0"/>
+              </a:rPr>
+              <a:t>Tuning Sequence (due to time constraint)</a:t>
+            </a:r>
+          </a:p>
+        </p:txBody>
+      </p:sp>
+      <p:cxnSp>
+        <p:nvCxnSpPr>
+          <p:cNvPr id="48" name="Connector: Curved 47">
+            <a:extLst>
+              <a:ext uri="{FF2B5EF4-FFF2-40B4-BE49-F238E27FC236}">
+                <a16:creationId xmlns:a16="http://schemas.microsoft.com/office/drawing/2014/main" id="{A3CCDC7B-3D22-4318-BFE5-763818259C1D}"/>
+              </a:ext>
+            </a:extLst>
+          </p:cNvPr>
+          <p:cNvCxnSpPr>
+            <a:cxnSpLocks/>
+            <a:stCxn id="45" idx="6"/>
+            <a:endCxn id="131" idx="0"/>
+          </p:cNvCxnSpPr>
+          <p:nvPr/>
+        </p:nvCxnSpPr>
+        <p:spPr>
+          <a:xfrm>
+            <a:off x="19543531" y="5452765"/>
+            <a:ext cx="581628" cy="309366"/>
+          </a:xfrm>
+          <a:prstGeom prst="curvedConnector2">
+            <a:avLst/>
+          </a:prstGeom>
+          <a:ln>
+            <a:tailEnd type="triangle"/>
+          </a:ln>
+        </p:spPr>
+        <p:style>
+          <a:lnRef idx="1">
+            <a:schemeClr val="dk1"/>
+          </a:lnRef>
+          <a:fillRef idx="0">
+            <a:schemeClr val="dk1"/>
+          </a:fillRef>
+          <a:effectRef idx="0">
+            <a:schemeClr val="dk1"/>
+          </a:effectRef>
+          <a:fontRef idx="minor">
+            <a:schemeClr val="tx1"/>
+          </a:fontRef>
+        </p:style>
+      </p:cxnSp>
+      <p:sp>
+        <p:nvSpPr>
+          <p:cNvPr id="49" name="TextBox 48">
+            <a:extLst>
+              <a:ext uri="{FF2B5EF4-FFF2-40B4-BE49-F238E27FC236}">
+                <a16:creationId xmlns:a16="http://schemas.microsoft.com/office/drawing/2014/main" id="{570AECEA-8696-4821-A153-C574872C11E2}"/>
+              </a:ext>
+            </a:extLst>
+          </p:cNvPr>
+          <p:cNvSpPr txBox="1"/>
+          <p:nvPr/>
+        </p:nvSpPr>
+        <p:spPr>
+          <a:xfrm>
+            <a:off x="19794550" y="5189592"/>
+            <a:ext cx="1973250" cy="400110"/>
+          </a:xfrm>
+          <a:prstGeom prst="rect">
+            <a:avLst/>
+          </a:prstGeom>
+          <a:noFill/>
+        </p:spPr>
+        <p:txBody>
+          <a:bodyPr wrap="square" rtlCol="0">
+            <a:spAutoFit/>
+          </a:bodyPr>
+          <a:lstStyle/>
+          <a:p>
+            <a:r>
+              <a:rPr lang="en-US" sz="2000" dirty="0">
+                <a:latin typeface="Georgia" panose="02040502050405020303" pitchFamily="18" charset="0"/>
+              </a:rPr>
+              <a:t>Best LR Param</a:t>
+            </a:r>
+          </a:p>
+        </p:txBody>
+      </p:sp>
+      <p:cxnSp>
+        <p:nvCxnSpPr>
+          <p:cNvPr id="53" name="Connector: Curved 52">
+            <a:extLst>
+              <a:ext uri="{FF2B5EF4-FFF2-40B4-BE49-F238E27FC236}">
+                <a16:creationId xmlns:a16="http://schemas.microsoft.com/office/drawing/2014/main" id="{B9C36591-B605-449C-848E-0DC66F886D7C}"/>
+              </a:ext>
+            </a:extLst>
+          </p:cNvPr>
+          <p:cNvCxnSpPr>
+            <a:cxnSpLocks/>
+            <a:stCxn id="131" idx="6"/>
+            <a:endCxn id="132" idx="0"/>
+          </p:cNvCxnSpPr>
+          <p:nvPr/>
+        </p:nvCxnSpPr>
+        <p:spPr>
+          <a:xfrm>
+            <a:off x="21083625" y="6157549"/>
+            <a:ext cx="677918" cy="380917"/>
+          </a:xfrm>
+          <a:prstGeom prst="curvedConnector2">
+            <a:avLst/>
+          </a:prstGeom>
+          <a:ln>
+            <a:tailEnd type="triangle"/>
+          </a:ln>
+        </p:spPr>
+        <p:style>
+          <a:lnRef idx="1">
+            <a:schemeClr val="dk1"/>
+          </a:lnRef>
+          <a:fillRef idx="0">
+            <a:schemeClr val="dk1"/>
+          </a:fillRef>
+          <a:effectRef idx="0">
+            <a:schemeClr val="dk1"/>
+          </a:effectRef>
+          <a:fontRef idx="minor">
+            <a:schemeClr val="tx1"/>
+          </a:fontRef>
+        </p:style>
+      </p:cxnSp>
+      <p:sp>
+        <p:nvSpPr>
+          <p:cNvPr id="159" name="TextBox 158">
+            <a:extLst>
+              <a:ext uri="{FF2B5EF4-FFF2-40B4-BE49-F238E27FC236}">
+                <a16:creationId xmlns:a16="http://schemas.microsoft.com/office/drawing/2014/main" id="{EDFC89A4-CF8B-497F-8B13-4E88081968BF}"/>
+              </a:ext>
+            </a:extLst>
+          </p:cNvPr>
+          <p:cNvSpPr txBox="1"/>
+          <p:nvPr/>
+        </p:nvSpPr>
+        <p:spPr>
+          <a:xfrm>
+            <a:off x="21524848" y="5733895"/>
+            <a:ext cx="1716152" cy="646331"/>
+          </a:xfrm>
+          <a:prstGeom prst="rect">
+            <a:avLst/>
+          </a:prstGeom>
+          <a:noFill/>
+        </p:spPr>
+        <p:txBody>
+          <a:bodyPr wrap="square">
+            <a:spAutoFit/>
+          </a:bodyPr>
+          <a:lstStyle/>
+          <a:p>
+            <a:r>
+              <a:rPr lang="en-US" sz="1800" dirty="0">
+                <a:latin typeface="Georgia" panose="02040502050405020303" pitchFamily="18" charset="0"/>
+              </a:rPr>
+              <a:t>Best </a:t>
+            </a:r>
+            <a:r>
+              <a:rPr lang="en-US" sz="1800" dirty="0" err="1">
+                <a:latin typeface="Georgia" panose="02040502050405020303" pitchFamily="18" charset="0"/>
+              </a:rPr>
+              <a:t>LR+Drop</a:t>
+            </a:r>
+            <a:r>
+              <a:rPr lang="en-US" sz="1800" dirty="0">
+                <a:latin typeface="Georgia" panose="02040502050405020303" pitchFamily="18" charset="0"/>
+              </a:rPr>
+              <a:t> Params</a:t>
+            </a:r>
+            <a:endParaRPr lang="en-US" dirty="0"/>
+          </a:p>
+        </p:txBody>
+      </p:sp>
+      <p:sp>
+        <p:nvSpPr>
+          <p:cNvPr id="81" name="TextBox 80">
+            <a:extLst>
+              <a:ext uri="{FF2B5EF4-FFF2-40B4-BE49-F238E27FC236}">
+                <a16:creationId xmlns:a16="http://schemas.microsoft.com/office/drawing/2014/main" id="{A51F8B56-7929-424B-8A42-76851125A131}"/>
+              </a:ext>
+            </a:extLst>
+          </p:cNvPr>
+          <p:cNvSpPr txBox="1"/>
+          <p:nvPr/>
+        </p:nvSpPr>
+        <p:spPr>
+          <a:xfrm>
+            <a:off x="24011466" y="14112539"/>
+            <a:ext cx="8487829" cy="3139321"/>
+          </a:xfrm>
+          <a:prstGeom prst="rect">
+            <a:avLst/>
+          </a:prstGeom>
+          <a:noFill/>
+        </p:spPr>
+        <p:txBody>
+          <a:bodyPr wrap="square" rtlCol="0">
+            <a:spAutoFit/>
+          </a:bodyPr>
+          <a:lstStyle/>
+          <a:p>
+            <a:r>
+              <a:rPr lang="en-US" sz="2200" dirty="0">
+                <a:latin typeface="Georgia" panose="02040502050405020303" pitchFamily="18" charset="0"/>
+              </a:rPr>
+              <a:t>Due to time and compute limitations, there is still room for improvement. These include:</a:t>
+            </a:r>
+          </a:p>
+          <a:p>
+            <a:pPr marL="457200" indent="-457200">
+              <a:buAutoNum type="arabicPeriod"/>
+            </a:pPr>
+            <a:r>
+              <a:rPr lang="en-US" sz="2200" dirty="0">
+                <a:latin typeface="Georgia" panose="02040502050405020303" pitchFamily="18" charset="0"/>
+              </a:rPr>
+              <a:t>Using a more fine-grained grid search for hyper-parameter tuning</a:t>
+            </a:r>
+          </a:p>
+          <a:p>
+            <a:pPr marL="457200" indent="-457200">
+              <a:buAutoNum type="arabicPeriod"/>
+            </a:pPr>
+            <a:r>
+              <a:rPr lang="en-US" sz="2200" dirty="0">
+                <a:latin typeface="Georgia" panose="02040502050405020303" pitchFamily="18" charset="0"/>
+              </a:rPr>
+              <a:t>Testing model architecture improvements such as including attention-fusion networks (Wang et al. 2018) within the transformer encoder blocks.</a:t>
+            </a:r>
+          </a:p>
+          <a:p>
+            <a:pPr marL="457200" indent="-457200">
+              <a:buAutoNum type="arabicPeriod"/>
+            </a:pPr>
+            <a:r>
+              <a:rPr lang="en-US" sz="2200" dirty="0">
+                <a:latin typeface="Georgia" panose="02040502050405020303" pitchFamily="18" charset="0"/>
+              </a:rPr>
+              <a:t>Using data augmentation strategies such as back-translation to boost model performance</a:t>
             </a:r>
           </a:p>
         </p:txBody>

</xml_diff>

<commit_message>
one of the final edits
</commit_message>
<xml_diff>
--- a/Poster.pptx
+++ b/Poster.pptx
@@ -2985,7 +2985,7 @@
         </p:nvSpPr>
         <p:spPr>
           <a:xfrm>
-            <a:off x="419100" y="3520017"/>
+            <a:off x="419099" y="3411644"/>
             <a:ext cx="8487833" cy="838200"/>
           </a:xfrm>
           <a:prstGeom prst="rect">
@@ -3038,7 +3038,7 @@
         </p:nvSpPr>
         <p:spPr>
           <a:xfrm>
-            <a:off x="0" y="-16933"/>
+            <a:off x="0" y="0"/>
             <a:ext cx="32937450" cy="3155701"/>
           </a:xfrm>
           <a:prstGeom prst="rect">
@@ -3307,7 +3307,7 @@
         </p:blipFill>
         <p:spPr>
           <a:xfrm>
-            <a:off x="773890" y="141112"/>
+            <a:off x="280270" y="217383"/>
             <a:ext cx="2753286" cy="2753286"/>
           </a:xfrm>
           <a:prstGeom prst="rect">
@@ -3329,7 +3329,7 @@
         </p:nvSpPr>
         <p:spPr>
           <a:xfrm>
-            <a:off x="9601200" y="3503084"/>
+            <a:off x="9601200" y="3411644"/>
             <a:ext cx="13716000" cy="838200"/>
           </a:xfrm>
           <a:prstGeom prst="rect">
@@ -3382,7 +3382,7 @@
         </p:nvSpPr>
         <p:spPr>
           <a:xfrm>
-            <a:off x="24011467" y="18211410"/>
+            <a:off x="24011467" y="18314050"/>
             <a:ext cx="8487834" cy="838200"/>
           </a:xfrm>
           <a:prstGeom prst="rect">
@@ -3723,7 +3723,7 @@
         </p:nvSpPr>
         <p:spPr>
           <a:xfrm>
-            <a:off x="24011467" y="3503084"/>
+            <a:off x="24011467" y="3411644"/>
             <a:ext cx="8487833" cy="838200"/>
           </a:xfrm>
           <a:prstGeom prst="rect">
@@ -3776,7 +3776,7 @@
         </p:nvSpPr>
         <p:spPr>
           <a:xfrm>
-            <a:off x="9604983" y="11112159"/>
+            <a:off x="9604983" y="11353460"/>
             <a:ext cx="13716000" cy="838200"/>
           </a:xfrm>
           <a:prstGeom prst="rect">
@@ -3944,7 +3944,7 @@
               <a:rPr lang="en-US" altLang="zh-CN" sz="2200" dirty="0">
                 <a:latin typeface="Georgia" panose="02040502050405020303" pitchFamily="18" charset="0"/>
               </a:rPr>
-              <a:t> 2.0, which contains 141,934 crowd-sourced questions of Wikipedia articles. 129,941 of those will be used as train set, about 6000 as dev set and another 6000 as test set.</a:t>
+              <a:t> 2.0, which contains 141,934 crowd-sourced questions of Wikipedia articles. 129,941 of those are used as train set, about 6000 as dev set and another 6000 as test set.</a:t>
             </a:r>
           </a:p>
           <a:p>
@@ -4140,13 +4140,13 @@
           <p:nvPr>
             <p:extLst>
               <p:ext uri="{D42A27DB-BD31-4B8C-83A1-F6EECF244321}">
-                <p14:modId xmlns:p14="http://schemas.microsoft.com/office/powerpoint/2010/main" val="3784159273"/>
+                <p14:modId xmlns:p14="http://schemas.microsoft.com/office/powerpoint/2010/main" val="2398968167"/>
               </p:ext>
             </p:extLst>
           </p:nvPr>
         </p:nvGraphicFramePr>
         <p:xfrm>
-          <a:off x="16472508" y="12124664"/>
+          <a:off x="16472508" y="12332098"/>
           <a:ext cx="6871275" cy="1280160"/>
         </p:xfrm>
         <a:graphic>
@@ -8487,7 +8487,7 @@
         </p:nvSpPr>
         <p:spPr>
           <a:xfrm>
-            <a:off x="24011467" y="13057375"/>
+            <a:off x="24011467" y="13466686"/>
             <a:ext cx="8487833" cy="838200"/>
           </a:xfrm>
           <a:prstGeom prst="rect">
@@ -8540,7 +8540,7 @@
         </p:nvSpPr>
         <p:spPr>
           <a:xfrm>
-            <a:off x="9604983" y="12025325"/>
+            <a:off x="9604983" y="12232759"/>
             <a:ext cx="6563620" cy="1446550"/>
           </a:xfrm>
           <a:prstGeom prst="rect">
@@ -8608,14 +8608,14 @@
           <p:nvPr>
             <p:extLst>
               <p:ext uri="{D42A27DB-BD31-4B8C-83A1-F6EECF244321}">
-                <p14:modId xmlns:p14="http://schemas.microsoft.com/office/powerpoint/2010/main" val="4027371242"/>
+                <p14:modId xmlns:p14="http://schemas.microsoft.com/office/powerpoint/2010/main" val="102182061"/>
               </p:ext>
             </p:extLst>
           </p:nvPr>
         </p:nvGraphicFramePr>
         <p:xfrm>
-          <a:off x="9769315" y="15037598"/>
-          <a:ext cx="13595013" cy="1706880"/>
+          <a:off x="9769315" y="15188587"/>
+          <a:ext cx="13535185" cy="1706880"/>
         </p:xfrm>
         <a:graphic>
           <a:graphicData uri="http://schemas.openxmlformats.org/drawingml/2006/table">
@@ -8680,7 +8680,7 @@
                     </a:ext>
                   </a:extLst>
                 </a:gridCol>
-                <a:gridCol w="1510557">
+                <a:gridCol w="1450729">
                   <a:extLst>
                     <a:ext uri="{9D8B030D-6E8A-4147-A177-3AD203B41FA5}">
                       <a16:colId xmlns:a16="http://schemas.microsoft.com/office/drawing/2014/main" val="3375359242"/>
@@ -10963,7 +10963,7 @@
         </p:nvSpPr>
         <p:spPr>
           <a:xfrm>
-            <a:off x="9638843" y="13511520"/>
+            <a:off x="9638843" y="13662509"/>
             <a:ext cx="13695454" cy="1446550"/>
           </a:xfrm>
           <a:prstGeom prst="rect">
@@ -11024,7 +11024,7 @@
         </p:nvSpPr>
         <p:spPr>
           <a:xfrm>
-            <a:off x="12764852" y="14898476"/>
+            <a:off x="12764852" y="15049465"/>
             <a:ext cx="1328057" cy="1941793"/>
           </a:xfrm>
           <a:prstGeom prst="roundRect">
@@ -11072,7 +11072,7 @@
         </p:nvSpPr>
         <p:spPr>
           <a:xfrm>
-            <a:off x="18801251" y="14920141"/>
+            <a:off x="18801251" y="15071130"/>
             <a:ext cx="1328057" cy="1941793"/>
           </a:xfrm>
           <a:prstGeom prst="roundRect">
@@ -11124,7 +11124,7 @@
         </p:nvSpPr>
         <p:spPr>
           <a:xfrm>
-            <a:off x="9606894" y="17001773"/>
+            <a:off x="9606894" y="17038462"/>
             <a:ext cx="13695454" cy="4832092"/>
           </a:xfrm>
           <a:prstGeom prst="rect">
@@ -11189,7 +11189,31 @@
               <a:rPr lang="en-US" sz="2200" dirty="0">
                 <a:latin typeface="Georgia" panose="02040502050405020303" pitchFamily="18" charset="0"/>
               </a:rPr>
-              <a:t>… Anticipating that currency values would fluctuate unpredictably for a time, the industrialized nations increased their reserves (by expanding their money supplies) in amounts far greater than before. The result was a depreciation of the dollar and other industrialized nations' currencies…</a:t>
+              <a:t>… Anticipating that currency values would fluctuate unpredictably for a time, </a:t>
+            </a:r>
+            <a:r>
+              <a:rPr lang="en-US" sz="2200" u="sng" dirty="0">
+                <a:latin typeface="Georgia" panose="02040502050405020303" pitchFamily="18" charset="0"/>
+              </a:rPr>
+              <a:t>the industrialized nations increased their reserves </a:t>
+            </a:r>
+            <a:r>
+              <a:rPr lang="en-US" sz="2200" dirty="0">
+                <a:latin typeface="Georgia" panose="02040502050405020303" pitchFamily="18" charset="0"/>
+              </a:rPr>
+              <a:t>(by expanding their money supplies) in amounts far greater than before. </a:t>
+            </a:r>
+            <a:r>
+              <a:rPr lang="en-US" sz="2200" u="sng" dirty="0">
+                <a:latin typeface="Georgia" panose="02040502050405020303" pitchFamily="18" charset="0"/>
+              </a:rPr>
+              <a:t>The result was a depreciation of the dollar </a:t>
+            </a:r>
+            <a:r>
+              <a:rPr lang="en-US" sz="2200" dirty="0">
+                <a:latin typeface="Georgia" panose="02040502050405020303" pitchFamily="18" charset="0"/>
+              </a:rPr>
+              <a:t>and other industrialized nations' currencies…</a:t>
             </a:r>
           </a:p>
           <a:p>
@@ -11239,16 +11263,10 @@
               <a:buAutoNum type="arabicPeriod" startAt="2"/>
             </a:pPr>
             <a:r>
-              <a:rPr lang="en-US" sz="2200" dirty="0" err="1">
-                <a:latin typeface="Georgia" panose="02040502050405020303" pitchFamily="18" charset="0"/>
-              </a:rPr>
-              <a:t>Confonuding</a:t>
-            </a:r>
-            <a:r>
               <a:rPr lang="en-US" sz="2200" dirty="0">
                 <a:latin typeface="Georgia" panose="02040502050405020303" pitchFamily="18" charset="0"/>
               </a:rPr>
-              <a:t> &amp; Proximity of Q&amp;A</a:t>
+              <a:t>Confounding &amp; Proximity of Q&amp;A</a:t>
             </a:r>
           </a:p>
           <a:p>
@@ -11278,7 +11296,31 @@
               <a:rPr lang="en-US" sz="2200" dirty="0">
                 <a:latin typeface="Georgia" panose="02040502050405020303" pitchFamily="18" charset="0"/>
               </a:rPr>
-              <a:t> Following the Nice Treaty, there was an attempt to reform the constitutional law of the European Union and make it more transparent; … (40 </a:t>
+              <a:t> Following </a:t>
+            </a:r>
+            <a:r>
+              <a:rPr lang="en-US" sz="2200" u="sng" dirty="0">
+                <a:latin typeface="Georgia" panose="02040502050405020303" pitchFamily="18" charset="0"/>
+              </a:rPr>
+              <a:t>the Nice Treaty</a:t>
+            </a:r>
+            <a:r>
+              <a:rPr lang="en-US" sz="2200" dirty="0">
+                <a:latin typeface="Georgia" panose="02040502050405020303" pitchFamily="18" charset="0"/>
+              </a:rPr>
+              <a:t>, there was an attempt </a:t>
+            </a:r>
+            <a:r>
+              <a:rPr lang="en-US" sz="2200" u="sng" dirty="0">
+                <a:latin typeface="Georgia" panose="02040502050405020303" pitchFamily="18" charset="0"/>
+              </a:rPr>
+              <a:t>to reform the constitutional law</a:t>
+            </a:r>
+            <a:r>
+              <a:rPr lang="en-US" sz="2200" dirty="0">
+                <a:latin typeface="Georgia" panose="02040502050405020303" pitchFamily="18" charset="0"/>
+              </a:rPr>
+              <a:t> of the European Union and make it more transparent; … (40 </a:t>
             </a:r>
             <a:r>
               <a:rPr lang="en-US" altLang="zh-CN" sz="2200" dirty="0">
@@ -11290,7 +11332,19 @@
               <a:rPr lang="en-US" sz="2200" dirty="0">
                 <a:latin typeface="Georgia" panose="02040502050405020303" pitchFamily="18" charset="0"/>
               </a:rPr>
-              <a:t> Instead, the Lisbon Treaty was enacted…</a:t>
+              <a:t> Instead, </a:t>
+            </a:r>
+            <a:r>
+              <a:rPr lang="en-US" sz="2200" u="sng" dirty="0">
+                <a:latin typeface="Georgia" panose="02040502050405020303" pitchFamily="18" charset="0"/>
+              </a:rPr>
+              <a:t>the Lisbon Treaty </a:t>
+            </a:r>
+            <a:r>
+              <a:rPr lang="en-US" sz="2200" dirty="0">
+                <a:latin typeface="Georgia" panose="02040502050405020303" pitchFamily="18" charset="0"/>
+              </a:rPr>
+              <a:t>was enacted…</a:t>
             </a:r>
           </a:p>
           <a:p>
@@ -11339,7 +11393,7 @@
         </p:nvGrpSpPr>
         <p:grpSpPr>
           <a:xfrm>
-            <a:off x="23884561" y="4667461"/>
+            <a:off x="23884561" y="4564820"/>
             <a:ext cx="4461839" cy="3156726"/>
             <a:chOff x="23884561" y="4583381"/>
             <a:chExt cx="4461839" cy="3156726"/>
@@ -11541,7 +11595,7 @@
         </p:nvGrpSpPr>
         <p:grpSpPr>
           <a:xfrm>
-            <a:off x="28234098" y="4680131"/>
+            <a:off x="28234098" y="4577490"/>
             <a:ext cx="4265199" cy="3143033"/>
             <a:chOff x="28234098" y="4596051"/>
             <a:chExt cx="4265199" cy="3143033"/>
@@ -11782,7 +11836,7 @@
         </p:nvGrpSpPr>
         <p:grpSpPr>
           <a:xfrm>
-            <a:off x="31000893" y="6685772"/>
+            <a:off x="31000893" y="6583131"/>
             <a:ext cx="1707179" cy="738664"/>
             <a:chOff x="31124545" y="6601281"/>
             <a:chExt cx="1707179" cy="738664"/>
@@ -11901,14 +11955,14 @@
           <p:nvPr>
             <p:extLst>
               <p:ext uri="{D42A27DB-BD31-4B8C-83A1-F6EECF244321}">
-                <p14:modId xmlns:p14="http://schemas.microsoft.com/office/powerpoint/2010/main" val="1176680530"/>
+                <p14:modId xmlns:p14="http://schemas.microsoft.com/office/powerpoint/2010/main" val="1105238000"/>
               </p:ext>
             </p:extLst>
           </p:nvPr>
         </p:nvGraphicFramePr>
         <p:xfrm>
-          <a:off x="9622220" y="4513523"/>
-          <a:ext cx="7570076" cy="4319016"/>
+          <a:off x="16138123" y="4444024"/>
+          <a:ext cx="7162800" cy="4319016"/>
         </p:xfrm>
         <a:graphic>
           <a:graphicData uri="http://schemas.openxmlformats.org/drawingml/2006/table">
@@ -11917,28 +11971,28 @@
                 <a:tableStyleId>{5940675A-B579-460E-94D1-54222C63F5DA}</a:tableStyleId>
               </a:tblPr>
               <a:tblGrid>
-                <a:gridCol w="2413438">
+                <a:gridCol w="2377440">
                   <a:extLst>
                     <a:ext uri="{9D8B030D-6E8A-4147-A177-3AD203B41FA5}">
                       <a16:colId xmlns:a16="http://schemas.microsoft.com/office/drawing/2014/main" val="941148619"/>
                     </a:ext>
                   </a:extLst>
                 </a:gridCol>
-                <a:gridCol w="2413438">
+                <a:gridCol w="2499360">
                   <a:extLst>
                     <a:ext uri="{9D8B030D-6E8A-4147-A177-3AD203B41FA5}">
                       <a16:colId xmlns:a16="http://schemas.microsoft.com/office/drawing/2014/main" val="2557878258"/>
                     </a:ext>
                   </a:extLst>
                 </a:gridCol>
-                <a:gridCol w="1371600">
+                <a:gridCol w="1143000">
                   <a:extLst>
                     <a:ext uri="{9D8B030D-6E8A-4147-A177-3AD203B41FA5}">
                       <a16:colId xmlns:a16="http://schemas.microsoft.com/office/drawing/2014/main" val="640481716"/>
                     </a:ext>
                   </a:extLst>
                 </a:gridCol>
-                <a:gridCol w="1371600">
+                <a:gridCol w="1143000">
                   <a:extLst>
                     <a:ext uri="{9D8B030D-6E8A-4147-A177-3AD203B41FA5}">
                       <a16:colId xmlns:a16="http://schemas.microsoft.com/office/drawing/2014/main" val="3293780260"/>
@@ -12576,9 +12630,12 @@
                     <a:bodyPr/>
                     <a:lstStyle/>
                     <a:p>
-                      <a:endParaRPr lang="en-US" sz="2200" dirty="0">
-                        <a:latin typeface="Georgia" panose="02040502050405020303" pitchFamily="18" charset="0"/>
-                      </a:endParaRPr>
+                      <a:r>
+                        <a:rPr lang="en-US" sz="2200" dirty="0">
+                          <a:latin typeface="Georgia" panose="02040502050405020303" pitchFamily="18" charset="0"/>
+                        </a:rPr>
+                        <a:t>68.39</a:t>
+                      </a:r>
                     </a:p>
                   </a:txBody>
                   <a:tcPr/>
@@ -12588,9 +12645,12 @@
                     <a:bodyPr/>
                     <a:lstStyle/>
                     <a:p>
-                      <a:endParaRPr lang="en-US" sz="2200" dirty="0">
-                        <a:latin typeface="Georgia" panose="02040502050405020303" pitchFamily="18" charset="0"/>
-                      </a:endParaRPr>
+                      <a:r>
+                        <a:rPr lang="en-US" sz="2200" dirty="0">
+                          <a:latin typeface="Georgia" panose="02040502050405020303" pitchFamily="18" charset="0"/>
+                        </a:rPr>
+                        <a:t>64.86</a:t>
+                      </a:r>
                     </a:p>
                   </a:txBody>
                   <a:tcPr/>
@@ -12683,8 +12743,8 @@
         </p:nvSpPr>
         <p:spPr>
           <a:xfrm>
-            <a:off x="6057472" y="21534082"/>
-            <a:ext cx="2627584" cy="369332"/>
+            <a:off x="5621867" y="21534082"/>
+            <a:ext cx="3063189" cy="369332"/>
           </a:xfrm>
           <a:prstGeom prst="rect">
             <a:avLst/>
@@ -12698,19 +12758,27 @@
           <a:lstStyle/>
           <a:p>
             <a:r>
-              <a:rPr lang="en-US" b="1" dirty="0"/>
-              <a:t>Figure 1.</a:t>
-            </a:r>
-            <a:r>
-              <a:rPr lang="en-US" dirty="0"/>
+              <a:rPr lang="en-US" b="1" dirty="0">
+                <a:latin typeface="Georgia" panose="02040502050405020303" pitchFamily="18" charset="0"/>
+              </a:rPr>
+              <a:t>        Fig 1.</a:t>
+            </a:r>
+            <a:r>
+              <a:rPr lang="en-US" dirty="0">
+                <a:latin typeface="Georgia" panose="02040502050405020303" pitchFamily="18" charset="0"/>
+              </a:rPr>
               <a:t> </a:t>
             </a:r>
             <a:r>
-              <a:rPr lang="en-US" dirty="0" err="1"/>
+              <a:rPr lang="en-US" dirty="0" err="1">
+                <a:latin typeface="Georgia" panose="02040502050405020303" pitchFamily="18" charset="0"/>
+              </a:rPr>
               <a:t>QANet</a:t>
             </a:r>
             <a:r>
-              <a:rPr lang="en-US" dirty="0"/>
+              <a:rPr lang="en-US" dirty="0">
+                <a:latin typeface="Georgia" panose="02040502050405020303" pitchFamily="18" charset="0"/>
+              </a:rPr>
               <a:t> Diagram</a:t>
             </a:r>
           </a:p>
@@ -12730,7 +12798,7 @@
         </p:nvSpPr>
         <p:spPr>
           <a:xfrm>
-            <a:off x="21526501" y="13448451"/>
+            <a:off x="21526501" y="13655885"/>
             <a:ext cx="1790700" cy="369332"/>
           </a:xfrm>
           <a:prstGeom prst="rect">
@@ -12776,7 +12844,7 @@
         </p:nvSpPr>
         <p:spPr>
           <a:xfrm>
-            <a:off x="19454648" y="16826476"/>
+            <a:off x="19454648" y="16977465"/>
             <a:ext cx="3910155" cy="369332"/>
           </a:xfrm>
           <a:prstGeom prst="rect">
@@ -12819,7 +12887,7 @@
         </p:nvSpPr>
         <p:spPr>
           <a:xfrm>
-            <a:off x="25634975" y="4423549"/>
+            <a:off x="25646668" y="4320908"/>
             <a:ext cx="1524000" cy="369332"/>
           </a:xfrm>
           <a:prstGeom prst="rect">
@@ -12856,7 +12924,7 @@
         </p:nvSpPr>
         <p:spPr>
           <a:xfrm>
-            <a:off x="29909730" y="4423549"/>
+            <a:off x="29909730" y="4320908"/>
             <a:ext cx="1524000" cy="369332"/>
           </a:xfrm>
           <a:prstGeom prst="rect">
@@ -12893,7 +12961,7 @@
         </p:nvSpPr>
         <p:spPr>
           <a:xfrm>
-            <a:off x="24236560" y="7823164"/>
+            <a:off x="24236560" y="8244289"/>
             <a:ext cx="8262735" cy="5170646"/>
           </a:xfrm>
           <a:prstGeom prst="rect">
@@ -13072,7 +13140,7 @@
         </p:nvSpPr>
         <p:spPr>
           <a:xfrm>
-            <a:off x="11544299" y="8862289"/>
+            <a:off x="17697172" y="8789102"/>
             <a:ext cx="5647997" cy="369332"/>
           </a:xfrm>
           <a:prstGeom prst="rect">
@@ -13115,7 +13183,7 @@
         </p:nvSpPr>
         <p:spPr>
           <a:xfrm>
-            <a:off x="17626599" y="5057348"/>
+            <a:off x="16177341" y="9448424"/>
             <a:ext cx="1916932" cy="790834"/>
           </a:xfrm>
           <a:prstGeom prst="ellipse">
@@ -13169,7 +13237,7 @@
         </p:nvSpPr>
         <p:spPr>
           <a:xfrm>
-            <a:off x="19166693" y="5762131"/>
+            <a:off x="18807135" y="9443054"/>
             <a:ext cx="1916932" cy="790835"/>
           </a:xfrm>
           <a:prstGeom prst="ellipse">
@@ -13223,7 +13291,7 @@
         </p:nvSpPr>
         <p:spPr>
           <a:xfrm>
-            <a:off x="20803077" y="6538466"/>
+            <a:off x="21383235" y="9450270"/>
             <a:ext cx="1916932" cy="790835"/>
           </a:xfrm>
           <a:prstGeom prst="ellipse">
@@ -13277,8 +13345,8 @@
         </p:nvSpPr>
         <p:spPr>
           <a:xfrm>
-            <a:off x="17508731" y="4519765"/>
-            <a:ext cx="5436057" cy="430887"/>
+            <a:off x="18253573" y="10832747"/>
+            <a:ext cx="5108574" cy="369332"/>
           </a:xfrm>
           <a:prstGeom prst="rect">
             <a:avLst/>
@@ -13292,7 +13360,13 @@
           <a:lstStyle/>
           <a:p>
             <a:r>
-              <a:rPr lang="en-US" sz="2200" dirty="0">
+              <a:rPr lang="en-US" b="1" dirty="0">
+                <a:latin typeface="Georgia" panose="02040502050405020303" pitchFamily="18" charset="0"/>
+              </a:rPr>
+              <a:t>Fig 4. </a:t>
+            </a:r>
+            <a:r>
+              <a:rPr lang="en-US" dirty="0">
                 <a:latin typeface="Georgia" panose="02040502050405020303" pitchFamily="18" charset="0"/>
               </a:rPr>
               <a:t>Tuning Sequence (due to time constraint)</a:t>
@@ -13312,17 +13386,20 @@
           <p:cNvCxnSpPr>
             <a:cxnSpLocks/>
             <a:stCxn id="45" idx="6"/>
-            <a:endCxn id="131" idx="0"/>
+            <a:endCxn id="131" idx="4"/>
           </p:cNvCxnSpPr>
           <p:nvPr/>
         </p:nvCxnSpPr>
         <p:spPr>
           <a:xfrm>
-            <a:off x="19543531" y="5452765"/>
-            <a:ext cx="581628" cy="309366"/>
+            <a:off x="18094273" y="9843841"/>
+            <a:ext cx="1671328" cy="390048"/>
           </a:xfrm>
-          <a:prstGeom prst="curvedConnector2">
-            <a:avLst/>
+          <a:prstGeom prst="curvedConnector4">
+            <a:avLst>
+              <a:gd name="adj1" fmla="val 21326"/>
+              <a:gd name="adj2" fmla="val 158608"/>
+            </a:avLst>
           </a:prstGeom>
           <a:ln>
             <a:tailEnd type="triangle"/>
@@ -13357,7 +13434,7 @@
         </p:nvSpPr>
         <p:spPr>
           <a:xfrm>
-            <a:off x="19794550" y="5189592"/>
+            <a:off x="17445323" y="10420238"/>
             <a:ext cx="1973250" cy="400110"/>
           </a:xfrm>
           <a:prstGeom prst="rect">
@@ -13392,17 +13469,20 @@
           <p:cNvCxnSpPr>
             <a:cxnSpLocks/>
             <a:stCxn id="131" idx="6"/>
-            <a:endCxn id="132" idx="0"/>
+            <a:endCxn id="132" idx="4"/>
           </p:cNvCxnSpPr>
           <p:nvPr/>
         </p:nvCxnSpPr>
         <p:spPr>
           <a:xfrm>
-            <a:off x="21083625" y="6157549"/>
-            <a:ext cx="677918" cy="380917"/>
+            <a:off x="20724067" y="9838472"/>
+            <a:ext cx="1617634" cy="402633"/>
           </a:xfrm>
-          <a:prstGeom prst="curvedConnector2">
-            <a:avLst/>
+          <a:prstGeom prst="curvedConnector4">
+            <a:avLst>
+              <a:gd name="adj1" fmla="val 20374"/>
+              <a:gd name="adj2" fmla="val 156776"/>
+            </a:avLst>
           </a:prstGeom>
           <a:ln>
             <a:tailEnd type="triangle"/>
@@ -13437,8 +13517,8 @@
         </p:nvSpPr>
         <p:spPr>
           <a:xfrm>
-            <a:off x="21524848" y="5733895"/>
-            <a:ext cx="1716152" cy="646331"/>
+            <a:off x="19909324" y="10436804"/>
+            <a:ext cx="2874294" cy="400110"/>
           </a:xfrm>
           <a:prstGeom prst="rect">
             <a:avLst/>
@@ -13452,24 +13532,24 @@
           <a:lstStyle/>
           <a:p>
             <a:r>
-              <a:rPr lang="en-US" sz="1800" dirty="0">
+              <a:rPr lang="en-US" sz="2000" dirty="0">
                 <a:latin typeface="Georgia" panose="02040502050405020303" pitchFamily="18" charset="0"/>
               </a:rPr>
               <a:t>Best </a:t>
             </a:r>
             <a:r>
-              <a:rPr lang="en-US" sz="1800" dirty="0" err="1">
+              <a:rPr lang="en-US" sz="2000" dirty="0" err="1">
                 <a:latin typeface="Georgia" panose="02040502050405020303" pitchFamily="18" charset="0"/>
               </a:rPr>
               <a:t>LR+Drop</a:t>
             </a:r>
             <a:r>
-              <a:rPr lang="en-US" sz="1800" dirty="0">
+              <a:rPr lang="en-US" sz="2000" dirty="0">
                 <a:latin typeface="Georgia" panose="02040502050405020303" pitchFamily="18" charset="0"/>
               </a:rPr>
               <a:t> Params</a:t>
             </a:r>
-            <a:endParaRPr lang="en-US" dirty="0"/>
+            <a:endParaRPr lang="en-US" sz="2000" dirty="0"/>
           </a:p>
         </p:txBody>
       </p:sp>
@@ -13487,7 +13567,7 @@
         </p:nvSpPr>
         <p:spPr>
           <a:xfrm>
-            <a:off x="24011466" y="14112539"/>
+            <a:off x="24011466" y="14407550"/>
             <a:ext cx="8487829" cy="3816429"/>
           </a:xfrm>
           <a:prstGeom prst="rect">
@@ -13568,6 +13648,1223 @@
                 <a:latin typeface="Georgia" panose="02040502050405020303" pitchFamily="18" charset="0"/>
               </a:rPr>
               <a:t> models together by averaging the output probabilities</a:t>
+            </a:r>
+          </a:p>
+        </p:txBody>
+      </p:sp>
+      <p:sp>
+        <p:nvSpPr>
+          <p:cNvPr id="62" name="TextBox 61">
+            <a:extLst>
+              <a:ext uri="{FF2B5EF4-FFF2-40B4-BE49-F238E27FC236}">
+                <a16:creationId xmlns:a16="http://schemas.microsoft.com/office/drawing/2014/main" id="{1DE8072D-4C06-4893-91C4-D504BD99C48D}"/>
+              </a:ext>
+            </a:extLst>
+          </p:cNvPr>
+          <p:cNvSpPr txBox="1"/>
+          <p:nvPr/>
+        </p:nvSpPr>
+        <p:spPr>
+          <a:xfrm>
+            <a:off x="23622756" y="479146"/>
+            <a:ext cx="8827310" cy="1384995"/>
+          </a:xfrm>
+          <a:prstGeom prst="rect">
+            <a:avLst/>
+          </a:prstGeom>
+          <a:noFill/>
+        </p:spPr>
+        <p:txBody>
+          <a:bodyPr wrap="square" rtlCol="0">
+            <a:spAutoFit/>
+          </a:bodyPr>
+          <a:lstStyle/>
+          <a:p>
+            <a:pPr algn="r"/>
+            <a:r>
+              <a:rPr lang="en-US" sz="4400" dirty="0">
+                <a:solidFill>
+                  <a:schemeClr val="bg1"/>
+                </a:solidFill>
+                <a:latin typeface="Georgia" panose="02040502050405020303" pitchFamily="18" charset="0"/>
+              </a:rPr>
+              <a:t>CS224n: NLP with Deep Learning </a:t>
+            </a:r>
+          </a:p>
+          <a:p>
+            <a:pPr algn="r"/>
+            <a:r>
+              <a:rPr lang="en-US" sz="4000" dirty="0">
+                <a:solidFill>
+                  <a:schemeClr val="bg1"/>
+                </a:solidFill>
+                <a:latin typeface="Georgia" panose="02040502050405020303" pitchFamily="18" charset="0"/>
+              </a:rPr>
+              <a:t>Poster Presentation, Winter 2022</a:t>
+            </a:r>
+          </a:p>
+        </p:txBody>
+      </p:sp>
+      <p:grpSp>
+        <p:nvGrpSpPr>
+          <p:cNvPr id="76" name="Group 75">
+            <a:extLst>
+              <a:ext uri="{FF2B5EF4-FFF2-40B4-BE49-F238E27FC236}">
+                <a16:creationId xmlns:a16="http://schemas.microsoft.com/office/drawing/2014/main" id="{BD45C525-CCC4-45A7-B88D-72CD59523F63}"/>
+              </a:ext>
+            </a:extLst>
+          </p:cNvPr>
+          <p:cNvGrpSpPr/>
+          <p:nvPr/>
+        </p:nvGrpSpPr>
+        <p:grpSpPr>
+          <a:xfrm>
+            <a:off x="10892501" y="7801551"/>
+            <a:ext cx="4725739" cy="3281082"/>
+            <a:chOff x="10016773" y="4642462"/>
+            <a:chExt cx="4725739" cy="3281082"/>
+          </a:xfrm>
+        </p:grpSpPr>
+        <p:grpSp>
+          <p:nvGrpSpPr>
+            <p:cNvPr id="74" name="Group 73">
+              <a:extLst>
+                <a:ext uri="{FF2B5EF4-FFF2-40B4-BE49-F238E27FC236}">
+                  <a16:creationId xmlns:a16="http://schemas.microsoft.com/office/drawing/2014/main" id="{3618FF7C-ADA4-4482-A2BD-89F0F2C78DAA}"/>
+                </a:ext>
+              </a:extLst>
+            </p:cNvPr>
+            <p:cNvGrpSpPr/>
+            <p:nvPr/>
+          </p:nvGrpSpPr>
+          <p:grpSpPr>
+            <a:xfrm>
+              <a:off x="10307128" y="4642462"/>
+              <a:ext cx="4435384" cy="3281082"/>
+              <a:chOff x="10307128" y="4642462"/>
+              <a:chExt cx="4435384" cy="3281082"/>
+            </a:xfrm>
+          </p:grpSpPr>
+          <p:pic>
+            <p:nvPicPr>
+              <p:cNvPr id="64" name="Picture 63" descr="Chart, scatter chart&#10;&#10;Description automatically generated">
+                <a:extLst>
+                  <a:ext uri="{FF2B5EF4-FFF2-40B4-BE49-F238E27FC236}">
+                    <a16:creationId xmlns:a16="http://schemas.microsoft.com/office/drawing/2014/main" id="{06EF8F45-A90B-4855-8AE4-7664A020D78F}"/>
+                  </a:ext>
+                </a:extLst>
+              </p:cNvPr>
+              <p:cNvPicPr>
+                <a:picLocks noChangeAspect="1"/>
+              </p:cNvPicPr>
+              <p:nvPr/>
+            </p:nvPicPr>
+            <p:blipFill rotWithShape="1">
+              <a:blip r:embed="rId5">
+                <a:extLst>
+                  <a:ext uri="{28A0092B-C50C-407E-A947-70E740481C1C}">
+                    <a14:useLocalDpi xmlns:a14="http://schemas.microsoft.com/office/drawing/2010/main" val="0"/>
+                  </a:ext>
+                </a:extLst>
+              </a:blip>
+              <a:srcRect l="4728" t="6358" r="19119" b="7008"/>
+              <a:stretch/>
+            </p:blipFill>
+            <p:spPr>
+              <a:xfrm>
+                <a:off x="10617600" y="4651171"/>
+                <a:ext cx="3962638" cy="2875346"/>
+              </a:xfrm>
+              <a:prstGeom prst="rect">
+                <a:avLst/>
+              </a:prstGeom>
+            </p:spPr>
+          </p:pic>
+          <p:sp>
+            <p:nvSpPr>
+              <p:cNvPr id="65" name="TextBox 64">
+                <a:extLst>
+                  <a:ext uri="{FF2B5EF4-FFF2-40B4-BE49-F238E27FC236}">
+                    <a16:creationId xmlns:a16="http://schemas.microsoft.com/office/drawing/2014/main" id="{503A79CA-BE85-4297-A2A0-2C85877DCCA6}"/>
+                  </a:ext>
+                </a:extLst>
+              </p:cNvPr>
+              <p:cNvSpPr txBox="1"/>
+              <p:nvPr/>
+            </p:nvSpPr>
+            <p:spPr>
+              <a:xfrm>
+                <a:off x="10307128" y="4642462"/>
+                <a:ext cx="720652" cy="300082"/>
+              </a:xfrm>
+              <a:prstGeom prst="rect">
+                <a:avLst/>
+              </a:prstGeom>
+              <a:noFill/>
+            </p:spPr>
+            <p:txBody>
+              <a:bodyPr wrap="square" rtlCol="0">
+                <a:spAutoFit/>
+              </a:bodyPr>
+              <a:lstStyle/>
+              <a:p>
+                <a:r>
+                  <a:rPr lang="en-US" sz="1300" dirty="0">
+                    <a:latin typeface="Georgia" panose="02040502050405020303" pitchFamily="18" charset="0"/>
+                  </a:rPr>
+                  <a:t>70</a:t>
+                </a:r>
+              </a:p>
+            </p:txBody>
+          </p:sp>
+          <p:sp>
+            <p:nvSpPr>
+              <p:cNvPr id="149" name="TextBox 148">
+                <a:extLst>
+                  <a:ext uri="{FF2B5EF4-FFF2-40B4-BE49-F238E27FC236}">
+                    <a16:creationId xmlns:a16="http://schemas.microsoft.com/office/drawing/2014/main" id="{E4ED8724-E8BD-4CD1-AF28-E7AE97943362}"/>
+                  </a:ext>
+                </a:extLst>
+              </p:cNvPr>
+              <p:cNvSpPr txBox="1"/>
+              <p:nvPr/>
+            </p:nvSpPr>
+            <p:spPr>
+              <a:xfrm>
+                <a:off x="10307128" y="5253948"/>
+                <a:ext cx="720652" cy="300082"/>
+              </a:xfrm>
+              <a:prstGeom prst="rect">
+                <a:avLst/>
+              </a:prstGeom>
+              <a:noFill/>
+            </p:spPr>
+            <p:txBody>
+              <a:bodyPr wrap="square" rtlCol="0">
+                <a:spAutoFit/>
+              </a:bodyPr>
+              <a:lstStyle/>
+              <a:p>
+                <a:r>
+                  <a:rPr lang="en-US" sz="1300" dirty="0">
+                    <a:latin typeface="Georgia" panose="02040502050405020303" pitchFamily="18" charset="0"/>
+                  </a:rPr>
+                  <a:t>65</a:t>
+                </a:r>
+              </a:p>
+            </p:txBody>
+          </p:sp>
+          <p:sp>
+            <p:nvSpPr>
+              <p:cNvPr id="150" name="TextBox 149">
+                <a:extLst>
+                  <a:ext uri="{FF2B5EF4-FFF2-40B4-BE49-F238E27FC236}">
+                    <a16:creationId xmlns:a16="http://schemas.microsoft.com/office/drawing/2014/main" id="{761D46EA-C00D-4F01-9515-F763D5FEDB90}"/>
+                  </a:ext>
+                </a:extLst>
+              </p:cNvPr>
+              <p:cNvSpPr txBox="1"/>
+              <p:nvPr/>
+            </p:nvSpPr>
+            <p:spPr>
+              <a:xfrm>
+                <a:off x="10307128" y="5938803"/>
+                <a:ext cx="720652" cy="300082"/>
+              </a:xfrm>
+              <a:prstGeom prst="rect">
+                <a:avLst/>
+              </a:prstGeom>
+              <a:noFill/>
+            </p:spPr>
+            <p:txBody>
+              <a:bodyPr wrap="square" rtlCol="0">
+                <a:spAutoFit/>
+              </a:bodyPr>
+              <a:lstStyle/>
+              <a:p>
+                <a:r>
+                  <a:rPr lang="en-US" sz="1300" dirty="0">
+                    <a:latin typeface="Georgia" panose="02040502050405020303" pitchFamily="18" charset="0"/>
+                  </a:rPr>
+                  <a:t>60</a:t>
+                </a:r>
+              </a:p>
+            </p:txBody>
+          </p:sp>
+          <p:sp>
+            <p:nvSpPr>
+              <p:cNvPr id="151" name="TextBox 150">
+                <a:extLst>
+                  <a:ext uri="{FF2B5EF4-FFF2-40B4-BE49-F238E27FC236}">
+                    <a16:creationId xmlns:a16="http://schemas.microsoft.com/office/drawing/2014/main" id="{122DA172-2284-49DB-8585-EECA296CE6A3}"/>
+                  </a:ext>
+                </a:extLst>
+              </p:cNvPr>
+              <p:cNvSpPr txBox="1"/>
+              <p:nvPr/>
+            </p:nvSpPr>
+            <p:spPr>
+              <a:xfrm>
+                <a:off x="10307128" y="6562825"/>
+                <a:ext cx="720652" cy="300082"/>
+              </a:xfrm>
+              <a:prstGeom prst="rect">
+                <a:avLst/>
+              </a:prstGeom>
+              <a:noFill/>
+            </p:spPr>
+            <p:txBody>
+              <a:bodyPr wrap="square" rtlCol="0">
+                <a:spAutoFit/>
+              </a:bodyPr>
+              <a:lstStyle/>
+              <a:p>
+                <a:r>
+                  <a:rPr lang="en-US" sz="1300" dirty="0">
+                    <a:latin typeface="Georgia" panose="02040502050405020303" pitchFamily="18" charset="0"/>
+                  </a:rPr>
+                  <a:t>55</a:t>
+                </a:r>
+              </a:p>
+            </p:txBody>
+          </p:sp>
+          <p:sp>
+            <p:nvSpPr>
+              <p:cNvPr id="152" name="TextBox 151">
+                <a:extLst>
+                  <a:ext uri="{FF2B5EF4-FFF2-40B4-BE49-F238E27FC236}">
+                    <a16:creationId xmlns:a16="http://schemas.microsoft.com/office/drawing/2014/main" id="{EA2FA2CD-2439-4759-A05B-D1836D956A56}"/>
+                  </a:ext>
+                </a:extLst>
+              </p:cNvPr>
+              <p:cNvSpPr txBox="1"/>
+              <p:nvPr/>
+            </p:nvSpPr>
+            <p:spPr>
+              <a:xfrm>
+                <a:off x="10307128" y="7226435"/>
+                <a:ext cx="720652" cy="300082"/>
+              </a:xfrm>
+              <a:prstGeom prst="rect">
+                <a:avLst/>
+              </a:prstGeom>
+              <a:noFill/>
+            </p:spPr>
+            <p:txBody>
+              <a:bodyPr wrap="square" rtlCol="0">
+                <a:spAutoFit/>
+              </a:bodyPr>
+              <a:lstStyle/>
+              <a:p>
+                <a:r>
+                  <a:rPr lang="en-US" sz="1300" dirty="0">
+                    <a:latin typeface="Georgia" panose="02040502050405020303" pitchFamily="18" charset="0"/>
+                  </a:rPr>
+                  <a:t>50</a:t>
+                </a:r>
+              </a:p>
+            </p:txBody>
+          </p:sp>
+          <p:sp>
+            <p:nvSpPr>
+              <p:cNvPr id="66" name="TextBox 65">
+                <a:extLst>
+                  <a:ext uri="{FF2B5EF4-FFF2-40B4-BE49-F238E27FC236}">
+                    <a16:creationId xmlns:a16="http://schemas.microsoft.com/office/drawing/2014/main" id="{30A30B87-9D39-42EB-8249-52CBF79D1603}"/>
+                  </a:ext>
+                </a:extLst>
+              </p:cNvPr>
+              <p:cNvSpPr txBox="1"/>
+              <p:nvPr/>
+            </p:nvSpPr>
+            <p:spPr>
+              <a:xfrm>
+                <a:off x="10530479" y="7431101"/>
+                <a:ext cx="4212033" cy="492443"/>
+              </a:xfrm>
+              <a:prstGeom prst="rect">
+                <a:avLst/>
+              </a:prstGeom>
+              <a:noFill/>
+            </p:spPr>
+            <p:txBody>
+              <a:bodyPr wrap="square" rtlCol="0">
+                <a:spAutoFit/>
+              </a:bodyPr>
+              <a:lstStyle/>
+              <a:p>
+                <a:r>
+                  <a:rPr lang="en-US" sz="1300" dirty="0">
+                    <a:latin typeface="Georgia" panose="02040502050405020303" pitchFamily="18" charset="0"/>
+                  </a:rPr>
+                  <a:t>   0.0		  2.5		  5.0	  	 7.5		10.0</a:t>
+                </a:r>
+              </a:p>
+              <a:p>
+                <a:pPr algn="ctr"/>
+                <a:r>
+                  <a:rPr lang="en-US" sz="1300" dirty="0">
+                    <a:latin typeface="Georgia" panose="02040502050405020303" pitchFamily="18" charset="0"/>
+                  </a:rPr>
+                  <a:t>Relative Training Time (</a:t>
+                </a:r>
+                <a:r>
+                  <a:rPr lang="en-US" sz="1300" dirty="0" err="1">
+                    <a:latin typeface="Georgia" panose="02040502050405020303" pitchFamily="18" charset="0"/>
+                  </a:rPr>
+                  <a:t>hrs</a:t>
+                </a:r>
+                <a:r>
+                  <a:rPr lang="en-US" sz="1300" dirty="0">
+                    <a:latin typeface="Georgia" panose="02040502050405020303" pitchFamily="18" charset="0"/>
+                  </a:rPr>
+                  <a:t>)</a:t>
+                </a:r>
+              </a:p>
+            </p:txBody>
+          </p:sp>
+          <p:grpSp>
+            <p:nvGrpSpPr>
+              <p:cNvPr id="73" name="Group 72">
+                <a:extLst>
+                  <a:ext uri="{FF2B5EF4-FFF2-40B4-BE49-F238E27FC236}">
+                    <a16:creationId xmlns:a16="http://schemas.microsoft.com/office/drawing/2014/main" id="{5AA4F39D-EB15-4DFA-B733-3FCBF1ED26F9}"/>
+                  </a:ext>
+                </a:extLst>
+              </p:cNvPr>
+              <p:cNvGrpSpPr/>
+              <p:nvPr/>
+            </p:nvGrpSpPr>
+            <p:grpSpPr>
+              <a:xfrm>
+                <a:off x="13193592" y="6599135"/>
+                <a:ext cx="1247309" cy="692497"/>
+                <a:chOff x="13319516" y="6414422"/>
+                <a:chExt cx="1247309" cy="692497"/>
+              </a:xfrm>
+            </p:grpSpPr>
+            <p:pic>
+              <p:nvPicPr>
+                <p:cNvPr id="167" name="Picture 166" descr="Chart, scatter chart&#10;&#10;Description automatically generated">
+                  <a:extLst>
+                    <a:ext uri="{FF2B5EF4-FFF2-40B4-BE49-F238E27FC236}">
+                      <a16:creationId xmlns:a16="http://schemas.microsoft.com/office/drawing/2014/main" id="{55238FEF-FD13-4107-A37B-B353782DFB50}"/>
+                    </a:ext>
+                  </a:extLst>
+                </p:cNvPr>
+                <p:cNvPicPr>
+                  <a:picLocks noChangeAspect="1"/>
+                </p:cNvPicPr>
+                <p:nvPr/>
+              </p:nvPicPr>
+              <p:blipFill rotWithShape="1">
+                <a:blip r:embed="rId5">
+                  <a:clrChange>
+                    <a:clrFrom>
+                      <a:srgbClr val="FFFFFF"/>
+                    </a:clrFrom>
+                    <a:clrTo>
+                      <a:srgbClr val="FFFFFF">
+                        <a:alpha val="0"/>
+                      </a:srgbClr>
+                    </a:clrTo>
+                  </a:clrChange>
+                  <a:extLst>
+                    <a:ext uri="{28A0092B-C50C-407E-A947-70E740481C1C}">
+                      <a14:useLocalDpi xmlns:a14="http://schemas.microsoft.com/office/drawing/2010/main" val="0"/>
+                    </a:ext>
+                  </a:extLst>
+                </a:blip>
+                <a:srcRect l="83630" t="44480" r="12995" b="43544"/>
+                <a:stretch/>
+              </p:blipFill>
+              <p:spPr>
+                <a:xfrm>
+                  <a:off x="13319516" y="6428844"/>
+                  <a:ext cx="278675" cy="630919"/>
+                </a:xfrm>
+                <a:prstGeom prst="rect">
+                  <a:avLst/>
+                </a:prstGeom>
+              </p:spPr>
+            </p:pic>
+            <p:sp>
+              <p:nvSpPr>
+                <p:cNvPr id="72" name="TextBox 71">
+                  <a:extLst>
+                    <a:ext uri="{FF2B5EF4-FFF2-40B4-BE49-F238E27FC236}">
+                      <a16:creationId xmlns:a16="http://schemas.microsoft.com/office/drawing/2014/main" id="{F100A753-BD79-40BD-B9D8-92BE22220A05}"/>
+                    </a:ext>
+                  </a:extLst>
+                </p:cNvPr>
+                <p:cNvSpPr txBox="1"/>
+                <p:nvPr/>
+              </p:nvSpPr>
+              <p:spPr>
+                <a:xfrm>
+                  <a:off x="13504742" y="6414422"/>
+                  <a:ext cx="1062083" cy="692497"/>
+                </a:xfrm>
+                <a:prstGeom prst="rect">
+                  <a:avLst/>
+                </a:prstGeom>
+                <a:noFill/>
+              </p:spPr>
+              <p:txBody>
+                <a:bodyPr wrap="square" rtlCol="0">
+                  <a:spAutoFit/>
+                </a:bodyPr>
+                <a:lstStyle/>
+                <a:p>
+                  <a:r>
+                    <a:rPr lang="en-US" sz="1300" dirty="0">
+                      <a:latin typeface="Georgia" panose="02040502050405020303" pitchFamily="18" charset="0"/>
+                    </a:rPr>
+                    <a:t>Rep 7, B 30</a:t>
+                  </a:r>
+                </a:p>
+                <a:p>
+                  <a:r>
+                    <a:rPr lang="en-US" sz="1300" dirty="0">
+                      <a:latin typeface="Georgia" panose="02040502050405020303" pitchFamily="18" charset="0"/>
+                    </a:rPr>
+                    <a:t>Rep 5, B 40</a:t>
+                  </a:r>
+                </a:p>
+                <a:p>
+                  <a:r>
+                    <a:rPr lang="en-US" sz="1300" dirty="0">
+                      <a:latin typeface="Georgia" panose="02040502050405020303" pitchFamily="18" charset="0"/>
+                    </a:rPr>
+                    <a:t>Rep 4, B 48</a:t>
+                  </a:r>
+                </a:p>
+              </p:txBody>
+            </p:sp>
+          </p:grpSp>
+        </p:grpSp>
+        <p:sp>
+          <p:nvSpPr>
+            <p:cNvPr id="156" name="TextBox 155">
+              <a:extLst>
+                <a:ext uri="{FF2B5EF4-FFF2-40B4-BE49-F238E27FC236}">
+                  <a16:creationId xmlns:a16="http://schemas.microsoft.com/office/drawing/2014/main" id="{ADBC6C46-B4E2-4B94-B864-AEE631140633}"/>
+                </a:ext>
+              </a:extLst>
+            </p:cNvPr>
+            <p:cNvSpPr txBox="1"/>
+            <p:nvPr/>
+          </p:nvSpPr>
+          <p:spPr>
+            <a:xfrm>
+              <a:off x="10016773" y="4976061"/>
+              <a:ext cx="415498" cy="1563162"/>
+            </a:xfrm>
+            <a:prstGeom prst="rect">
+              <a:avLst/>
+            </a:prstGeom>
+            <a:noFill/>
+          </p:spPr>
+          <p:txBody>
+            <a:bodyPr vert="vert270" wrap="square" rtlCol="0">
+              <a:spAutoFit/>
+            </a:bodyPr>
+            <a:lstStyle/>
+            <a:p>
+              <a:r>
+                <a:rPr lang="en-US" sz="1500" dirty="0">
+                  <a:latin typeface="Georgia" panose="02040502050405020303" pitchFamily="18" charset="0"/>
+                </a:rPr>
+                <a:t>F1 Score</a:t>
+              </a:r>
+            </a:p>
+          </p:txBody>
+        </p:sp>
+      </p:grpSp>
+      <p:grpSp>
+        <p:nvGrpSpPr>
+          <p:cNvPr id="86" name="Group 85">
+            <a:extLst>
+              <a:ext uri="{FF2B5EF4-FFF2-40B4-BE49-F238E27FC236}">
+                <a16:creationId xmlns:a16="http://schemas.microsoft.com/office/drawing/2014/main" id="{0ABC3776-FB2E-44E8-A7AA-A0F63BD2BC82}"/>
+              </a:ext>
+            </a:extLst>
+          </p:cNvPr>
+          <p:cNvGrpSpPr/>
+          <p:nvPr/>
+        </p:nvGrpSpPr>
+        <p:grpSpPr>
+          <a:xfrm>
+            <a:off x="10865294" y="4358369"/>
+            <a:ext cx="4650150" cy="3248329"/>
+            <a:chOff x="10208819" y="8047577"/>
+            <a:chExt cx="4650150" cy="3248329"/>
+          </a:xfrm>
+        </p:grpSpPr>
+        <p:grpSp>
+          <p:nvGrpSpPr>
+            <p:cNvPr id="82" name="Group 81">
+              <a:extLst>
+                <a:ext uri="{FF2B5EF4-FFF2-40B4-BE49-F238E27FC236}">
+                  <a16:creationId xmlns:a16="http://schemas.microsoft.com/office/drawing/2014/main" id="{DB279A4C-B040-4216-994B-4465CA352B93}"/>
+                </a:ext>
+              </a:extLst>
+            </p:cNvPr>
+            <p:cNvGrpSpPr/>
+            <p:nvPr/>
+          </p:nvGrpSpPr>
+          <p:grpSpPr>
+            <a:xfrm>
+              <a:off x="10208819" y="8047577"/>
+              <a:ext cx="4650150" cy="3248329"/>
+              <a:chOff x="10189769" y="7742773"/>
+              <a:chExt cx="4650150" cy="3248329"/>
+            </a:xfrm>
+          </p:grpSpPr>
+          <p:grpSp>
+            <p:nvGrpSpPr>
+              <p:cNvPr id="79" name="Group 78">
+                <a:extLst>
+                  <a:ext uri="{FF2B5EF4-FFF2-40B4-BE49-F238E27FC236}">
+                    <a16:creationId xmlns:a16="http://schemas.microsoft.com/office/drawing/2014/main" id="{270EC5E9-22F5-4906-A10D-436ADE442242}"/>
+                  </a:ext>
+                </a:extLst>
+              </p:cNvPr>
+              <p:cNvGrpSpPr/>
+              <p:nvPr/>
+            </p:nvGrpSpPr>
+            <p:grpSpPr>
+              <a:xfrm>
+                <a:off x="10627886" y="7866575"/>
+                <a:ext cx="4212033" cy="3124527"/>
+                <a:chOff x="10627886" y="7866575"/>
+                <a:chExt cx="4212033" cy="3124527"/>
+              </a:xfrm>
+            </p:grpSpPr>
+            <p:pic>
+              <p:nvPicPr>
+                <p:cNvPr id="78" name="Picture 77" descr="Chart, line chart&#10;&#10;Description automatically generated">
+                  <a:extLst>
+                    <a:ext uri="{FF2B5EF4-FFF2-40B4-BE49-F238E27FC236}">
+                      <a16:creationId xmlns:a16="http://schemas.microsoft.com/office/drawing/2014/main" id="{C7B7A14B-44FE-40B9-8DEA-B6BB0DF22717}"/>
+                    </a:ext>
+                  </a:extLst>
+                </p:cNvPr>
+                <p:cNvPicPr>
+                  <a:picLocks noChangeAspect="1"/>
+                </p:cNvPicPr>
+                <p:nvPr/>
+              </p:nvPicPr>
+              <p:blipFill rotWithShape="1">
+                <a:blip r:embed="rId6">
+                  <a:extLst>
+                    <a:ext uri="{28A0092B-C50C-407E-A947-70E740481C1C}">
+                      <a14:useLocalDpi xmlns:a14="http://schemas.microsoft.com/office/drawing/2010/main" val="0"/>
+                    </a:ext>
+                  </a:extLst>
+                </a:blip>
+                <a:srcRect l="4952" t="6438" r="13839" b="6617"/>
+                <a:stretch/>
+              </p:blipFill>
+              <p:spPr>
+                <a:xfrm>
+                  <a:off x="10805593" y="7866575"/>
+                  <a:ext cx="3974563" cy="2714171"/>
+                </a:xfrm>
+                <a:prstGeom prst="rect">
+                  <a:avLst/>
+                </a:prstGeom>
+              </p:spPr>
+            </p:pic>
+            <p:sp>
+              <p:nvSpPr>
+                <p:cNvPr id="201" name="TextBox 200">
+                  <a:extLst>
+                    <a:ext uri="{FF2B5EF4-FFF2-40B4-BE49-F238E27FC236}">
+                      <a16:creationId xmlns:a16="http://schemas.microsoft.com/office/drawing/2014/main" id="{80D533E9-9E4F-4CB9-AC26-7EBA2206761A}"/>
+                    </a:ext>
+                  </a:extLst>
+                </p:cNvPr>
+                <p:cNvSpPr txBox="1"/>
+                <p:nvPr/>
+              </p:nvSpPr>
+              <p:spPr>
+                <a:xfrm>
+                  <a:off x="10627886" y="10498659"/>
+                  <a:ext cx="4212033" cy="492443"/>
+                </a:xfrm>
+                <a:prstGeom prst="rect">
+                  <a:avLst/>
+                </a:prstGeom>
+                <a:noFill/>
+              </p:spPr>
+              <p:txBody>
+                <a:bodyPr wrap="square" rtlCol="0">
+                  <a:spAutoFit/>
+                </a:bodyPr>
+                <a:lstStyle/>
+                <a:p>
+                  <a:r>
+                    <a:rPr lang="en-US" sz="1300" dirty="0">
+                      <a:latin typeface="Georgia" panose="02040502050405020303" pitchFamily="18" charset="0"/>
+                    </a:rPr>
+                    <a:t>     0		      1e+6		2e+6	  	     3e+6</a:t>
+                  </a:r>
+                </a:p>
+                <a:p>
+                  <a:pPr algn="ctr"/>
+                  <a:r>
+                    <a:rPr lang="en-US" sz="1300" dirty="0">
+                      <a:latin typeface="Georgia" panose="02040502050405020303" pitchFamily="18" charset="0"/>
+                    </a:rPr>
+                    <a:t>Steps</a:t>
+                  </a:r>
+                </a:p>
+              </p:txBody>
+            </p:sp>
+          </p:grpSp>
+          <p:grpSp>
+            <p:nvGrpSpPr>
+              <p:cNvPr id="80" name="Group 79">
+                <a:extLst>
+                  <a:ext uri="{FF2B5EF4-FFF2-40B4-BE49-F238E27FC236}">
+                    <a16:creationId xmlns:a16="http://schemas.microsoft.com/office/drawing/2014/main" id="{81870F6E-9E2B-4903-B07C-06FDAE3A7CC5}"/>
+                  </a:ext>
+                </a:extLst>
+              </p:cNvPr>
+              <p:cNvGrpSpPr/>
+              <p:nvPr/>
+            </p:nvGrpSpPr>
+            <p:grpSpPr>
+              <a:xfrm>
+                <a:off x="10189769" y="7742773"/>
+                <a:ext cx="1040828" cy="2858523"/>
+                <a:chOff x="10189769" y="7742773"/>
+                <a:chExt cx="1040828" cy="2858523"/>
+              </a:xfrm>
+            </p:grpSpPr>
+            <p:sp>
+              <p:nvSpPr>
+                <p:cNvPr id="204" name="TextBox 203">
+                  <a:extLst>
+                    <a:ext uri="{FF2B5EF4-FFF2-40B4-BE49-F238E27FC236}">
+                      <a16:creationId xmlns:a16="http://schemas.microsoft.com/office/drawing/2014/main" id="{902C2B7F-9815-44FE-A293-EDC6136CC22C}"/>
+                    </a:ext>
+                  </a:extLst>
+                </p:cNvPr>
+                <p:cNvSpPr txBox="1"/>
+                <p:nvPr/>
+              </p:nvSpPr>
+              <p:spPr>
+                <a:xfrm>
+                  <a:off x="10509945" y="7742773"/>
+                  <a:ext cx="720652" cy="292388"/>
+                </a:xfrm>
+                <a:prstGeom prst="rect">
+                  <a:avLst/>
+                </a:prstGeom>
+                <a:noFill/>
+              </p:spPr>
+              <p:txBody>
+                <a:bodyPr wrap="square" rtlCol="0">
+                  <a:spAutoFit/>
+                </a:bodyPr>
+                <a:lstStyle/>
+                <a:p>
+                  <a:r>
+                    <a:rPr lang="en-US" sz="1300" dirty="0">
+                      <a:latin typeface="Georgia" panose="02040502050405020303" pitchFamily="18" charset="0"/>
+                    </a:rPr>
+                    <a:t>70</a:t>
+                  </a:r>
+                </a:p>
+              </p:txBody>
+            </p:sp>
+            <p:sp>
+              <p:nvSpPr>
+                <p:cNvPr id="205" name="TextBox 204">
+                  <a:extLst>
+                    <a:ext uri="{FF2B5EF4-FFF2-40B4-BE49-F238E27FC236}">
+                      <a16:creationId xmlns:a16="http://schemas.microsoft.com/office/drawing/2014/main" id="{C925525D-285F-4772-B605-990FE23C248A}"/>
+                    </a:ext>
+                  </a:extLst>
+                </p:cNvPr>
+                <p:cNvSpPr txBox="1"/>
+                <p:nvPr/>
+              </p:nvSpPr>
+              <p:spPr>
+                <a:xfrm>
+                  <a:off x="10509945" y="8262049"/>
+                  <a:ext cx="720652" cy="292388"/>
+                </a:xfrm>
+                <a:prstGeom prst="rect">
+                  <a:avLst/>
+                </a:prstGeom>
+                <a:noFill/>
+              </p:spPr>
+              <p:txBody>
+                <a:bodyPr wrap="square" rtlCol="0">
+                  <a:spAutoFit/>
+                </a:bodyPr>
+                <a:lstStyle/>
+                <a:p>
+                  <a:r>
+                    <a:rPr lang="en-US" sz="1300" dirty="0">
+                      <a:latin typeface="Georgia" panose="02040502050405020303" pitchFamily="18" charset="0"/>
+                    </a:rPr>
+                    <a:t>65</a:t>
+                  </a:r>
+                </a:p>
+              </p:txBody>
+            </p:sp>
+            <p:sp>
+              <p:nvSpPr>
+                <p:cNvPr id="206" name="TextBox 205">
+                  <a:extLst>
+                    <a:ext uri="{FF2B5EF4-FFF2-40B4-BE49-F238E27FC236}">
+                      <a16:creationId xmlns:a16="http://schemas.microsoft.com/office/drawing/2014/main" id="{B4E61160-E223-4602-B3BD-3B2FF154A88A}"/>
+                    </a:ext>
+                  </a:extLst>
+                </p:cNvPr>
+                <p:cNvSpPr txBox="1"/>
+                <p:nvPr/>
+              </p:nvSpPr>
+              <p:spPr>
+                <a:xfrm>
+                  <a:off x="10509945" y="8779465"/>
+                  <a:ext cx="720652" cy="292388"/>
+                </a:xfrm>
+                <a:prstGeom prst="rect">
+                  <a:avLst/>
+                </a:prstGeom>
+                <a:noFill/>
+              </p:spPr>
+              <p:txBody>
+                <a:bodyPr wrap="square" rtlCol="0">
+                  <a:spAutoFit/>
+                </a:bodyPr>
+                <a:lstStyle/>
+                <a:p>
+                  <a:r>
+                    <a:rPr lang="en-US" sz="1300" dirty="0">
+                      <a:latin typeface="Georgia" panose="02040502050405020303" pitchFamily="18" charset="0"/>
+                    </a:rPr>
+                    <a:t>60</a:t>
+                  </a:r>
+                </a:p>
+              </p:txBody>
+            </p:sp>
+            <p:sp>
+              <p:nvSpPr>
+                <p:cNvPr id="207" name="TextBox 206">
+                  <a:extLst>
+                    <a:ext uri="{FF2B5EF4-FFF2-40B4-BE49-F238E27FC236}">
+                      <a16:creationId xmlns:a16="http://schemas.microsoft.com/office/drawing/2014/main" id="{32A0E5B5-0607-41F5-A634-2FE1B5BBB225}"/>
+                    </a:ext>
+                  </a:extLst>
+                </p:cNvPr>
+                <p:cNvSpPr txBox="1"/>
+                <p:nvPr/>
+              </p:nvSpPr>
+              <p:spPr>
+                <a:xfrm>
+                  <a:off x="10504663" y="9296881"/>
+                  <a:ext cx="720652" cy="292388"/>
+                </a:xfrm>
+                <a:prstGeom prst="rect">
+                  <a:avLst/>
+                </a:prstGeom>
+                <a:noFill/>
+              </p:spPr>
+              <p:txBody>
+                <a:bodyPr wrap="square" rtlCol="0">
+                  <a:spAutoFit/>
+                </a:bodyPr>
+                <a:lstStyle/>
+                <a:p>
+                  <a:r>
+                    <a:rPr lang="en-US" sz="1300" dirty="0">
+                      <a:latin typeface="Georgia" panose="02040502050405020303" pitchFamily="18" charset="0"/>
+                    </a:rPr>
+                    <a:t>55</a:t>
+                  </a:r>
+                </a:p>
+              </p:txBody>
+            </p:sp>
+            <p:sp>
+              <p:nvSpPr>
+                <p:cNvPr id="208" name="TextBox 207">
+                  <a:extLst>
+                    <a:ext uri="{FF2B5EF4-FFF2-40B4-BE49-F238E27FC236}">
+                      <a16:creationId xmlns:a16="http://schemas.microsoft.com/office/drawing/2014/main" id="{49565D33-8B6D-4584-9FEB-49CD6C33ED26}"/>
+                    </a:ext>
+                  </a:extLst>
+                </p:cNvPr>
+                <p:cNvSpPr txBox="1"/>
+                <p:nvPr/>
+              </p:nvSpPr>
+              <p:spPr>
+                <a:xfrm>
+                  <a:off x="10504663" y="9793521"/>
+                  <a:ext cx="720652" cy="292388"/>
+                </a:xfrm>
+                <a:prstGeom prst="rect">
+                  <a:avLst/>
+                </a:prstGeom>
+                <a:noFill/>
+              </p:spPr>
+              <p:txBody>
+                <a:bodyPr wrap="square" rtlCol="0">
+                  <a:spAutoFit/>
+                </a:bodyPr>
+                <a:lstStyle/>
+                <a:p>
+                  <a:r>
+                    <a:rPr lang="en-US" sz="1300" dirty="0">
+                      <a:latin typeface="Georgia" panose="02040502050405020303" pitchFamily="18" charset="0"/>
+                    </a:rPr>
+                    <a:t>50</a:t>
+                  </a:r>
+                </a:p>
+              </p:txBody>
+            </p:sp>
+            <p:sp>
+              <p:nvSpPr>
+                <p:cNvPr id="209" name="TextBox 208">
+                  <a:extLst>
+                    <a:ext uri="{FF2B5EF4-FFF2-40B4-BE49-F238E27FC236}">
+                      <a16:creationId xmlns:a16="http://schemas.microsoft.com/office/drawing/2014/main" id="{01252105-3FE5-4DC5-BD34-F5F61B19A0F6}"/>
+                    </a:ext>
+                  </a:extLst>
+                </p:cNvPr>
+                <p:cNvSpPr txBox="1"/>
+                <p:nvPr/>
+              </p:nvSpPr>
+              <p:spPr>
+                <a:xfrm>
+                  <a:off x="10508127" y="10308908"/>
+                  <a:ext cx="720652" cy="292388"/>
+                </a:xfrm>
+                <a:prstGeom prst="rect">
+                  <a:avLst/>
+                </a:prstGeom>
+                <a:noFill/>
+              </p:spPr>
+              <p:txBody>
+                <a:bodyPr wrap="square" rtlCol="0">
+                  <a:spAutoFit/>
+                </a:bodyPr>
+                <a:lstStyle/>
+                <a:p>
+                  <a:r>
+                    <a:rPr lang="en-US" sz="1300" dirty="0">
+                      <a:latin typeface="Georgia" panose="02040502050405020303" pitchFamily="18" charset="0"/>
+                    </a:rPr>
+                    <a:t>45</a:t>
+                  </a:r>
+                </a:p>
+              </p:txBody>
+            </p:sp>
+            <p:sp>
+              <p:nvSpPr>
+                <p:cNvPr id="210" name="TextBox 209">
+                  <a:extLst>
+                    <a:ext uri="{FF2B5EF4-FFF2-40B4-BE49-F238E27FC236}">
+                      <a16:creationId xmlns:a16="http://schemas.microsoft.com/office/drawing/2014/main" id="{6463D64B-410A-41C4-B28D-1076E87F4EDE}"/>
+                    </a:ext>
+                  </a:extLst>
+                </p:cNvPr>
+                <p:cNvSpPr txBox="1"/>
+                <p:nvPr/>
+              </p:nvSpPr>
+              <p:spPr>
+                <a:xfrm>
+                  <a:off x="10189769" y="8049180"/>
+                  <a:ext cx="415498" cy="1563162"/>
+                </a:xfrm>
+                <a:prstGeom prst="rect">
+                  <a:avLst/>
+                </a:prstGeom>
+                <a:noFill/>
+              </p:spPr>
+              <p:txBody>
+                <a:bodyPr vert="vert270" wrap="square" rtlCol="0">
+                  <a:spAutoFit/>
+                </a:bodyPr>
+                <a:lstStyle/>
+                <a:p>
+                  <a:r>
+                    <a:rPr lang="en-US" sz="1500" dirty="0">
+                      <a:latin typeface="Georgia" panose="02040502050405020303" pitchFamily="18" charset="0"/>
+                    </a:rPr>
+                    <a:t>F1 Score</a:t>
+                  </a:r>
+                </a:p>
+              </p:txBody>
+            </p:sp>
+          </p:grpSp>
+        </p:grpSp>
+        <p:grpSp>
+          <p:nvGrpSpPr>
+            <p:cNvPr id="85" name="Group 84">
+              <a:extLst>
+                <a:ext uri="{FF2B5EF4-FFF2-40B4-BE49-F238E27FC236}">
+                  <a16:creationId xmlns:a16="http://schemas.microsoft.com/office/drawing/2014/main" id="{0AEA5C43-0C64-49D6-A542-20D86133DF43}"/>
+                </a:ext>
+              </a:extLst>
+            </p:cNvPr>
+            <p:cNvGrpSpPr/>
+            <p:nvPr/>
+          </p:nvGrpSpPr>
+          <p:grpSpPr>
+            <a:xfrm>
+              <a:off x="13519105" y="9142200"/>
+              <a:ext cx="1256594" cy="692497"/>
+              <a:chOff x="13428879" y="9117085"/>
+              <a:chExt cx="1256594" cy="692497"/>
+            </a:xfrm>
+          </p:grpSpPr>
+          <p:pic>
+            <p:nvPicPr>
+              <p:cNvPr id="84" name="Picture 83" descr="Chart, line chart&#10;&#10;Description automatically generated">
+                <a:extLst>
+                  <a:ext uri="{FF2B5EF4-FFF2-40B4-BE49-F238E27FC236}">
+                    <a16:creationId xmlns:a16="http://schemas.microsoft.com/office/drawing/2014/main" id="{41234D28-EF2D-4ED3-8FDC-C01587909AD7}"/>
+                  </a:ext>
+                </a:extLst>
+              </p:cNvPr>
+              <p:cNvPicPr>
+                <a:picLocks noChangeAspect="1"/>
+              </p:cNvPicPr>
+              <p:nvPr/>
+            </p:nvPicPr>
+            <p:blipFill rotWithShape="1">
+              <a:blip r:embed="rId6">
+                <a:extLst>
+                  <a:ext uri="{28A0092B-C50C-407E-A947-70E740481C1C}">
+                    <a14:useLocalDpi xmlns:a14="http://schemas.microsoft.com/office/drawing/2010/main" val="0"/>
+                  </a:ext>
+                </a:extLst>
+              </a:blip>
+              <a:srcRect l="88615" t="44155" r="7802" b="42459"/>
+              <a:stretch/>
+            </p:blipFill>
+            <p:spPr>
+              <a:xfrm>
+                <a:off x="13428879" y="9137889"/>
+                <a:ext cx="265033" cy="631492"/>
+              </a:xfrm>
+              <a:prstGeom prst="rect">
+                <a:avLst/>
+              </a:prstGeom>
+            </p:spPr>
+          </p:pic>
+          <p:sp>
+            <p:nvSpPr>
+              <p:cNvPr id="273" name="TextBox 272">
+                <a:extLst>
+                  <a:ext uri="{FF2B5EF4-FFF2-40B4-BE49-F238E27FC236}">
+                    <a16:creationId xmlns:a16="http://schemas.microsoft.com/office/drawing/2014/main" id="{E489FFA6-9CD7-4F17-97F8-8C7A6C472DF8}"/>
+                  </a:ext>
+                </a:extLst>
+              </p:cNvPr>
+              <p:cNvSpPr txBox="1"/>
+              <p:nvPr/>
+            </p:nvSpPr>
+            <p:spPr>
+              <a:xfrm>
+                <a:off x="13623390" y="9117085"/>
+                <a:ext cx="1062083" cy="692497"/>
+              </a:xfrm>
+              <a:prstGeom prst="rect">
+                <a:avLst/>
+              </a:prstGeom>
+              <a:noFill/>
+            </p:spPr>
+            <p:txBody>
+              <a:bodyPr wrap="square" rtlCol="0">
+                <a:spAutoFit/>
+              </a:bodyPr>
+              <a:lstStyle/>
+              <a:p>
+                <a:r>
+                  <a:rPr lang="en-US" sz="1300" dirty="0">
+                    <a:latin typeface="Georgia" panose="02040502050405020303" pitchFamily="18" charset="0"/>
+                  </a:rPr>
+                  <a:t>LR 0.005</a:t>
+                </a:r>
+              </a:p>
+              <a:p>
+                <a:r>
+                  <a:rPr lang="en-US" sz="1300" dirty="0">
+                    <a:latin typeface="Georgia" panose="02040502050405020303" pitchFamily="18" charset="0"/>
+                  </a:rPr>
+                  <a:t>LR 0.001</a:t>
+                </a:r>
+              </a:p>
+              <a:p>
+                <a:r>
+                  <a:rPr lang="en-US" sz="1300" dirty="0">
+                    <a:latin typeface="Georgia" panose="02040502050405020303" pitchFamily="18" charset="0"/>
+                  </a:rPr>
+                  <a:t>LR 0.0005</a:t>
+                </a:r>
+              </a:p>
+            </p:txBody>
+          </p:sp>
+        </p:grpSp>
+      </p:grpSp>
+      <p:sp>
+        <p:nvSpPr>
+          <p:cNvPr id="274" name="TextBox 273">
+            <a:extLst>
+              <a:ext uri="{FF2B5EF4-FFF2-40B4-BE49-F238E27FC236}">
+                <a16:creationId xmlns:a16="http://schemas.microsoft.com/office/drawing/2014/main" id="{B3AA37AA-CFD9-4D4A-98C6-4A464FAD8656}"/>
+              </a:ext>
+            </a:extLst>
+          </p:cNvPr>
+          <p:cNvSpPr txBox="1"/>
+          <p:nvPr/>
+        </p:nvSpPr>
+        <p:spPr>
+          <a:xfrm>
+            <a:off x="9727660" y="9218703"/>
+            <a:ext cx="1221991" cy="2062103"/>
+          </a:xfrm>
+          <a:prstGeom prst="rect">
+            <a:avLst/>
+          </a:prstGeom>
+          <a:noFill/>
+        </p:spPr>
+        <p:txBody>
+          <a:bodyPr wrap="square" rtlCol="0">
+            <a:spAutoFit/>
+          </a:bodyPr>
+          <a:lstStyle/>
+          <a:p>
+            <a:pPr algn="r"/>
+            <a:r>
+              <a:rPr lang="en-US" sz="1600" b="1" dirty="0">
+                <a:latin typeface="Georgia" panose="02040502050405020303" pitchFamily="18" charset="0"/>
+              </a:rPr>
+              <a:t>Fig 3.</a:t>
+            </a:r>
+            <a:r>
+              <a:rPr lang="en-US" sz="1600" dirty="0">
+                <a:latin typeface="Georgia" panose="02040502050405020303" pitchFamily="18" charset="0"/>
+              </a:rPr>
+              <a:t> F1 scores </a:t>
+            </a:r>
+            <a:r>
+              <a:rPr lang="en-US" altLang="zh-CN" sz="1600" dirty="0">
+                <a:latin typeface="Georgia" panose="02040502050405020303" pitchFamily="18" charset="0"/>
+              </a:rPr>
+              <a:t>vs.</a:t>
+            </a:r>
+            <a:r>
+              <a:rPr lang="en-US" sz="1600" dirty="0">
+                <a:latin typeface="Georgia" panose="02040502050405020303" pitchFamily="18" charset="0"/>
+              </a:rPr>
+              <a:t> Training Time </a:t>
+            </a:r>
+          </a:p>
+          <a:p>
+            <a:pPr algn="r"/>
+            <a:r>
+              <a:rPr lang="en-US" sz="1600" dirty="0">
+                <a:latin typeface="Georgia" panose="02040502050405020303" pitchFamily="18" charset="0"/>
+              </a:rPr>
+              <a:t>with different Reps and Batch sizes </a:t>
+            </a:r>
+            <a:endParaRPr lang="en-US" sz="1600" b="1" dirty="0">
+              <a:latin typeface="Georgia" panose="02040502050405020303" pitchFamily="18" charset="0"/>
+            </a:endParaRPr>
+          </a:p>
+        </p:txBody>
+      </p:sp>
+      <p:sp>
+        <p:nvSpPr>
+          <p:cNvPr id="275" name="TextBox 274">
+            <a:extLst>
+              <a:ext uri="{FF2B5EF4-FFF2-40B4-BE49-F238E27FC236}">
+                <a16:creationId xmlns:a16="http://schemas.microsoft.com/office/drawing/2014/main" id="{5E64905D-C4A1-47F9-A6EC-05FDF35F1BB0}"/>
+              </a:ext>
+            </a:extLst>
+          </p:cNvPr>
+          <p:cNvSpPr txBox="1"/>
+          <p:nvPr/>
+        </p:nvSpPr>
+        <p:spPr>
+          <a:xfrm>
+            <a:off x="9669443" y="6360203"/>
+            <a:ext cx="1273657" cy="1400383"/>
+          </a:xfrm>
+          <a:prstGeom prst="rect">
+            <a:avLst/>
+          </a:prstGeom>
+          <a:noFill/>
+        </p:spPr>
+        <p:txBody>
+          <a:bodyPr wrap="square" rtlCol="0">
+            <a:spAutoFit/>
+          </a:bodyPr>
+          <a:lstStyle/>
+          <a:p>
+            <a:pPr algn="r"/>
+            <a:r>
+              <a:rPr lang="en-US" sz="1700" b="1" dirty="0">
+                <a:latin typeface="Georgia" panose="02040502050405020303" pitchFamily="18" charset="0"/>
+              </a:rPr>
+              <a:t>Fig 2. </a:t>
+            </a:r>
+            <a:r>
+              <a:rPr lang="en-US" sz="1700" dirty="0">
+                <a:latin typeface="Georgia" panose="02040502050405020303" pitchFamily="18" charset="0"/>
+              </a:rPr>
+              <a:t>F1 scores with different Learning Rates</a:t>
+            </a:r>
+          </a:p>
+        </p:txBody>
+      </p:sp>
+      <p:sp>
+        <p:nvSpPr>
+          <p:cNvPr id="277" name="TextBox 276">
+            <a:extLst>
+              <a:ext uri="{FF2B5EF4-FFF2-40B4-BE49-F238E27FC236}">
+                <a16:creationId xmlns:a16="http://schemas.microsoft.com/office/drawing/2014/main" id="{F40FB2A2-82E0-4690-9F48-DCDEA43517B0}"/>
+              </a:ext>
+            </a:extLst>
+          </p:cNvPr>
+          <p:cNvSpPr txBox="1"/>
+          <p:nvPr/>
+        </p:nvSpPr>
+        <p:spPr>
+          <a:xfrm>
+            <a:off x="26937478" y="7711234"/>
+            <a:ext cx="5512588" cy="369332"/>
+          </a:xfrm>
+          <a:prstGeom prst="rect">
+            <a:avLst/>
+          </a:prstGeom>
+          <a:noFill/>
+        </p:spPr>
+        <p:txBody>
+          <a:bodyPr wrap="square" rtlCol="0">
+            <a:spAutoFit/>
+          </a:bodyPr>
+          <a:lstStyle/>
+          <a:p>
+            <a:r>
+              <a:rPr lang="en-US" b="1" dirty="0">
+                <a:latin typeface="Georgia" panose="02040502050405020303" pitchFamily="18" charset="0"/>
+              </a:rPr>
+              <a:t>Fig 5. </a:t>
+            </a:r>
+            <a:r>
+              <a:rPr lang="en-US" dirty="0">
+                <a:latin typeface="Georgia" panose="02040502050405020303" pitchFamily="18" charset="0"/>
+              </a:rPr>
+              <a:t>F1 and EM of three different models vs. Steps</a:t>
             </a:r>
           </a:p>
         </p:txBody>

</xml_diff>